<commit_message>
Update after first session.
</commit_message>
<xml_diff>
--- a/1_theorie/slides.pptx
+++ b/1_theorie/slides.pptx
@@ -227,7 +227,7 @@
           <a:p>
             <a:fld id="{C16BA119-491B-4624-9D19-375DBF0D2CBA}" type="datetimeFigureOut">
               <a:rPr lang="de-DE" smtClean="0"/>
-              <a:t>27.01.21</a:t>
+              <a:t>28.01.21</a:t>
             </a:fld>
             <a:endParaRPr lang="de-DE"/>
           </a:p>
@@ -393,7 +393,7 @@
             <a:fld id="{96454366-25A1-4235-B57F-F2917B09700B}" type="datetimeFigureOut">
               <a:rPr lang="de-DE" smtClean="0"/>
               <a:pPr/>
-              <a:t>27.01.21</a:t>
+              <a:t>28.01.21</a:t>
             </a:fld>
             <a:endParaRPr lang="de-DE"/>
           </a:p>
@@ -960,6 +960,91 @@
           <a:bodyPr/>
           <a:lstStyle/>
           <a:p>
+            <a:endParaRPr lang="de-DE" dirty="0"/>
+          </a:p>
+        </p:txBody>
+      </p:sp>
+      <p:sp>
+        <p:nvSpPr>
+          <p:cNvPr id="4" name="Foliennummernplatzhalter 3"/>
+          <p:cNvSpPr>
+            <a:spLocks noGrp="1"/>
+          </p:cNvSpPr>
+          <p:nvPr>
+            <p:ph type="sldNum" sz="quarter" idx="5"/>
+          </p:nvPr>
+        </p:nvSpPr>
+        <p:spPr/>
+        <p:txBody>
+          <a:bodyPr/>
+          <a:lstStyle/>
+          <a:p>
+            <a:fld id="{608411BC-650A-4DA6-BF2C-DF0DA485ADB7}" type="slidenum">
+              <a:rPr lang="de-DE" smtClean="0"/>
+              <a:pPr/>
+              <a:t>14</a:t>
+            </a:fld>
+            <a:endParaRPr lang="de-DE"/>
+          </a:p>
+        </p:txBody>
+      </p:sp>
+    </p:spTree>
+    <p:extLst>
+      <p:ext uri="{BB962C8B-B14F-4D97-AF65-F5344CB8AC3E}">
+        <p14:creationId xmlns:p14="http://schemas.microsoft.com/office/powerpoint/2010/main" val="1034653467"/>
+      </p:ext>
+    </p:extLst>
+  </p:cSld>
+  <p:clrMapOvr>
+    <a:masterClrMapping/>
+  </p:clrMapOvr>
+</p:notes>
+</file>
+
+<file path=ppt/notesSlides/notesSlide13.xml><?xml version="1.0" encoding="utf-8"?>
+<p:notes xmlns:a="http://schemas.openxmlformats.org/drawingml/2006/main" xmlns:r="http://schemas.openxmlformats.org/officeDocument/2006/relationships" xmlns:p="http://schemas.openxmlformats.org/presentationml/2006/main">
+  <p:cSld>
+    <p:spTree>
+      <p:nvGrpSpPr>
+        <p:cNvPr id="1" name=""/>
+        <p:cNvGrpSpPr/>
+        <p:nvPr/>
+      </p:nvGrpSpPr>
+      <p:grpSpPr>
+        <a:xfrm>
+          <a:off x="0" y="0"/>
+          <a:ext cx="0" cy="0"/>
+          <a:chOff x="0" y="0"/>
+          <a:chExt cx="0" cy="0"/>
+        </a:xfrm>
+      </p:grpSpPr>
+      <p:sp>
+        <p:nvSpPr>
+          <p:cNvPr id="2" name="Folienbildplatzhalter 1"/>
+          <p:cNvSpPr>
+            <a:spLocks noGrp="1" noRot="1" noChangeAspect="1"/>
+          </p:cNvSpPr>
+          <p:nvPr>
+            <p:ph type="sldImg"/>
+          </p:nvPr>
+        </p:nvSpPr>
+        <p:spPr/>
+      </p:sp>
+      <p:sp>
+        <p:nvSpPr>
+          <p:cNvPr id="3" name="Notizenplatzhalter 2"/>
+          <p:cNvSpPr>
+            <a:spLocks noGrp="1"/>
+          </p:cNvSpPr>
+          <p:nvPr>
+            <p:ph type="body" idx="1"/>
+          </p:nvPr>
+        </p:nvSpPr>
+        <p:spPr/>
+        <p:txBody>
+          <a:bodyPr/>
+          <a:lstStyle/>
+          <a:p>
             <a:pPr marL="171450" marR="0" lvl="0" indent="-171450" algn="l" defTabSz="914400" rtl="0" eaLnBrk="1" fontAlgn="auto" latinLnBrk="0" hangingPunct="1">
               <a:lnSpc>
                 <a:spcPct val="100000"/>
@@ -2160,7 +2245,7 @@
           <a:graphicData uri="http://schemas.openxmlformats.org/presentationml/2006/ole">
             <mc:AlternateContent xmlns:mc="http://schemas.openxmlformats.org/markup-compatibility/2006">
               <mc:Choice xmlns:v="urn:schemas-microsoft-com:vml" Requires="v">
-                <p:oleObj spid="_x0000_s2051" name="think-cell Folie" r:id="rId4" imgW="270" imgH="270" progId="TCLayout.ActiveDocument.1">
+                <p:oleObj spid="_x0000_s2054" name="think-cell Folie" r:id="rId4" imgW="270" imgH="270" progId="TCLayout.ActiveDocument.1">
                   <p:embed/>
                 </p:oleObj>
               </mc:Choice>
@@ -2944,7 +3029,7 @@
                 <a:tabLst/>
                 <a:defRPr/>
               </a:pPr>
-              <a:t>27. Januar 2021</a:t>
+              <a:t>28. Januar 2021</a:t>
             </a:fld>
             <a:endParaRPr kumimoji="0" lang="de-DE" sz="850" b="0" i="0" u="none" strike="noStrike" kern="1200" cap="none" spc="0" normalizeH="0" baseline="0" noProof="0" dirty="0">
               <a:ln>
@@ -3644,7 +3729,7 @@
                 <a:tabLst/>
                 <a:defRPr/>
               </a:pPr>
-              <a:t>27. Januar 2021</a:t>
+              <a:t>28. Januar 2021</a:t>
             </a:fld>
             <a:endParaRPr kumimoji="0" lang="de-DE" sz="850" b="0" i="0" u="none" strike="noStrike" kern="1200" cap="none" spc="0" normalizeH="0" baseline="0" noProof="0" dirty="0">
               <a:ln>
@@ -4948,7 +5033,7 @@
                 <a:tabLst/>
                 <a:defRPr/>
               </a:pPr>
-              <a:t>27. Januar 2021</a:t>
+              <a:t>28. Januar 2021</a:t>
             </a:fld>
             <a:endParaRPr kumimoji="0" lang="de-DE" sz="850" b="0" i="0" u="none" strike="noStrike" kern="1200" cap="none" spc="0" normalizeH="0" baseline="0" noProof="0" dirty="0">
               <a:ln>
@@ -5059,7 +5144,7 @@
           <a:graphicData uri="http://schemas.openxmlformats.org/presentationml/2006/ole">
             <mc:AlternateContent xmlns:mc="http://schemas.openxmlformats.org/markup-compatibility/2006">
               <mc:Choice xmlns:v="urn:schemas-microsoft-com:vml" Requires="v">
-                <p:oleObj spid="_x0000_s1027" name="think-cell Folie" r:id="rId11" imgW="270" imgH="270" progId="TCLayout.ActiveDocument.1">
+                <p:oleObj spid="_x0000_s1030" name="think-cell Folie" r:id="rId11" imgW="270" imgH="270" progId="TCLayout.ActiveDocument.1">
                   <p:embed/>
                 </p:oleObj>
               </mc:Choice>
@@ -5636,7 +5721,7 @@
                 <a:tabLst/>
                 <a:defRPr/>
               </a:pPr>
-              <a:t>27. Januar 2021</a:t>
+              <a:t>28. Januar 2021</a:t>
             </a:fld>
             <a:endParaRPr kumimoji="0" lang="de-DE" sz="850" b="0" i="0" u="none" strike="noStrike" kern="1200" cap="none" spc="0" normalizeH="0" baseline="0" noProof="0" dirty="0">
               <a:ln>
@@ -6194,7 +6279,7 @@
           <a:p>
             <a:r>
               <a:rPr lang="de-DE" dirty="0"/>
-              <a:t>Prozess der Prädiktiven Modellierung nach Statistikern</a:t>
+              <a:t>Prozess der Modellierung nach Statistikern</a:t>
             </a:r>
           </a:p>
         </p:txBody>
@@ -6228,9 +6313,6 @@
               <a:rPr lang="de-DE" dirty="0"/>
               <a:t> Learning vs. Statistische Modellierung </a:t>
             </a:r>
-          </a:p>
-          <a:p>
-            <a:endParaRPr lang="de-DE" dirty="0"/>
           </a:p>
         </p:txBody>
       </p:sp>
@@ -8594,6 +8676,38 @@
                 <a:schemeClr val="tx1"/>
               </a:solidFill>
             </a:endParaRPr>
+          </a:p>
+        </p:txBody>
+      </p:sp>
+      <p:sp>
+        <p:nvSpPr>
+          <p:cNvPr id="7" name="Textfeld 6">
+            <a:extLst>
+              <a:ext uri="{FF2B5EF4-FFF2-40B4-BE49-F238E27FC236}">
+                <a16:creationId xmlns:a16="http://schemas.microsoft.com/office/drawing/2014/main" id="{0725FF5F-A1C7-234F-962C-13325251439C}"/>
+              </a:ext>
+            </a:extLst>
+          </p:cNvPr>
+          <p:cNvSpPr txBox="1"/>
+          <p:nvPr/>
+        </p:nvSpPr>
+        <p:spPr>
+          <a:xfrm>
+            <a:off x="9531927" y="5597236"/>
+            <a:ext cx="65" cy="246221"/>
+          </a:xfrm>
+          <a:prstGeom prst="rect">
+            <a:avLst/>
+          </a:prstGeom>
+          <a:noFill/>
+        </p:spPr>
+        <p:txBody>
+          <a:bodyPr wrap="none" lIns="0" tIns="0" rIns="0" bIns="0" rtlCol="0">
+            <a:spAutoFit/>
+          </a:bodyPr>
+          <a:lstStyle/>
+          <a:p>
+            <a:endParaRPr lang="de-DE" sz="1600" dirty="0" err="1"/>
           </a:p>
         </p:txBody>
       </p:sp>
@@ -10212,6 +10326,49 @@
           </a:p>
         </p:txBody>
       </p:sp>
+      <p:cxnSp>
+        <p:nvCxnSpPr>
+          <p:cNvPr id="22" name="Gerade Verbindung 21">
+            <a:extLst>
+              <a:ext uri="{FF2B5EF4-FFF2-40B4-BE49-F238E27FC236}">
+                <a16:creationId xmlns:a16="http://schemas.microsoft.com/office/drawing/2014/main" id="{6C2B13AA-FB0D-C447-BC72-9E537EE060C5}"/>
+              </a:ext>
+            </a:extLst>
+          </p:cNvPr>
+          <p:cNvCxnSpPr>
+            <a:cxnSpLocks/>
+          </p:cNvCxnSpPr>
+          <p:nvPr/>
+        </p:nvCxnSpPr>
+        <p:spPr>
+          <a:xfrm>
+            <a:off x="775855" y="4715187"/>
+            <a:ext cx="10717899" cy="0"/>
+          </a:xfrm>
+          <a:prstGeom prst="line">
+            <a:avLst/>
+          </a:prstGeom>
+          <a:ln>
+            <a:solidFill>
+              <a:srgbClr val="9D9D9D"/>
+            </a:solidFill>
+          </a:ln>
+        </p:spPr>
+        <p:style>
+          <a:lnRef idx="1">
+            <a:schemeClr val="accent1"/>
+          </a:lnRef>
+          <a:fillRef idx="0">
+            <a:schemeClr val="accent1"/>
+          </a:fillRef>
+          <a:effectRef idx="0">
+            <a:schemeClr val="accent1"/>
+          </a:effectRef>
+          <a:fontRef idx="minor">
+            <a:schemeClr val="tx1"/>
+          </a:fontRef>
+        </p:style>
+      </p:cxnSp>
     </p:spTree>
     <p:extLst>
       <p:ext uri="{BB962C8B-B14F-4D97-AF65-F5344CB8AC3E}">
@@ -10627,7 +10784,7 @@
         </p:nvGrpSpPr>
         <p:grpSpPr>
           <a:xfrm>
-            <a:off x="7032834" y="4020722"/>
+            <a:off x="7032834" y="4436364"/>
             <a:ext cx="1188000" cy="1188000"/>
             <a:chOff x="6374836" y="4941337"/>
             <a:chExt cx="1188000" cy="1188000"/>
@@ -10805,7 +10962,7 @@
                   <a:avLst/>
                 </a:prstGeom>
                 <a:blipFill>
-                  <a:blip r:embed="rId2"/>
+                  <a:blip r:embed="rId3"/>
                   <a:stretch>
                     <a:fillRect/>
                   </a:stretch>
@@ -10885,7 +11042,7 @@
         </p:nvGrpSpPr>
         <p:grpSpPr>
           <a:xfrm>
-            <a:off x="4122619" y="4020722"/>
+            <a:off x="4122619" y="4436364"/>
             <a:ext cx="1188000" cy="1188000"/>
             <a:chOff x="4255091" y="4941337"/>
             <a:chExt cx="1188000" cy="1188000"/>
@@ -11063,7 +11220,7 @@
                   <a:avLst/>
                 </a:prstGeom>
                 <a:blipFill>
-                  <a:blip r:embed="rId3"/>
+                  <a:blip r:embed="rId4"/>
                   <a:stretch>
                     <a:fillRect/>
                   </a:stretch>
@@ -11144,7 +11301,7 @@
         </p:nvGrpSpPr>
         <p:grpSpPr>
           <a:xfrm>
-            <a:off x="1212404" y="4020722"/>
+            <a:off x="1212404" y="4436364"/>
             <a:ext cx="1188000" cy="1188000"/>
             <a:chOff x="1828800" y="4941337"/>
             <a:chExt cx="1188000" cy="1188000"/>
@@ -11315,7 +11472,7 @@
                   <a:avLst/>
                 </a:prstGeom>
                 <a:blipFill>
-                  <a:blip r:embed="rId4"/>
+                  <a:blip r:embed="rId5"/>
                   <a:stretch>
                     <a:fillRect b="-16667"/>
                   </a:stretch>
@@ -11391,7 +11548,7 @@
         </p:nvGrpSpPr>
         <p:grpSpPr>
           <a:xfrm>
-            <a:off x="9943050" y="4020722"/>
+            <a:off x="9943050" y="4436364"/>
             <a:ext cx="1188000" cy="1188000"/>
             <a:chOff x="6374836" y="4941337"/>
             <a:chExt cx="1188000" cy="1188000"/>
@@ -11532,7 +11689,7 @@
         </p:nvCxnSpPr>
         <p:spPr>
           <a:xfrm>
-            <a:off x="2400404" y="4614722"/>
+            <a:off x="2400404" y="5030364"/>
             <a:ext cx="1722215" cy="0"/>
           </a:xfrm>
           <a:prstGeom prst="straightConnector1">
@@ -11578,7 +11735,7 @@
         </p:nvCxnSpPr>
         <p:spPr>
           <a:xfrm>
-            <a:off x="5310619" y="4614722"/>
+            <a:off x="5310619" y="5030364"/>
             <a:ext cx="1722215" cy="0"/>
           </a:xfrm>
           <a:prstGeom prst="straightConnector1">
@@ -11624,7 +11781,7 @@
         </p:nvCxnSpPr>
         <p:spPr>
           <a:xfrm>
-            <a:off x="8220834" y="4614722"/>
+            <a:off x="8220834" y="5030364"/>
             <a:ext cx="1722216" cy="0"/>
           </a:xfrm>
           <a:prstGeom prst="straightConnector1">
@@ -11670,7 +11827,7 @@
         </p:nvCxnSpPr>
         <p:spPr>
           <a:xfrm rot="5400000">
-            <a:off x="6171727" y="843399"/>
+            <a:off x="6171727" y="1259041"/>
             <a:ext cx="12700" cy="8730646"/>
           </a:xfrm>
           <a:prstGeom prst="bentConnector3">
@@ -11714,7 +11871,7 @@
         </p:nvSpPr>
         <p:spPr>
           <a:xfrm>
-            <a:off x="4596782" y="5639124"/>
+            <a:off x="4596782" y="6054766"/>
             <a:ext cx="3149901" cy="246221"/>
           </a:xfrm>
           <a:prstGeom prst="rect">
@@ -11779,7 +11936,7 @@
           <p:nvPr/>
         </p:nvPicPr>
         <p:blipFill>
-          <a:blip r:embed="rId5">
+          <a:blip r:embed="rId6">
             <a:extLst>
               <a:ext uri="{28A0092B-C50C-407E-A947-70E740481C1C}">
                 <a14:useLocalDpi xmlns:a14="http://schemas.microsoft.com/office/drawing/2010/main" val="0"/>
@@ -11793,7 +11950,7 @@
         </p:blipFill>
         <p:spPr bwMode="auto">
           <a:xfrm>
-            <a:off x="3603724" y="2301263"/>
+            <a:off x="3603724" y="1816349"/>
             <a:ext cx="2240779" cy="1507433"/>
           </a:xfrm>
           <a:prstGeom prst="rect">
@@ -11826,7 +11983,7 @@
           <p:nvPr/>
         </p:nvPicPr>
         <p:blipFill>
-          <a:blip r:embed="rId6">
+          <a:blip r:embed="rId7">
             <a:extLst>
               <a:ext uri="{28A0092B-C50C-407E-A947-70E740481C1C}">
                 <a14:useLocalDpi xmlns:a14="http://schemas.microsoft.com/office/drawing/2010/main" val="0"/>
@@ -11840,7 +11997,7 @@
         </p:blipFill>
         <p:spPr bwMode="auto">
           <a:xfrm>
-            <a:off x="672958" y="2313912"/>
+            <a:off x="672958" y="1828998"/>
             <a:ext cx="2319591" cy="1507427"/>
           </a:xfrm>
           <a:prstGeom prst="rect">
@@ -11858,8 +12015,8 @@
           </a:extLst>
         </p:spPr>
       </p:pic>
-      <mc:AlternateContent xmlns:mc="http://schemas.openxmlformats.org/markup-compatibility/2006" xmlns:a14="http://schemas.microsoft.com/office/drawing/2010/main">
-        <mc:Choice Requires="a14">
+      <mc:AlternateContent xmlns:mc="http://schemas.openxmlformats.org/markup-compatibility/2006">
+        <mc:Choice xmlns:a14="http://schemas.microsoft.com/office/drawing/2010/main" Requires="a14">
           <p:sp>
             <p:nvSpPr>
               <p:cNvPr id="27" name="Textfeld 26">
@@ -11874,8 +12031,8 @@
             </p:nvSpPr>
             <p:spPr>
               <a:xfrm>
-                <a:off x="3708320" y="1704983"/>
-                <a:ext cx="2197845" cy="460960"/>
+                <a:off x="3708320" y="3575347"/>
+                <a:ext cx="2087687" cy="460960"/>
               </a:xfrm>
               <a:prstGeom prst="rect">
                 <a:avLst/>
@@ -11925,20 +12082,6 @@
                           <a:ea typeface="Cambria Math" panose="02040503050406030204" pitchFamily="18" charset="0"/>
                         </a:rPr>
                         <m:t>𝜇</m:t>
-                      </m:r>
-                      <m:r>
-                        <a:rPr lang="de-DE" sz="1400" i="1">
-                          <a:latin typeface="Cambria Math" panose="02040503050406030204" pitchFamily="18" charset="0"/>
-                          <a:ea typeface="Cambria Math" panose="02040503050406030204" pitchFamily="18" charset="0"/>
-                        </a:rPr>
-                        <m:t>,</m:t>
-                      </m:r>
-                      <m:r>
-                        <a:rPr lang="de-DE" sz="1400" i="1">
-                          <a:latin typeface="Cambria Math" panose="02040503050406030204" pitchFamily="18" charset="0"/>
-                          <a:ea typeface="Cambria Math" panose="02040503050406030204" pitchFamily="18" charset="0"/>
-                        </a:rPr>
-                        <m:t>𝜎</m:t>
                       </m:r>
                       <m:r>
                         <a:rPr lang="de-DE" sz="1400" b="0" i="1" smtClean="0">
@@ -12128,7 +12271,7 @@
             </p:txBody>
           </p:sp>
         </mc:Choice>
-        <mc:Fallback xmlns="">
+        <mc:Fallback>
           <p:sp>
             <p:nvSpPr>
               <p:cNvPr id="27" name="Textfeld 26">
@@ -12145,16 +12288,16 @@
             </p:nvSpPr>
             <p:spPr>
               <a:xfrm>
-                <a:off x="3708320" y="1704983"/>
-                <a:ext cx="2197845" cy="460960"/>
+                <a:off x="3708320" y="3575347"/>
+                <a:ext cx="2087687" cy="460960"/>
               </a:xfrm>
               <a:prstGeom prst="rect">
                 <a:avLst/>
               </a:prstGeom>
               <a:blipFill>
-                <a:blip r:embed="rId7"/>
+                <a:blip r:embed="rId8"/>
                 <a:stretch>
-                  <a:fillRect l="-1143" t="-2703" b="-8108"/>
+                  <a:fillRect b="-10811"/>
                 </a:stretch>
               </a:blipFill>
             </p:spPr>
@@ -12173,8 +12316,8 @@
           </p:sp>
         </mc:Fallback>
       </mc:AlternateContent>
-      <mc:AlternateContent xmlns:mc="http://schemas.openxmlformats.org/markup-compatibility/2006" xmlns:a14="http://schemas.microsoft.com/office/drawing/2010/main">
-        <mc:Choice Requires="a14">
+      <mc:AlternateContent xmlns:mc="http://schemas.openxmlformats.org/markup-compatibility/2006">
+        <mc:Choice xmlns:a14="http://schemas.microsoft.com/office/drawing/2010/main" Requires="a14">
           <p:sp>
             <p:nvSpPr>
               <p:cNvPr id="28" name="Textfeld 27">
@@ -12189,7 +12332,7 @@
             </p:nvSpPr>
             <p:spPr>
               <a:xfrm>
-                <a:off x="948867" y="1807131"/>
+                <a:off x="948867" y="3677495"/>
                 <a:ext cx="1823191" cy="215444"/>
               </a:xfrm>
               <a:prstGeom prst="rect">
@@ -12278,7 +12421,7 @@
             </p:txBody>
           </p:sp>
         </mc:Choice>
-        <mc:Fallback xmlns="">
+        <mc:Fallback>
           <p:sp>
             <p:nvSpPr>
               <p:cNvPr id="28" name="Textfeld 27">
@@ -12295,14 +12438,14 @@
             </p:nvSpPr>
             <p:spPr>
               <a:xfrm>
-                <a:off x="948867" y="1807131"/>
+                <a:off x="948867" y="3677495"/>
                 <a:ext cx="1823191" cy="215444"/>
               </a:xfrm>
               <a:prstGeom prst="rect">
                 <a:avLst/>
               </a:prstGeom>
               <a:blipFill>
-                <a:blip r:embed="rId8"/>
+                <a:blip r:embed="rId9"/>
                 <a:stretch>
                   <a:fillRect l="-1379" t="-5556" r="-2759" b="-38889"/>
                 </a:stretch>
@@ -12338,7 +12481,7 @@
           <p:nvPr/>
         </p:nvPicPr>
         <p:blipFill>
-          <a:blip r:embed="rId9">
+          <a:blip r:embed="rId10">
             <a:extLst>
               <a:ext uri="{28A0092B-C50C-407E-A947-70E740481C1C}">
                 <a14:useLocalDpi xmlns:a14="http://schemas.microsoft.com/office/drawing/2010/main" val="0"/>
@@ -12352,7 +12495,7 @@
         </p:blipFill>
         <p:spPr bwMode="auto">
           <a:xfrm>
-            <a:off x="9331307" y="2227829"/>
+            <a:off x="9331307" y="1742915"/>
             <a:ext cx="2411486" cy="1622272"/>
           </a:xfrm>
           <a:prstGeom prst="rect">
@@ -12370,8 +12513,8 @@
           </a:extLst>
         </p:spPr>
       </p:pic>
-      <mc:AlternateContent xmlns:mc="http://schemas.openxmlformats.org/markup-compatibility/2006" xmlns:a14="http://schemas.microsoft.com/office/drawing/2010/main">
-        <mc:Choice Requires="a14">
+      <mc:AlternateContent xmlns:mc="http://schemas.openxmlformats.org/markup-compatibility/2006">
+        <mc:Choice xmlns:a14="http://schemas.microsoft.com/office/drawing/2010/main" Requires="a14">
           <p:sp>
             <p:nvSpPr>
               <p:cNvPr id="25" name="Rechteck 24">
@@ -12386,8 +12529,8 @@
             </p:nvSpPr>
             <p:spPr>
               <a:xfrm>
-                <a:off x="6505499" y="1787101"/>
-                <a:ext cx="2242665" cy="307777"/>
+                <a:off x="6560919" y="3657465"/>
+                <a:ext cx="2123017" cy="307777"/>
               </a:xfrm>
               <a:prstGeom prst="rect">
                 <a:avLst/>
@@ -12424,43 +12567,29 @@
                           <m:r>
                             <a:rPr lang="de-DE" sz="1400" i="1">
                               <a:latin typeface="Cambria Math" panose="02040503050406030204" pitchFamily="18" charset="0"/>
+                              <a:ea typeface="Cambria Math" panose="02040503050406030204" pitchFamily="18" charset="0"/>
+                            </a:rPr>
+                            <m:t>𝜇</m:t>
+                          </m:r>
+                        </m:e>
+                        <m:e>
+                          <m:r>
+                            <a:rPr lang="de-DE" sz="1400" b="0" i="1" smtClean="0">
+                              <a:latin typeface="Cambria Math" panose="02040503050406030204" pitchFamily="18" charset="0"/>
                             </a:rPr>
                             <m:t>𝑦</m:t>
                           </m:r>
                         </m:e>
-                        <m:e>
-                          <m:r>
-                            <a:rPr lang="de-DE" sz="1400" i="1">
-                              <a:latin typeface="Cambria Math" panose="02040503050406030204" pitchFamily="18" charset="0"/>
-                              <a:ea typeface="Cambria Math" panose="02040503050406030204" pitchFamily="18" charset="0"/>
-                            </a:rPr>
-                            <m:t>𝜇</m:t>
-                          </m:r>
-                          <m:r>
-                            <a:rPr lang="de-DE" sz="1400" i="1">
-                              <a:latin typeface="Cambria Math" panose="02040503050406030204" pitchFamily="18" charset="0"/>
-                              <a:ea typeface="Cambria Math" panose="02040503050406030204" pitchFamily="18" charset="0"/>
-                            </a:rPr>
-                            <m:t>,</m:t>
-                          </m:r>
-                          <m:r>
-                            <a:rPr lang="de-DE" sz="1400" i="1">
-                              <a:latin typeface="Cambria Math" panose="02040503050406030204" pitchFamily="18" charset="0"/>
-                              <a:ea typeface="Cambria Math" panose="02040503050406030204" pitchFamily="18" charset="0"/>
-                            </a:rPr>
-                            <m:t>𝜎</m:t>
-                          </m:r>
-                        </m:e>
                       </m:d>
                       <m:r>
-                        <a:rPr lang="de-DE" sz="1400" b="0" i="1" smtClean="0">
+                        <a:rPr lang="de-DE" sz="1400" i="1" smtClean="0">
                           <a:latin typeface="Cambria Math" panose="02040503050406030204" pitchFamily="18" charset="0"/>
                           <a:ea typeface="Cambria Math" panose="02040503050406030204" pitchFamily="18" charset="0"/>
                         </a:rPr>
                         <m:t>∝</m:t>
                       </m:r>
                       <m:r>
-                        <a:rPr lang="de-DE" sz="1400" i="1">
+                        <a:rPr lang="de-DE" sz="1400" i="1" smtClean="0">
                           <a:latin typeface="Cambria Math" panose="02040503050406030204" pitchFamily="18" charset="0"/>
                         </a:rPr>
                         <m:t>𝑃</m:t>
@@ -12468,7 +12597,7 @@
                       <m:d>
                         <m:dPr>
                           <m:ctrlPr>
-                            <a:rPr lang="de-DE" sz="1400" i="1">
+                            <a:rPr lang="de-DE" sz="1400" i="1" smtClean="0">
                               <a:latin typeface="Cambria Math" panose="02040503050406030204" pitchFamily="18" charset="0"/>
                             </a:rPr>
                           </m:ctrlPr>
@@ -12541,7 +12670,7 @@
             </p:txBody>
           </p:sp>
         </mc:Choice>
-        <mc:Fallback xmlns="">
+        <mc:Fallback>
           <p:sp>
             <p:nvSpPr>
               <p:cNvPr id="25" name="Rechteck 24">
@@ -12558,16 +12687,16 @@
             </p:nvSpPr>
             <p:spPr>
               <a:xfrm>
-                <a:off x="6505499" y="1787101"/>
-                <a:ext cx="2242665" cy="307777"/>
+                <a:off x="6560919" y="3657465"/>
+                <a:ext cx="2123017" cy="307777"/>
               </a:xfrm>
               <a:prstGeom prst="rect">
                 <a:avLst/>
               </a:prstGeom>
               <a:blipFill>
-                <a:blip r:embed="rId10"/>
+                <a:blip r:embed="rId11"/>
                 <a:stretch>
-                  <a:fillRect b="-7692"/>
+                  <a:fillRect b="-16667"/>
                 </a:stretch>
               </a:blipFill>
             </p:spPr>
@@ -12601,14 +12730,14 @@
           <p:nvPr/>
         </p:nvPicPr>
         <p:blipFill>
-          <a:blip r:embed="rId11"/>
+          <a:blip r:embed="rId12"/>
           <a:stretch>
             <a:fillRect/>
           </a:stretch>
         </p:blipFill>
         <p:spPr>
           <a:xfrm>
-            <a:off x="6531585" y="2254192"/>
+            <a:off x="6531585" y="1769278"/>
             <a:ext cx="2112639" cy="736967"/>
           </a:xfrm>
           <a:prstGeom prst="rect">
@@ -12631,14 +12760,14 @@
           <p:nvPr/>
         </p:nvPicPr>
         <p:blipFill>
-          <a:blip r:embed="rId12"/>
+          <a:blip r:embed="rId13"/>
           <a:stretch>
             <a:fillRect/>
           </a:stretch>
         </p:blipFill>
         <p:spPr>
           <a:xfrm>
-            <a:off x="6455678" y="3048073"/>
+            <a:off x="6455678" y="2563159"/>
             <a:ext cx="2240779" cy="736967"/>
           </a:xfrm>
           <a:prstGeom prst="rect">
@@ -13046,7 +13175,7 @@
                             </p:stCondLst>
                             <p:childTnLst>
                               <p:par>
-                                <p:cTn id="38" presetID="9" presetClass="entr" presetSubtype="0" fill="hold" grpId="0" nodeType="clickEffect">
+                                <p:cTn id="38" presetID="9" presetClass="entr" presetSubtype="0" fill="hold" nodeType="clickEffect">
                                   <p:stCondLst>
                                     <p:cond delay="0"/>
                                   </p:stCondLst>
@@ -13059,7 +13188,7 @@
                                           </p:stCondLst>
                                         </p:cTn>
                                         <p:tgtEl>
-                                          <p:spTgt spid="28"/>
+                                          <p:spTgt spid="26"/>
                                         </p:tgtEl>
                                         <p:attrNameLst>
                                           <p:attrName>style.visibility</p:attrName>
@@ -13073,7 +13202,7 @@
                                       <p:cBhvr>
                                         <p:cTn id="40" dur="500"/>
                                         <p:tgtEl>
-                                          <p:spTgt spid="28"/>
+                                          <p:spTgt spid="26"/>
                                         </p:tgtEl>
                                       </p:cBhvr>
                                     </p:animEffect>
@@ -13099,7 +13228,7 @@
                             </p:stCondLst>
                             <p:childTnLst>
                               <p:par>
-                                <p:cTn id="43" presetID="9" presetClass="entr" presetSubtype="0" fill="hold" nodeType="clickEffect">
+                                <p:cTn id="43" presetID="9" presetClass="entr" presetSubtype="0" fill="hold" grpId="0" nodeType="clickEffect">
                                   <p:stCondLst>
                                     <p:cond delay="0"/>
                                   </p:stCondLst>
@@ -13112,7 +13241,7 @@
                                           </p:stCondLst>
                                         </p:cTn>
                                         <p:tgtEl>
-                                          <p:spTgt spid="26"/>
+                                          <p:spTgt spid="28"/>
                                         </p:tgtEl>
                                         <p:attrNameLst>
                                           <p:attrName>style.visibility</p:attrName>
@@ -13126,7 +13255,7 @@
                                       <p:cBhvr>
                                         <p:cTn id="45" dur="500"/>
                                         <p:tgtEl>
-                                          <p:spTgt spid="26"/>
+                                          <p:spTgt spid="28"/>
                                         </p:tgtEl>
                                       </p:cBhvr>
                                     </p:animEffect>
@@ -13152,7 +13281,7 @@
                             </p:stCondLst>
                             <p:childTnLst>
                               <p:par>
-                                <p:cTn id="48" presetID="9" presetClass="entr" presetSubtype="0" fill="hold" grpId="0" nodeType="clickEffect">
+                                <p:cTn id="48" presetID="9" presetClass="entr" presetSubtype="0" fill="hold" nodeType="clickEffect">
                                   <p:stCondLst>
                                     <p:cond delay="0"/>
                                   </p:stCondLst>
@@ -13165,7 +13294,7 @@
                                           </p:stCondLst>
                                         </p:cTn>
                                         <p:tgtEl>
-                                          <p:spTgt spid="27"/>
+                                          <p:spTgt spid="4098"/>
                                         </p:tgtEl>
                                         <p:attrNameLst>
                                           <p:attrName>style.visibility</p:attrName>
@@ -13179,7 +13308,7 @@
                                       <p:cBhvr>
                                         <p:cTn id="50" dur="500"/>
                                         <p:tgtEl>
-                                          <p:spTgt spid="27"/>
+                                          <p:spTgt spid="4098"/>
                                         </p:tgtEl>
                                       </p:cBhvr>
                                     </p:animEffect>
@@ -13205,7 +13334,7 @@
                             </p:stCondLst>
                             <p:childTnLst>
                               <p:par>
-                                <p:cTn id="53" presetID="9" presetClass="entr" presetSubtype="0" fill="hold" nodeType="clickEffect">
+                                <p:cTn id="53" presetID="9" presetClass="entr" presetSubtype="0" fill="hold" grpId="0" nodeType="clickEffect">
                                   <p:stCondLst>
                                     <p:cond delay="0"/>
                                   </p:stCondLst>
@@ -13218,7 +13347,7 @@
                                           </p:stCondLst>
                                         </p:cTn>
                                         <p:tgtEl>
-                                          <p:spTgt spid="4098"/>
+                                          <p:spTgt spid="27"/>
                                         </p:tgtEl>
                                         <p:attrNameLst>
                                           <p:attrName>style.visibility</p:attrName>
@@ -13232,7 +13361,7 @@
                                       <p:cBhvr>
                                         <p:cTn id="55" dur="500"/>
                                         <p:tgtEl>
-                                          <p:spTgt spid="4098"/>
+                                          <p:spTgt spid="27"/>
                                         </p:tgtEl>
                                       </p:cBhvr>
                                     </p:animEffect>
@@ -13258,7 +13387,7 @@
                             </p:stCondLst>
                             <p:childTnLst>
                               <p:par>
-                                <p:cTn id="58" presetID="9" presetClass="entr" presetSubtype="0" fill="hold" grpId="0" nodeType="clickEffect">
+                                <p:cTn id="58" presetID="9" presetClass="entr" presetSubtype="0" fill="hold" nodeType="clickEffect">
                                   <p:stCondLst>
                                     <p:cond delay="0"/>
                                   </p:stCondLst>
@@ -13266,6 +13395,76 @@
                                     <p:set>
                                       <p:cBhvr>
                                         <p:cTn id="59" dur="1" fill="hold">
+                                          <p:stCondLst>
+                                            <p:cond delay="0"/>
+                                          </p:stCondLst>
+                                        </p:cTn>
+                                        <p:tgtEl>
+                                          <p:spTgt spid="30"/>
+                                        </p:tgtEl>
+                                        <p:attrNameLst>
+                                          <p:attrName>style.visibility</p:attrName>
+                                        </p:attrNameLst>
+                                      </p:cBhvr>
+                                      <p:to>
+                                        <p:strVal val="visible"/>
+                                      </p:to>
+                                    </p:set>
+                                    <p:animEffect transition="in" filter="dissolve">
+                                      <p:cBhvr>
+                                        <p:cTn id="60" dur="500"/>
+                                        <p:tgtEl>
+                                          <p:spTgt spid="30"/>
+                                        </p:tgtEl>
+                                      </p:cBhvr>
+                                    </p:animEffect>
+                                  </p:childTnLst>
+                                </p:cTn>
+                              </p:par>
+                              <p:par>
+                                <p:cTn id="61" presetID="9" presetClass="entr" presetSubtype="0" fill="hold" nodeType="withEffect">
+                                  <p:stCondLst>
+                                    <p:cond delay="0"/>
+                                  </p:stCondLst>
+                                  <p:childTnLst>
+                                    <p:set>
+                                      <p:cBhvr>
+                                        <p:cTn id="62" dur="1" fill="hold">
+                                          <p:stCondLst>
+                                            <p:cond delay="0"/>
+                                          </p:stCondLst>
+                                        </p:cTn>
+                                        <p:tgtEl>
+                                          <p:spTgt spid="32"/>
+                                        </p:tgtEl>
+                                        <p:attrNameLst>
+                                          <p:attrName>style.visibility</p:attrName>
+                                        </p:attrNameLst>
+                                      </p:cBhvr>
+                                      <p:to>
+                                        <p:strVal val="visible"/>
+                                      </p:to>
+                                    </p:set>
+                                    <p:animEffect transition="in" filter="dissolve">
+                                      <p:cBhvr>
+                                        <p:cTn id="63" dur="500"/>
+                                        <p:tgtEl>
+                                          <p:spTgt spid="32"/>
+                                        </p:tgtEl>
+                                      </p:cBhvr>
+                                    </p:animEffect>
+                                  </p:childTnLst>
+                                </p:cTn>
+                              </p:par>
+                              <p:par>
+                                <p:cTn id="64" presetID="9" presetClass="entr" presetSubtype="0" fill="hold" grpId="0" nodeType="withEffect">
+                                  <p:stCondLst>
+                                    <p:cond delay="0"/>
+                                  </p:stCondLst>
+                                  <p:childTnLst>
+                                    <p:set>
+                                      <p:cBhvr>
+                                        <p:cTn id="65" dur="1" fill="hold">
                                           <p:stCondLst>
                                             <p:cond delay="0"/>
                                           </p:stCondLst>
@@ -13283,7 +13482,7 @@
                                     </p:set>
                                     <p:animEffect transition="in" filter="dissolve">
                                       <p:cBhvr>
-                                        <p:cTn id="60" dur="500"/>
+                                        <p:cTn id="66" dur="500"/>
                                         <p:tgtEl>
                                           <p:spTgt spid="25"/>
                                         </p:tgtEl>
@@ -13299,114 +13498,26 @@
                     </p:cTn>
                   </p:par>
                   <p:par>
-                    <p:cTn id="61" fill="hold">
+                    <p:cTn id="67" fill="hold">
                       <p:stCondLst>
                         <p:cond delay="indefinite"/>
                       </p:stCondLst>
                       <p:childTnLst>
                         <p:par>
-                          <p:cTn id="62" fill="hold">
+                          <p:cTn id="68" fill="hold">
                             <p:stCondLst>
                               <p:cond delay="0"/>
                             </p:stCondLst>
                             <p:childTnLst>
                               <p:par>
-                                <p:cTn id="63" presetID="9" presetClass="entr" presetSubtype="0" fill="hold" nodeType="clickEffect">
+                                <p:cTn id="69" presetID="9" presetClass="entr" presetSubtype="0" fill="hold" nodeType="clickEffect">
                                   <p:stCondLst>
                                     <p:cond delay="0"/>
                                   </p:stCondLst>
                                   <p:childTnLst>
                                     <p:set>
                                       <p:cBhvr>
-                                        <p:cTn id="64" dur="1" fill="hold">
-                                          <p:stCondLst>
-                                            <p:cond delay="0"/>
-                                          </p:stCondLst>
-                                        </p:cTn>
-                                        <p:tgtEl>
-                                          <p:spTgt spid="30"/>
-                                        </p:tgtEl>
-                                        <p:attrNameLst>
-                                          <p:attrName>style.visibility</p:attrName>
-                                        </p:attrNameLst>
-                                      </p:cBhvr>
-                                      <p:to>
-                                        <p:strVal val="visible"/>
-                                      </p:to>
-                                    </p:set>
-                                    <p:animEffect transition="in" filter="dissolve">
-                                      <p:cBhvr>
-                                        <p:cTn id="65" dur="500"/>
-                                        <p:tgtEl>
-                                          <p:spTgt spid="30"/>
-                                        </p:tgtEl>
-                                      </p:cBhvr>
-                                    </p:animEffect>
-                                  </p:childTnLst>
-                                </p:cTn>
-                              </p:par>
-                              <p:par>
-                                <p:cTn id="66" presetID="9" presetClass="entr" presetSubtype="0" fill="hold" nodeType="withEffect">
-                                  <p:stCondLst>
-                                    <p:cond delay="0"/>
-                                  </p:stCondLst>
-                                  <p:childTnLst>
-                                    <p:set>
-                                      <p:cBhvr>
-                                        <p:cTn id="67" dur="1" fill="hold">
-                                          <p:stCondLst>
-                                            <p:cond delay="0"/>
-                                          </p:stCondLst>
-                                        </p:cTn>
-                                        <p:tgtEl>
-                                          <p:spTgt spid="32"/>
-                                        </p:tgtEl>
-                                        <p:attrNameLst>
-                                          <p:attrName>style.visibility</p:attrName>
-                                        </p:attrNameLst>
-                                      </p:cBhvr>
-                                      <p:to>
-                                        <p:strVal val="visible"/>
-                                      </p:to>
-                                    </p:set>
-                                    <p:animEffect transition="in" filter="dissolve">
-                                      <p:cBhvr>
-                                        <p:cTn id="68" dur="500"/>
-                                        <p:tgtEl>
-                                          <p:spTgt spid="32"/>
-                                        </p:tgtEl>
-                                      </p:cBhvr>
-                                    </p:animEffect>
-                                  </p:childTnLst>
-                                </p:cTn>
-                              </p:par>
-                            </p:childTnLst>
-                          </p:cTn>
-                        </p:par>
-                      </p:childTnLst>
-                    </p:cTn>
-                  </p:par>
-                  <p:par>
-                    <p:cTn id="69" fill="hold">
-                      <p:stCondLst>
-                        <p:cond delay="indefinite"/>
-                      </p:stCondLst>
-                      <p:childTnLst>
-                        <p:par>
-                          <p:cTn id="70" fill="hold">
-                            <p:stCondLst>
-                              <p:cond delay="0"/>
-                            </p:stCondLst>
-                            <p:childTnLst>
-                              <p:par>
-                                <p:cTn id="71" presetID="9" presetClass="entr" presetSubtype="0" fill="hold" nodeType="clickEffect">
-                                  <p:stCondLst>
-                                    <p:cond delay="0"/>
-                                  </p:stCondLst>
-                                  <p:childTnLst>
-                                    <p:set>
-                                      <p:cBhvr>
-                                        <p:cTn id="72" dur="1" fill="hold">
+                                        <p:cTn id="70" dur="1" fill="hold">
                                           <p:stCondLst>
                                             <p:cond delay="0"/>
                                           </p:stCondLst>
@@ -13424,7 +13535,7 @@
                                     </p:set>
                                     <p:animEffect transition="in" filter="dissolve">
                                       <p:cBhvr>
-                                        <p:cTn id="73" dur="500"/>
+                                        <p:cTn id="71" dur="500"/>
                                         <p:tgtEl>
                                           <p:spTgt spid="4100"/>
                                         </p:tgtEl>
@@ -17899,7 +18010,7 @@
           <a:p>
             <a:r>
               <a:rPr lang="de-DE" dirty="0"/>
-              <a:t>Data Science Prozess der Prädiktiven Modellierung</a:t>
+              <a:t>Herangehensweise bei der Modellierung</a:t>
             </a:r>
           </a:p>
         </p:txBody>
@@ -18900,7 +19011,7 @@
           <a:p>
             <a:r>
               <a:rPr lang="de-DE" dirty="0"/>
-              <a:t>Prozess der Prädiktiven Modellierung nach Informatikern</a:t>
+              <a:t>Prozess der Modellierung nach Informatikern</a:t>
             </a:r>
           </a:p>
         </p:txBody>
@@ -21513,7 +21624,7 @@
           <a:p>
             <a:r>
               <a:rPr lang="de-DE" dirty="0"/>
-              <a:t>Data Science Prozess der Prädiktiven Modellierung</a:t>
+              <a:t>Herangehensweise bei der Modellierung</a:t>
             </a:r>
           </a:p>
         </p:txBody>

</xml_diff>

<commit_message>
Add praxisteil_0 v0. Update readme.
</commit_message>
<xml_diff>
--- a/1_theorie/slides.pptx
+++ b/1_theorie/slides.pptx
@@ -227,7 +227,7 @@
           <a:p>
             <a:fld id="{C16BA119-491B-4624-9D19-375DBF0D2CBA}" type="datetimeFigureOut">
               <a:rPr lang="de-DE" smtClean="0"/>
-              <a:t>28.01.21</a:t>
+              <a:t>16.02.21</a:t>
             </a:fld>
             <a:endParaRPr lang="de-DE"/>
           </a:p>
@@ -393,7 +393,7 @@
             <a:fld id="{96454366-25A1-4235-B57F-F2917B09700B}" type="datetimeFigureOut">
               <a:rPr lang="de-DE" smtClean="0"/>
               <a:pPr/>
-              <a:t>28.01.21</a:t>
+              <a:t>16.02.21</a:t>
             </a:fld>
             <a:endParaRPr lang="de-DE"/>
           </a:p>
@@ -2245,7 +2245,7 @@
           <a:graphicData uri="http://schemas.openxmlformats.org/presentationml/2006/ole">
             <mc:AlternateContent xmlns:mc="http://schemas.openxmlformats.org/markup-compatibility/2006">
               <mc:Choice xmlns:v="urn:schemas-microsoft-com:vml" Requires="v">
-                <p:oleObj spid="_x0000_s2056" name="think-cell Folie" r:id="rId4" imgW="270" imgH="270" progId="TCLayout.ActiveDocument.1">
+                <p:oleObj spid="_x0000_s2058" name="think-cell Folie" r:id="rId4" imgW="270" imgH="270" progId="TCLayout.ActiveDocument.1">
                   <p:embed/>
                 </p:oleObj>
               </mc:Choice>
@@ -3029,7 +3029,7 @@
                 <a:tabLst/>
                 <a:defRPr/>
               </a:pPr>
-              <a:t>28. Januar 2021</a:t>
+              <a:t>16. Februar 2021</a:t>
             </a:fld>
             <a:endParaRPr kumimoji="0" lang="de-DE" sz="850" b="0" i="0" u="none" strike="noStrike" kern="1200" cap="none" spc="0" normalizeH="0" baseline="0" noProof="0" dirty="0">
               <a:ln>
@@ -3729,7 +3729,7 @@
                 <a:tabLst/>
                 <a:defRPr/>
               </a:pPr>
-              <a:t>28. Januar 2021</a:t>
+              <a:t>16. Februar 2021</a:t>
             </a:fld>
             <a:endParaRPr kumimoji="0" lang="de-DE" sz="850" b="0" i="0" u="none" strike="noStrike" kern="1200" cap="none" spc="0" normalizeH="0" baseline="0" noProof="0" dirty="0">
               <a:ln>
@@ -5033,7 +5033,7 @@
                 <a:tabLst/>
                 <a:defRPr/>
               </a:pPr>
-              <a:t>28. Januar 2021</a:t>
+              <a:t>16. Februar 2021</a:t>
             </a:fld>
             <a:endParaRPr kumimoji="0" lang="de-DE" sz="850" b="0" i="0" u="none" strike="noStrike" kern="1200" cap="none" spc="0" normalizeH="0" baseline="0" noProof="0" dirty="0">
               <a:ln>
@@ -5144,7 +5144,7 @@
           <a:graphicData uri="http://schemas.openxmlformats.org/presentationml/2006/ole">
             <mc:AlternateContent xmlns:mc="http://schemas.openxmlformats.org/markup-compatibility/2006">
               <mc:Choice xmlns:v="urn:schemas-microsoft-com:vml" Requires="v">
-                <p:oleObj spid="_x0000_s1032" name="think-cell Folie" r:id="rId11" imgW="270" imgH="270" progId="TCLayout.ActiveDocument.1">
+                <p:oleObj spid="_x0000_s1034" name="think-cell Folie" r:id="rId11" imgW="270" imgH="270" progId="TCLayout.ActiveDocument.1">
                   <p:embed/>
                 </p:oleObj>
               </mc:Choice>
@@ -5721,7 +5721,7 @@
                 <a:tabLst/>
                 <a:defRPr/>
               </a:pPr>
-              <a:t>28. Januar 2021</a:t>
+              <a:t>16. Februar 2021</a:t>
             </a:fld>
             <a:endParaRPr kumimoji="0" lang="de-DE" sz="850" b="0" i="0" u="none" strike="noStrike" kern="1200" cap="none" spc="0" normalizeH="0" baseline="0" noProof="0" dirty="0">
               <a:ln>
@@ -11820,19 +11820,19 @@
           </p:cNvPr>
           <p:cNvCxnSpPr>
             <a:cxnSpLocks/>
-            <a:stCxn id="18" idx="4"/>
+            <a:stCxn id="6" idx="4"/>
             <a:endCxn id="14" idx="4"/>
           </p:cNvCxnSpPr>
           <p:nvPr/>
         </p:nvCxnSpPr>
         <p:spPr>
           <a:xfrm rot="5400000">
-            <a:off x="6171727" y="1259041"/>
-            <a:ext cx="12700" cy="8730646"/>
+            <a:off x="4716619" y="2714149"/>
+            <a:ext cx="12700" cy="5820430"/>
           </a:xfrm>
           <a:prstGeom prst="bentConnector3">
             <a:avLst>
-              <a:gd name="adj1" fmla="val 2890913"/>
+              <a:gd name="adj1" fmla="val 2490409"/>
             </a:avLst>
           </a:prstGeom>
           <a:ln w="19050">
@@ -11871,7 +11871,7 @@
         </p:nvSpPr>
         <p:spPr>
           <a:xfrm>
-            <a:off x="4596782" y="6054766"/>
+            <a:off x="3141668" y="6019626"/>
             <a:ext cx="3149901" cy="246221"/>
           </a:xfrm>
           <a:prstGeom prst="rect">
@@ -12015,8 +12015,8 @@
           </a:extLst>
         </p:spPr>
       </p:pic>
-      <mc:AlternateContent xmlns:mc="http://schemas.openxmlformats.org/markup-compatibility/2006">
-        <mc:Choice xmlns:a14="http://schemas.microsoft.com/office/drawing/2010/main" Requires="a14">
+      <mc:AlternateContent xmlns:mc="http://schemas.openxmlformats.org/markup-compatibility/2006" xmlns:a14="http://schemas.microsoft.com/office/drawing/2010/main">
+        <mc:Choice Requires="a14">
           <p:sp>
             <p:nvSpPr>
               <p:cNvPr id="27" name="Textfeld 26">
@@ -12271,7 +12271,7 @@
             </p:txBody>
           </p:sp>
         </mc:Choice>
-        <mc:Fallback>
+        <mc:Fallback xmlns="">
           <p:sp>
             <p:nvSpPr>
               <p:cNvPr id="27" name="Textfeld 26">
@@ -12316,8 +12316,8 @@
           </p:sp>
         </mc:Fallback>
       </mc:AlternateContent>
-      <mc:AlternateContent xmlns:mc="http://schemas.openxmlformats.org/markup-compatibility/2006">
-        <mc:Choice xmlns:a14="http://schemas.microsoft.com/office/drawing/2010/main" Requires="a14">
+      <mc:AlternateContent xmlns:mc="http://schemas.openxmlformats.org/markup-compatibility/2006" xmlns:a14="http://schemas.microsoft.com/office/drawing/2010/main">
+        <mc:Choice Requires="a14">
           <p:sp>
             <p:nvSpPr>
               <p:cNvPr id="28" name="Textfeld 27">
@@ -12421,7 +12421,7 @@
             </p:txBody>
           </p:sp>
         </mc:Choice>
-        <mc:Fallback>
+        <mc:Fallback xmlns="">
           <p:sp>
             <p:nvSpPr>
               <p:cNvPr id="28" name="Textfeld 27">
@@ -12513,8 +12513,8 @@
           </a:extLst>
         </p:spPr>
       </p:pic>
-      <mc:AlternateContent xmlns:mc="http://schemas.openxmlformats.org/markup-compatibility/2006">
-        <mc:Choice xmlns:a14="http://schemas.microsoft.com/office/drawing/2010/main" Requires="a14">
+      <mc:AlternateContent xmlns:mc="http://schemas.openxmlformats.org/markup-compatibility/2006" xmlns:a14="http://schemas.microsoft.com/office/drawing/2010/main">
+        <mc:Choice Requires="a14">
           <p:sp>
             <p:nvSpPr>
               <p:cNvPr id="25" name="Rechteck 24">
@@ -12670,7 +12670,7 @@
             </p:txBody>
           </p:sp>
         </mc:Choice>
-        <mc:Fallback>
+        <mc:Fallback xmlns="">
           <p:sp>
             <p:nvSpPr>
               <p:cNvPr id="25" name="Rechteck 24">

</xml_diff>

<commit_message>
Add stuff to pymc3 theory part.
</commit_message>
<xml_diff>
--- a/1_theorie/slides.pptx
+++ b/1_theorie/slides.pptx
@@ -5,10 +5,10 @@
     <p:sldMasterId id="2147483660" r:id="rId1"/>
   </p:sldMasterIdLst>
   <p:notesMasterIdLst>
-    <p:notesMasterId r:id="rId19"/>
+    <p:notesMasterId r:id="rId22"/>
   </p:notesMasterIdLst>
   <p:handoutMasterIdLst>
-    <p:handoutMasterId r:id="rId20"/>
+    <p:handoutMasterId r:id="rId23"/>
   </p:handoutMasterIdLst>
   <p:sldIdLst>
     <p:sldId id="266" r:id="rId2"/>
@@ -26,8 +26,11 @@
     <p:sldId id="1595" r:id="rId14"/>
     <p:sldId id="1612" r:id="rId15"/>
     <p:sldId id="1614" r:id="rId16"/>
-    <p:sldId id="1610" r:id="rId17"/>
-    <p:sldId id="1598" r:id="rId18"/>
+    <p:sldId id="1619" r:id="rId17"/>
+    <p:sldId id="1620" r:id="rId18"/>
+    <p:sldId id="1610" r:id="rId19"/>
+    <p:sldId id="1621" r:id="rId20"/>
+    <p:sldId id="1598" r:id="rId21"/>
   </p:sldIdLst>
   <p:sldSz cx="12192000" cy="6858000"/>
   <p:notesSz cx="6858000" cy="9144000"/>
@@ -1225,6 +1228,176 @@
 </p:notes>
 </file>
 
+<file path=ppt/notesSlides/notesSlide14.xml><?xml version="1.0" encoding="utf-8"?>
+<p:notes xmlns:a="http://schemas.openxmlformats.org/drawingml/2006/main" xmlns:r="http://schemas.openxmlformats.org/officeDocument/2006/relationships" xmlns:p="http://schemas.openxmlformats.org/presentationml/2006/main">
+  <p:cSld>
+    <p:spTree>
+      <p:nvGrpSpPr>
+        <p:cNvPr id="1" name=""/>
+        <p:cNvGrpSpPr/>
+        <p:nvPr/>
+      </p:nvGrpSpPr>
+      <p:grpSpPr>
+        <a:xfrm>
+          <a:off x="0" y="0"/>
+          <a:ext cx="0" cy="0"/>
+          <a:chOff x="0" y="0"/>
+          <a:chExt cx="0" cy="0"/>
+        </a:xfrm>
+      </p:grpSpPr>
+      <p:sp>
+        <p:nvSpPr>
+          <p:cNvPr id="2" name="Folienbildplatzhalter 1"/>
+          <p:cNvSpPr>
+            <a:spLocks noGrp="1" noRot="1" noChangeAspect="1"/>
+          </p:cNvSpPr>
+          <p:nvPr>
+            <p:ph type="sldImg"/>
+          </p:nvPr>
+        </p:nvSpPr>
+        <p:spPr/>
+      </p:sp>
+      <p:sp>
+        <p:nvSpPr>
+          <p:cNvPr id="3" name="Notizenplatzhalter 2"/>
+          <p:cNvSpPr>
+            <a:spLocks noGrp="1"/>
+          </p:cNvSpPr>
+          <p:nvPr>
+            <p:ph type="body" idx="1"/>
+          </p:nvPr>
+        </p:nvSpPr>
+        <p:spPr/>
+        <p:txBody>
+          <a:bodyPr/>
+          <a:lstStyle/>
+          <a:p>
+            <a:endParaRPr lang="de-DE" dirty="0"/>
+          </a:p>
+        </p:txBody>
+      </p:sp>
+      <p:sp>
+        <p:nvSpPr>
+          <p:cNvPr id="4" name="Foliennummernplatzhalter 3"/>
+          <p:cNvSpPr>
+            <a:spLocks noGrp="1"/>
+          </p:cNvSpPr>
+          <p:nvPr>
+            <p:ph type="sldNum" sz="quarter" idx="5"/>
+          </p:nvPr>
+        </p:nvSpPr>
+        <p:spPr/>
+        <p:txBody>
+          <a:bodyPr/>
+          <a:lstStyle/>
+          <a:p>
+            <a:fld id="{608411BC-650A-4DA6-BF2C-DF0DA485ADB7}" type="slidenum">
+              <a:rPr lang="de-DE" smtClean="0"/>
+              <a:pPr/>
+              <a:t>16</a:t>
+            </a:fld>
+            <a:endParaRPr lang="de-DE"/>
+          </a:p>
+        </p:txBody>
+      </p:sp>
+    </p:spTree>
+    <p:extLst>
+      <p:ext uri="{BB962C8B-B14F-4D97-AF65-F5344CB8AC3E}">
+        <p14:creationId xmlns:p14="http://schemas.microsoft.com/office/powerpoint/2010/main" val="2443854049"/>
+      </p:ext>
+    </p:extLst>
+  </p:cSld>
+  <p:clrMapOvr>
+    <a:masterClrMapping/>
+  </p:clrMapOvr>
+</p:notes>
+</file>
+
+<file path=ppt/notesSlides/notesSlide15.xml><?xml version="1.0" encoding="utf-8"?>
+<p:notes xmlns:a="http://schemas.openxmlformats.org/drawingml/2006/main" xmlns:r="http://schemas.openxmlformats.org/officeDocument/2006/relationships" xmlns:p="http://schemas.openxmlformats.org/presentationml/2006/main">
+  <p:cSld>
+    <p:spTree>
+      <p:nvGrpSpPr>
+        <p:cNvPr id="1" name=""/>
+        <p:cNvGrpSpPr/>
+        <p:nvPr/>
+      </p:nvGrpSpPr>
+      <p:grpSpPr>
+        <a:xfrm>
+          <a:off x="0" y="0"/>
+          <a:ext cx="0" cy="0"/>
+          <a:chOff x="0" y="0"/>
+          <a:chExt cx="0" cy="0"/>
+        </a:xfrm>
+      </p:grpSpPr>
+      <p:sp>
+        <p:nvSpPr>
+          <p:cNvPr id="2" name="Folienbildplatzhalter 1"/>
+          <p:cNvSpPr>
+            <a:spLocks noGrp="1" noRot="1" noChangeAspect="1"/>
+          </p:cNvSpPr>
+          <p:nvPr>
+            <p:ph type="sldImg"/>
+          </p:nvPr>
+        </p:nvSpPr>
+        <p:spPr/>
+      </p:sp>
+      <p:sp>
+        <p:nvSpPr>
+          <p:cNvPr id="3" name="Notizenplatzhalter 2"/>
+          <p:cNvSpPr>
+            <a:spLocks noGrp="1"/>
+          </p:cNvSpPr>
+          <p:nvPr>
+            <p:ph type="body" idx="1"/>
+          </p:nvPr>
+        </p:nvSpPr>
+        <p:spPr/>
+        <p:txBody>
+          <a:bodyPr/>
+          <a:lstStyle/>
+          <a:p>
+            <a:endParaRPr lang="de-DE" dirty="0"/>
+          </a:p>
+        </p:txBody>
+      </p:sp>
+      <p:sp>
+        <p:nvSpPr>
+          <p:cNvPr id="4" name="Foliennummernplatzhalter 3"/>
+          <p:cNvSpPr>
+            <a:spLocks noGrp="1"/>
+          </p:cNvSpPr>
+          <p:nvPr>
+            <p:ph type="sldNum" sz="quarter" idx="5"/>
+          </p:nvPr>
+        </p:nvSpPr>
+        <p:spPr/>
+        <p:txBody>
+          <a:bodyPr/>
+          <a:lstStyle/>
+          <a:p>
+            <a:fld id="{608411BC-650A-4DA6-BF2C-DF0DA485ADB7}" type="slidenum">
+              <a:rPr lang="de-DE" smtClean="0"/>
+              <a:pPr/>
+              <a:t>19</a:t>
+            </a:fld>
+            <a:endParaRPr lang="de-DE"/>
+          </a:p>
+        </p:txBody>
+      </p:sp>
+    </p:spTree>
+    <p:extLst>
+      <p:ext uri="{BB962C8B-B14F-4D97-AF65-F5344CB8AC3E}">
+        <p14:creationId xmlns:p14="http://schemas.microsoft.com/office/powerpoint/2010/main" val="396622222"/>
+      </p:ext>
+    </p:extLst>
+  </p:cSld>
+  <p:clrMapOvr>
+    <a:masterClrMapping/>
+  </p:clrMapOvr>
+</p:notes>
+</file>
+
 <file path=ppt/notesSlides/notesSlide2.xml><?xml version="1.0" encoding="utf-8"?>
 <p:notes xmlns:a="http://schemas.openxmlformats.org/drawingml/2006/main" xmlns:r="http://schemas.openxmlformats.org/officeDocument/2006/relationships" xmlns:p="http://schemas.openxmlformats.org/presentationml/2006/main">
   <p:cSld>
@@ -2245,7 +2418,7 @@
           <a:graphicData uri="http://schemas.openxmlformats.org/presentationml/2006/ole">
             <mc:AlternateContent xmlns:mc="http://schemas.openxmlformats.org/markup-compatibility/2006">
               <mc:Choice xmlns:v="urn:schemas-microsoft-com:vml" Requires="v">
-                <p:oleObj spid="_x0000_s2058" name="think-cell Folie" r:id="rId4" imgW="270" imgH="270" progId="TCLayout.ActiveDocument.1">
+                <p:oleObj spid="_x0000_s2061" name="think-cell Folie" r:id="rId4" imgW="270" imgH="270" progId="TCLayout.ActiveDocument.1">
                   <p:embed/>
                 </p:oleObj>
               </mc:Choice>
@@ -5144,7 +5317,7 @@
           <a:graphicData uri="http://schemas.openxmlformats.org/presentationml/2006/ole">
             <mc:AlternateContent xmlns:mc="http://schemas.openxmlformats.org/markup-compatibility/2006">
               <mc:Choice xmlns:v="urn:schemas-microsoft-com:vml" Requires="v">
-                <p:oleObj spid="_x0000_s1034" name="think-cell Folie" r:id="rId11" imgW="270" imgH="270" progId="TCLayout.ActiveDocument.1">
+                <p:oleObj spid="_x0000_s1037" name="think-cell Folie" r:id="rId11" imgW="270" imgH="270" progId="TCLayout.ActiveDocument.1">
                   <p:embed/>
                 </p:oleObj>
               </mc:Choice>
@@ -10216,7 +10389,7 @@
             <a:avLst/>
           </a:prstGeom>
           <a:solidFill>
-            <a:schemeClr val="tx2"/>
+            <a:srgbClr val="9D9D9D"/>
           </a:solidFill>
           <a:ln w="19050" cmpd="sng">
             <a:noFill/>
@@ -10276,7 +10449,7 @@
             <a:avLst/>
           </a:prstGeom>
           <a:solidFill>
-            <a:schemeClr val="tx2"/>
+            <a:srgbClr val="9D9D9D"/>
           </a:solidFill>
           <a:ln w="19050" cmpd="sng">
             <a:noFill/>
@@ -13736,6 +13909,547 @@
       </p:grpSpPr>
       <p:sp>
         <p:nvSpPr>
+          <p:cNvPr id="6" name="Titel 5">
+            <a:extLst>
+              <a:ext uri="{FF2B5EF4-FFF2-40B4-BE49-F238E27FC236}">
+                <a16:creationId xmlns:a16="http://schemas.microsoft.com/office/drawing/2014/main" id="{BE0BC8CF-FBAD-A84F-A6C4-B741EE65D6F5}"/>
+              </a:ext>
+            </a:extLst>
+          </p:cNvPr>
+          <p:cNvSpPr>
+            <a:spLocks noGrp="1"/>
+          </p:cNvSpPr>
+          <p:nvPr>
+            <p:ph type="title"/>
+          </p:nvPr>
+        </p:nvSpPr>
+        <p:spPr/>
+        <p:txBody>
+          <a:bodyPr/>
+          <a:lstStyle/>
+          <a:p>
+            <a:r>
+              <a:rPr lang="de-DE" dirty="0"/>
+              <a:t>Herausforderungen bei der </a:t>
+            </a:r>
+            <a:r>
+              <a:rPr lang="de-DE" dirty="0" err="1"/>
+              <a:t>Bayesschen</a:t>
+            </a:r>
+            <a:r>
+              <a:rPr lang="de-DE" dirty="0"/>
+              <a:t> Modellierung</a:t>
+            </a:r>
+          </a:p>
+        </p:txBody>
+      </p:sp>
+      <p:sp>
+        <p:nvSpPr>
+          <p:cNvPr id="8" name="Textplatzhalter 7">
+            <a:extLst>
+              <a:ext uri="{FF2B5EF4-FFF2-40B4-BE49-F238E27FC236}">
+                <a16:creationId xmlns:a16="http://schemas.microsoft.com/office/drawing/2014/main" id="{7C3DE06C-9D7C-A04D-B54D-16F67C3E75BF}"/>
+              </a:ext>
+            </a:extLst>
+          </p:cNvPr>
+          <p:cNvSpPr>
+            <a:spLocks noGrp="1"/>
+          </p:cNvSpPr>
+          <p:nvPr>
+            <p:ph type="body" sz="quarter" idx="10"/>
+          </p:nvPr>
+        </p:nvSpPr>
+        <p:spPr/>
+        <p:txBody>
+          <a:bodyPr/>
+          <a:lstStyle/>
+          <a:p>
+            <a:endParaRPr lang="de-DE"/>
+          </a:p>
+        </p:txBody>
+      </p:sp>
+      <p:sp>
+        <p:nvSpPr>
+          <p:cNvPr id="10" name="Textfeld 9">
+            <a:extLst>
+              <a:ext uri="{FF2B5EF4-FFF2-40B4-BE49-F238E27FC236}">
+                <a16:creationId xmlns:a16="http://schemas.microsoft.com/office/drawing/2014/main" id="{CE6E9456-E5B1-5B49-AAB3-93371A553CD8}"/>
+              </a:ext>
+            </a:extLst>
+          </p:cNvPr>
+          <p:cNvSpPr txBox="1"/>
+          <p:nvPr/>
+        </p:nvSpPr>
+        <p:spPr>
+          <a:xfrm>
+            <a:off x="1105989" y="2031221"/>
+            <a:ext cx="7093288" cy="276999"/>
+          </a:xfrm>
+          <a:prstGeom prst="rect">
+            <a:avLst/>
+          </a:prstGeom>
+          <a:noFill/>
+        </p:spPr>
+        <p:txBody>
+          <a:bodyPr wrap="none" lIns="0" tIns="0" rIns="0" bIns="0" rtlCol="0">
+            <a:spAutoFit/>
+          </a:bodyPr>
+          <a:lstStyle/>
+          <a:p>
+            <a:r>
+              <a:rPr lang="de-DE" dirty="0"/>
+              <a:t>Kernaktivität: Multiplikation von Wahrscheinlichkeitsverteilungen</a:t>
+            </a:r>
+          </a:p>
+        </p:txBody>
+      </p:sp>
+      <p:sp>
+        <p:nvSpPr>
+          <p:cNvPr id="11" name="Textfeld 10">
+            <a:extLst>
+              <a:ext uri="{FF2B5EF4-FFF2-40B4-BE49-F238E27FC236}">
+                <a16:creationId xmlns:a16="http://schemas.microsoft.com/office/drawing/2014/main" id="{F0C348AA-0DDB-E046-ADC9-87BDB7CDD40D}"/>
+              </a:ext>
+            </a:extLst>
+          </p:cNvPr>
+          <p:cNvSpPr txBox="1"/>
+          <p:nvPr/>
+        </p:nvSpPr>
+        <p:spPr>
+          <a:xfrm>
+            <a:off x="1620540" y="2518182"/>
+            <a:ext cx="3268523" cy="246221"/>
+          </a:xfrm>
+          <a:prstGeom prst="rect">
+            <a:avLst/>
+          </a:prstGeom>
+          <a:noFill/>
+        </p:spPr>
+        <p:txBody>
+          <a:bodyPr wrap="none" lIns="0" tIns="0" rIns="0" bIns="0" rtlCol="0">
+            <a:spAutoFit/>
+          </a:bodyPr>
+          <a:lstStyle/>
+          <a:p>
+            <a:r>
+              <a:rPr lang="de-DE" sz="1600" dirty="0"/>
+              <a:t>Modelle werden schnell komplex</a:t>
+            </a:r>
+          </a:p>
+        </p:txBody>
+      </p:sp>
+      <p:sp>
+        <p:nvSpPr>
+          <p:cNvPr id="13" name="Textfeld 12">
+            <a:extLst>
+              <a:ext uri="{FF2B5EF4-FFF2-40B4-BE49-F238E27FC236}">
+                <a16:creationId xmlns:a16="http://schemas.microsoft.com/office/drawing/2014/main" id="{122BFA69-F2F5-7C44-90A6-1A8EEC0DB8F0}"/>
+              </a:ext>
+            </a:extLst>
+          </p:cNvPr>
+          <p:cNvSpPr txBox="1"/>
+          <p:nvPr/>
+        </p:nvSpPr>
+        <p:spPr>
+          <a:xfrm>
+            <a:off x="1620540" y="2901724"/>
+            <a:ext cx="4336123" cy="246221"/>
+          </a:xfrm>
+          <a:prstGeom prst="rect">
+            <a:avLst/>
+          </a:prstGeom>
+          <a:noFill/>
+        </p:spPr>
+        <p:txBody>
+          <a:bodyPr wrap="none" lIns="0" tIns="0" rIns="0" bIns="0" rtlCol="0">
+            <a:spAutoFit/>
+          </a:bodyPr>
+          <a:lstStyle/>
+          <a:p>
+            <a:r>
+              <a:rPr lang="de-DE" sz="1600" dirty="0"/>
+              <a:t>Modelle werden schnell analytisch unlösbar</a:t>
+            </a:r>
+          </a:p>
+        </p:txBody>
+      </p:sp>
+      <p:cxnSp>
+        <p:nvCxnSpPr>
+          <p:cNvPr id="18" name="Gerade Verbindung mit Pfeil 17">
+            <a:extLst>
+              <a:ext uri="{FF2B5EF4-FFF2-40B4-BE49-F238E27FC236}">
+                <a16:creationId xmlns:a16="http://schemas.microsoft.com/office/drawing/2014/main" id="{A81CA17C-F483-E44E-A3DC-6E74AC7DD8F3}"/>
+              </a:ext>
+            </a:extLst>
+          </p:cNvPr>
+          <p:cNvCxnSpPr>
+            <a:cxnSpLocks/>
+          </p:cNvCxnSpPr>
+          <p:nvPr/>
+        </p:nvCxnSpPr>
+        <p:spPr>
+          <a:xfrm flipV="1">
+            <a:off x="7641771" y="3701142"/>
+            <a:ext cx="0" cy="2249806"/>
+          </a:xfrm>
+          <a:prstGeom prst="straightConnector1">
+            <a:avLst/>
+          </a:prstGeom>
+          <a:ln w="19050" cap="rnd">
+            <a:solidFill>
+              <a:srgbClr val="9D9D9D"/>
+            </a:solidFill>
+            <a:tailEnd type="triangle" w="lg" len="lg"/>
+          </a:ln>
+        </p:spPr>
+        <p:style>
+          <a:lnRef idx="1">
+            <a:schemeClr val="accent1"/>
+          </a:lnRef>
+          <a:fillRef idx="0">
+            <a:schemeClr val="accent1"/>
+          </a:fillRef>
+          <a:effectRef idx="0">
+            <a:schemeClr val="accent1"/>
+          </a:effectRef>
+          <a:fontRef idx="minor">
+            <a:schemeClr val="tx1"/>
+          </a:fontRef>
+        </p:style>
+      </p:cxnSp>
+      <p:cxnSp>
+        <p:nvCxnSpPr>
+          <p:cNvPr id="21" name="Gerade Verbindung mit Pfeil 20">
+            <a:extLst>
+              <a:ext uri="{FF2B5EF4-FFF2-40B4-BE49-F238E27FC236}">
+                <a16:creationId xmlns:a16="http://schemas.microsoft.com/office/drawing/2014/main" id="{F589597D-A6E1-5D40-A7C8-5E12CD4660C6}"/>
+              </a:ext>
+            </a:extLst>
+          </p:cNvPr>
+          <p:cNvCxnSpPr>
+            <a:cxnSpLocks/>
+          </p:cNvCxnSpPr>
+          <p:nvPr/>
+        </p:nvCxnSpPr>
+        <p:spPr>
+          <a:xfrm>
+            <a:off x="7641771" y="5950947"/>
+            <a:ext cx="3296195" cy="1"/>
+          </a:xfrm>
+          <a:prstGeom prst="straightConnector1">
+            <a:avLst/>
+          </a:prstGeom>
+          <a:ln w="19050" cap="rnd">
+            <a:solidFill>
+              <a:srgbClr val="9D9D9D"/>
+            </a:solidFill>
+            <a:tailEnd type="triangle" w="lg" len="lg"/>
+          </a:ln>
+        </p:spPr>
+        <p:style>
+          <a:lnRef idx="1">
+            <a:schemeClr val="accent1"/>
+          </a:lnRef>
+          <a:fillRef idx="0">
+            <a:schemeClr val="accent1"/>
+          </a:fillRef>
+          <a:effectRef idx="0">
+            <a:schemeClr val="accent1"/>
+          </a:effectRef>
+          <a:fontRef idx="minor">
+            <a:schemeClr val="tx1"/>
+          </a:fontRef>
+        </p:style>
+      </p:cxnSp>
+      <p:sp>
+        <p:nvSpPr>
+          <p:cNvPr id="29" name="Bogen 28">
+            <a:extLst>
+              <a:ext uri="{FF2B5EF4-FFF2-40B4-BE49-F238E27FC236}">
+                <a16:creationId xmlns:a16="http://schemas.microsoft.com/office/drawing/2014/main" id="{570F164F-CC4A-DC45-AF79-625C65ED1C21}"/>
+              </a:ext>
+            </a:extLst>
+          </p:cNvPr>
+          <p:cNvSpPr/>
+          <p:nvPr/>
+        </p:nvSpPr>
+        <p:spPr>
+          <a:xfrm rot="5400000">
+            <a:off x="5724428" y="1085691"/>
+            <a:ext cx="3476886" cy="6217170"/>
+          </a:xfrm>
+          <a:prstGeom prst="arc">
+            <a:avLst>
+              <a:gd name="adj1" fmla="val 16335700"/>
+              <a:gd name="adj2" fmla="val 21542912"/>
+            </a:avLst>
+          </a:prstGeom>
+          <a:ln>
+            <a:solidFill>
+              <a:srgbClr val="9D9D9D"/>
+            </a:solidFill>
+          </a:ln>
+        </p:spPr>
+        <p:style>
+          <a:lnRef idx="1">
+            <a:schemeClr val="accent1"/>
+          </a:lnRef>
+          <a:fillRef idx="0">
+            <a:schemeClr val="accent1"/>
+          </a:fillRef>
+          <a:effectRef idx="0">
+            <a:schemeClr val="accent1"/>
+          </a:effectRef>
+          <a:fontRef idx="minor">
+            <a:schemeClr val="tx1"/>
+          </a:fontRef>
+        </p:style>
+        <p:txBody>
+          <a:bodyPr rtlCol="0" anchor="ctr"/>
+          <a:lstStyle/>
+          <a:p>
+            <a:pPr algn="ctr"/>
+            <a:endParaRPr lang="de-DE"/>
+          </a:p>
+        </p:txBody>
+      </p:sp>
+      <p:sp>
+        <p:nvSpPr>
+          <p:cNvPr id="30" name="Textfeld 29">
+            <a:extLst>
+              <a:ext uri="{FF2B5EF4-FFF2-40B4-BE49-F238E27FC236}">
+                <a16:creationId xmlns:a16="http://schemas.microsoft.com/office/drawing/2014/main" id="{184260A8-980F-A54E-96D5-8B7EBA3473AA}"/>
+              </a:ext>
+            </a:extLst>
+          </p:cNvPr>
+          <p:cNvSpPr txBox="1"/>
+          <p:nvPr/>
+        </p:nvSpPr>
+        <p:spPr>
+          <a:xfrm>
+            <a:off x="9962605" y="6035990"/>
+            <a:ext cx="852798" cy="338554"/>
+          </a:xfrm>
+          <a:prstGeom prst="rect">
+            <a:avLst/>
+          </a:prstGeom>
+          <a:noFill/>
+        </p:spPr>
+        <p:txBody>
+          <a:bodyPr wrap="none" lIns="0" tIns="0" rIns="0" bIns="0" rtlCol="0">
+            <a:spAutoFit/>
+          </a:bodyPr>
+          <a:lstStyle/>
+          <a:p>
+            <a:r>
+              <a:rPr lang="de-DE" sz="1100" dirty="0"/>
+              <a:t>Komplexität </a:t>
+            </a:r>
+          </a:p>
+          <a:p>
+            <a:r>
+              <a:rPr lang="de-DE" sz="1100" dirty="0"/>
+              <a:t>der Realität</a:t>
+            </a:r>
+          </a:p>
+        </p:txBody>
+      </p:sp>
+      <p:sp>
+        <p:nvSpPr>
+          <p:cNvPr id="31" name="Textfeld 30">
+            <a:extLst>
+              <a:ext uri="{FF2B5EF4-FFF2-40B4-BE49-F238E27FC236}">
+                <a16:creationId xmlns:a16="http://schemas.microsoft.com/office/drawing/2014/main" id="{82ECACC3-74A0-0747-BDFB-FDD9336FFA4F}"/>
+              </a:ext>
+            </a:extLst>
+          </p:cNvPr>
+          <p:cNvSpPr txBox="1"/>
+          <p:nvPr/>
+        </p:nvSpPr>
+        <p:spPr>
+          <a:xfrm>
+            <a:off x="6626805" y="3881849"/>
+            <a:ext cx="971421" cy="507831"/>
+          </a:xfrm>
+          <a:prstGeom prst="rect">
+            <a:avLst/>
+          </a:prstGeom>
+          <a:noFill/>
+        </p:spPr>
+        <p:txBody>
+          <a:bodyPr wrap="none" lIns="0" tIns="0" rIns="0" bIns="0" rtlCol="0">
+            <a:spAutoFit/>
+          </a:bodyPr>
+          <a:lstStyle/>
+          <a:p>
+            <a:pPr algn="r"/>
+            <a:r>
+              <a:rPr lang="de-DE" sz="1100" dirty="0"/>
+              <a:t>Komplexität</a:t>
+            </a:r>
+          </a:p>
+          <a:p>
+            <a:pPr algn="r"/>
+            <a:r>
+              <a:rPr lang="de-DE" sz="1100" dirty="0"/>
+              <a:t>der Modelle /</a:t>
+            </a:r>
+          </a:p>
+          <a:p>
+            <a:pPr algn="r"/>
+            <a:r>
+              <a:rPr lang="de-DE" sz="1100" dirty="0"/>
+              <a:t>Rechenpower</a:t>
+            </a:r>
+          </a:p>
+        </p:txBody>
+      </p:sp>
+      <p:sp>
+        <p:nvSpPr>
+          <p:cNvPr id="32" name="Pfeil nach rechts 31">
+            <a:extLst>
+              <a:ext uri="{FF2B5EF4-FFF2-40B4-BE49-F238E27FC236}">
+                <a16:creationId xmlns:a16="http://schemas.microsoft.com/office/drawing/2014/main" id="{E894927F-B83D-074F-9820-ABAB3440564F}"/>
+              </a:ext>
+            </a:extLst>
+          </p:cNvPr>
+          <p:cNvSpPr/>
+          <p:nvPr/>
+        </p:nvSpPr>
+        <p:spPr>
+          <a:xfrm>
+            <a:off x="1271454" y="2553018"/>
+            <a:ext cx="217714" cy="180000"/>
+          </a:xfrm>
+          <a:prstGeom prst="rightArrow">
+            <a:avLst/>
+          </a:prstGeom>
+          <a:solidFill>
+            <a:schemeClr val="accent2"/>
+          </a:solidFill>
+          <a:ln w="9525" cmpd="sng">
+            <a:noFill/>
+          </a:ln>
+          <a:effectLst/>
+        </p:spPr>
+        <p:style>
+          <a:lnRef idx="2">
+            <a:schemeClr val="accent1">
+              <a:shade val="50000"/>
+            </a:schemeClr>
+          </a:lnRef>
+          <a:fillRef idx="1">
+            <a:schemeClr val="accent1"/>
+          </a:fillRef>
+          <a:effectRef idx="0">
+            <a:schemeClr val="accent1"/>
+          </a:effectRef>
+          <a:fontRef idx="minor">
+            <a:schemeClr val="lt1"/>
+          </a:fontRef>
+        </p:style>
+        <p:txBody>
+          <a:bodyPr lIns="72000" tIns="36000" rIns="72000" bIns="36000" rtlCol="0" anchor="ctr"/>
+          <a:lstStyle/>
+          <a:p>
+            <a:pPr algn="ctr"/>
+            <a:endParaRPr lang="de-DE" sz="1600" dirty="0" err="1">
+              <a:solidFill>
+                <a:schemeClr val="tx1"/>
+              </a:solidFill>
+            </a:endParaRPr>
+          </a:p>
+        </p:txBody>
+      </p:sp>
+      <p:sp>
+        <p:nvSpPr>
+          <p:cNvPr id="33" name="Pfeil nach rechts 32">
+            <a:extLst>
+              <a:ext uri="{FF2B5EF4-FFF2-40B4-BE49-F238E27FC236}">
+                <a16:creationId xmlns:a16="http://schemas.microsoft.com/office/drawing/2014/main" id="{5CC5886C-4326-E345-8D69-0EEC92500607}"/>
+              </a:ext>
+            </a:extLst>
+          </p:cNvPr>
+          <p:cNvSpPr/>
+          <p:nvPr/>
+        </p:nvSpPr>
+        <p:spPr>
+          <a:xfrm>
+            <a:off x="1275805" y="2923135"/>
+            <a:ext cx="217714" cy="180000"/>
+          </a:xfrm>
+          <a:prstGeom prst="rightArrow">
+            <a:avLst/>
+          </a:prstGeom>
+          <a:solidFill>
+            <a:schemeClr val="accent2"/>
+          </a:solidFill>
+          <a:ln w="9525" cmpd="sng">
+            <a:noFill/>
+          </a:ln>
+          <a:effectLst/>
+        </p:spPr>
+        <p:style>
+          <a:lnRef idx="2">
+            <a:schemeClr val="accent1">
+              <a:shade val="50000"/>
+            </a:schemeClr>
+          </a:lnRef>
+          <a:fillRef idx="1">
+            <a:schemeClr val="accent1"/>
+          </a:fillRef>
+          <a:effectRef idx="0">
+            <a:schemeClr val="accent1"/>
+          </a:effectRef>
+          <a:fontRef idx="minor">
+            <a:schemeClr val="lt1"/>
+          </a:fontRef>
+        </p:style>
+        <p:txBody>
+          <a:bodyPr lIns="72000" tIns="36000" rIns="72000" bIns="36000" rtlCol="0" anchor="ctr"/>
+          <a:lstStyle/>
+          <a:p>
+            <a:pPr algn="ctr"/>
+            <a:endParaRPr lang="de-DE" sz="1600" dirty="0" err="1">
+              <a:solidFill>
+                <a:schemeClr val="tx1"/>
+              </a:solidFill>
+            </a:endParaRPr>
+          </a:p>
+        </p:txBody>
+      </p:sp>
+    </p:spTree>
+    <p:extLst>
+      <p:ext uri="{BB962C8B-B14F-4D97-AF65-F5344CB8AC3E}">
+        <p14:creationId xmlns:p14="http://schemas.microsoft.com/office/powerpoint/2010/main" val="1041263624"/>
+      </p:ext>
+    </p:extLst>
+  </p:cSld>
+  <p:clrMapOvr>
+    <a:masterClrMapping/>
+  </p:clrMapOvr>
+</p:sld>
+</file>
+
+<file path=ppt/slides/slide17.xml><?xml version="1.0" encoding="utf-8"?>
+<p:sld xmlns:a="http://schemas.openxmlformats.org/drawingml/2006/main" xmlns:r="http://schemas.openxmlformats.org/officeDocument/2006/relationships" xmlns:p="http://schemas.openxmlformats.org/presentationml/2006/main">
+  <p:cSld>
+    <p:spTree>
+      <p:nvGrpSpPr>
+        <p:cNvPr id="1" name=""/>
+        <p:cNvGrpSpPr/>
+        <p:nvPr/>
+      </p:nvGrpSpPr>
+      <p:grpSpPr>
+        <a:xfrm>
+          <a:off x="0" y="0"/>
+          <a:ext cx="0" cy="0"/>
+          <a:chOff x="0" y="0"/>
+          <a:chExt cx="0" cy="0"/>
+        </a:xfrm>
+      </p:grpSpPr>
+      <p:sp>
+        <p:nvSpPr>
           <p:cNvPr id="2" name="Titel 1">
             <a:extLst>
               <a:ext uri="{FF2B5EF4-FFF2-40B4-BE49-F238E27FC236}">
@@ -13757,11 +14471,11 @@
           <a:p>
             <a:r>
               <a:rPr lang="de-DE" dirty="0"/>
-              <a:t>Vereinfachte </a:t>
+              <a:t>Vereinfachung der </a:t>
             </a:r>
             <a:r>
               <a:rPr lang="de-DE" dirty="0" err="1"/>
-              <a:t>Bayessche</a:t>
+              <a:t>Bayesschen</a:t>
             </a:r>
             <a:r>
               <a:rPr lang="de-DE" dirty="0"/>
@@ -13808,6 +14522,278 @@
       </p:sp>
       <p:sp>
         <p:nvSpPr>
+          <p:cNvPr id="4" name="Inhaltsplatzhalter 3">
+            <a:extLst>
+              <a:ext uri="{FF2B5EF4-FFF2-40B4-BE49-F238E27FC236}">
+                <a16:creationId xmlns:a16="http://schemas.microsoft.com/office/drawing/2014/main" id="{A4B34630-D0E0-7142-AC30-83610F2FA95E}"/>
+              </a:ext>
+            </a:extLst>
+          </p:cNvPr>
+          <p:cNvSpPr>
+            <a:spLocks noGrp="1"/>
+          </p:cNvSpPr>
+          <p:nvPr>
+            <p:ph idx="1"/>
+          </p:nvPr>
+        </p:nvSpPr>
+        <p:spPr>
+          <a:xfrm>
+            <a:off x="6331131" y="2027562"/>
+            <a:ext cx="5212794" cy="3223714"/>
+          </a:xfrm>
+        </p:spPr>
+        <p:txBody>
+          <a:bodyPr/>
+          <a:lstStyle/>
+          <a:p>
+            <a:r>
+              <a:rPr lang="de-DE" dirty="0"/>
+              <a:t>Leicht zu bedienende API</a:t>
+            </a:r>
+          </a:p>
+          <a:p>
+            <a:pPr lvl="1"/>
+            <a:r>
+              <a:rPr lang="de-DE" dirty="0"/>
+              <a:t>Beliebige Verteilungen kombinieren</a:t>
+            </a:r>
+          </a:p>
+          <a:p>
+            <a:pPr lvl="1"/>
+            <a:r>
+              <a:rPr lang="de-DE" dirty="0"/>
+              <a:t>Intuitive Modellspezifikation</a:t>
+            </a:r>
+          </a:p>
+          <a:p>
+            <a:pPr lvl="1"/>
+            <a:endParaRPr lang="de-DE" dirty="0"/>
+          </a:p>
+          <a:p>
+            <a:pPr lvl="1"/>
+            <a:endParaRPr lang="de-DE" dirty="0"/>
+          </a:p>
+          <a:p>
+            <a:r>
+              <a:rPr lang="de-DE" dirty="0"/>
+              <a:t>Starkes Backend für numerische Berechnung</a:t>
+            </a:r>
+          </a:p>
+          <a:p>
+            <a:pPr lvl="1"/>
+            <a:r>
+              <a:rPr lang="de-DE" dirty="0"/>
+              <a:t>MCMC und </a:t>
+            </a:r>
+            <a:r>
+              <a:rPr lang="de-DE" dirty="0" err="1"/>
+              <a:t>Variational</a:t>
+            </a:r>
+            <a:r>
+              <a:rPr lang="de-DE" dirty="0"/>
+              <a:t> Inferenz Algorithmen</a:t>
+            </a:r>
+          </a:p>
+          <a:p>
+            <a:pPr lvl="1"/>
+            <a:r>
+              <a:rPr lang="de-DE" dirty="0"/>
+              <a:t>Automatische </a:t>
+            </a:r>
+            <a:r>
+              <a:rPr lang="de-DE" dirty="0" err="1"/>
+              <a:t>Algorithmenauswahl</a:t>
+            </a:r>
+            <a:endParaRPr lang="de-DE" dirty="0"/>
+          </a:p>
+          <a:p>
+            <a:pPr lvl="1"/>
+            <a:r>
+              <a:rPr lang="de-DE" dirty="0"/>
+              <a:t>Verwendet Theano (</a:t>
+            </a:r>
+            <a:r>
+              <a:rPr lang="de-DE" dirty="0" err="1"/>
+              <a:t>Deep</a:t>
+            </a:r>
+            <a:r>
+              <a:rPr lang="de-DE" dirty="0"/>
+              <a:t> Learning Library)</a:t>
+            </a:r>
+          </a:p>
+        </p:txBody>
+      </p:sp>
+      <p:pic>
+        <p:nvPicPr>
+          <p:cNvPr id="5124" name="Picture 4">
+            <a:extLst>
+              <a:ext uri="{FF2B5EF4-FFF2-40B4-BE49-F238E27FC236}">
+                <a16:creationId xmlns:a16="http://schemas.microsoft.com/office/drawing/2014/main" id="{4E7D24D5-7406-3441-951A-978D833A30AE}"/>
+              </a:ext>
+            </a:extLst>
+          </p:cNvPr>
+          <p:cNvPicPr>
+            <a:picLocks noChangeAspect="1" noChangeArrowheads="1"/>
+          </p:cNvPicPr>
+          <p:nvPr/>
+        </p:nvPicPr>
+        <p:blipFill rotWithShape="1">
+          <a:blip r:embed="rId2">
+            <a:extLst>
+              <a:ext uri="{28A0092B-C50C-407E-A947-70E740481C1C}">
+                <a14:useLocalDpi xmlns:a14="http://schemas.microsoft.com/office/drawing/2010/main" val="0"/>
+              </a:ext>
+            </a:extLst>
+          </a:blip>
+          <a:srcRect t="21385" b="20937"/>
+          <a:stretch/>
+        </p:blipFill>
+        <p:spPr bwMode="auto">
+          <a:xfrm>
+            <a:off x="1629921" y="2802876"/>
+            <a:ext cx="3868305" cy="1252247"/>
+          </a:xfrm>
+          <a:prstGeom prst="rect">
+            <a:avLst/>
+          </a:prstGeom>
+          <a:noFill/>
+          <a:extLst>
+            <a:ext uri="{909E8E84-426E-40DD-AFC4-6F175D3DCCD1}">
+              <a14:hiddenFill xmlns:a14="http://schemas.microsoft.com/office/drawing/2010/main">
+                <a:solidFill>
+                  <a:srgbClr val="FFFFFF"/>
+                </a:solidFill>
+              </a14:hiddenFill>
+            </a:ext>
+          </a:extLst>
+        </p:spPr>
+      </p:pic>
+      <p:pic>
+        <p:nvPicPr>
+          <p:cNvPr id="8" name="Grafik 7">
+            <a:extLst>
+              <a:ext uri="{FF2B5EF4-FFF2-40B4-BE49-F238E27FC236}">
+                <a16:creationId xmlns:a16="http://schemas.microsoft.com/office/drawing/2014/main" id="{39634C9B-84C2-7245-B0E2-3C2EAD334EEE}"/>
+              </a:ext>
+            </a:extLst>
+          </p:cNvPr>
+          <p:cNvPicPr>
+            <a:picLocks noChangeAspect="1"/>
+          </p:cNvPicPr>
+          <p:nvPr/>
+        </p:nvPicPr>
+        <p:blipFill>
+          <a:blip r:embed="rId3"/>
+          <a:stretch>
+            <a:fillRect/>
+          </a:stretch>
+        </p:blipFill>
+        <p:spPr>
+          <a:xfrm>
+            <a:off x="6865624" y="3117211"/>
+            <a:ext cx="3062152" cy="231981"/>
+          </a:xfrm>
+          <a:prstGeom prst="rect">
+            <a:avLst/>
+          </a:prstGeom>
+        </p:spPr>
+      </p:pic>
+    </p:spTree>
+    <p:extLst>
+      <p:ext uri="{BB962C8B-B14F-4D97-AF65-F5344CB8AC3E}">
+        <p14:creationId xmlns:p14="http://schemas.microsoft.com/office/powerpoint/2010/main" val="3615340021"/>
+      </p:ext>
+    </p:extLst>
+  </p:cSld>
+  <p:clrMapOvr>
+    <a:masterClrMapping/>
+  </p:clrMapOvr>
+</p:sld>
+</file>
+
+<file path=ppt/slides/slide18.xml><?xml version="1.0" encoding="utf-8"?>
+<p:sld xmlns:a="http://schemas.openxmlformats.org/drawingml/2006/main" xmlns:r="http://schemas.openxmlformats.org/officeDocument/2006/relationships" xmlns:p="http://schemas.openxmlformats.org/presentationml/2006/main">
+  <p:cSld>
+    <p:spTree>
+      <p:nvGrpSpPr>
+        <p:cNvPr id="1" name=""/>
+        <p:cNvGrpSpPr/>
+        <p:nvPr/>
+      </p:nvGrpSpPr>
+      <p:grpSpPr>
+        <a:xfrm>
+          <a:off x="0" y="0"/>
+          <a:ext cx="0" cy="0"/>
+          <a:chOff x="0" y="0"/>
+          <a:chExt cx="0" cy="0"/>
+        </a:xfrm>
+      </p:grpSpPr>
+      <p:sp>
+        <p:nvSpPr>
+          <p:cNvPr id="2" name="Titel 1">
+            <a:extLst>
+              <a:ext uri="{FF2B5EF4-FFF2-40B4-BE49-F238E27FC236}">
+                <a16:creationId xmlns:a16="http://schemas.microsoft.com/office/drawing/2014/main" id="{03DBBCB8-1F6C-7942-A981-8DEA73B5852C}"/>
+              </a:ext>
+            </a:extLst>
+          </p:cNvPr>
+          <p:cNvSpPr>
+            <a:spLocks noGrp="1"/>
+          </p:cNvSpPr>
+          <p:nvPr>
+            <p:ph type="title"/>
+          </p:nvPr>
+        </p:nvSpPr>
+        <p:spPr/>
+        <p:txBody>
+          <a:bodyPr/>
+          <a:lstStyle/>
+          <a:p>
+            <a:r>
+              <a:rPr lang="de-DE" dirty="0"/>
+              <a:t>Grundlegendes Prinzip: Trennung von Modell und Inferenz</a:t>
+            </a:r>
+          </a:p>
+        </p:txBody>
+      </p:sp>
+      <p:sp>
+        <p:nvSpPr>
+          <p:cNvPr id="3" name="Textplatzhalter 2">
+            <a:extLst>
+              <a:ext uri="{FF2B5EF4-FFF2-40B4-BE49-F238E27FC236}">
+                <a16:creationId xmlns:a16="http://schemas.microsoft.com/office/drawing/2014/main" id="{8532677F-5C69-3540-A7DA-109CC2F2A888}"/>
+              </a:ext>
+            </a:extLst>
+          </p:cNvPr>
+          <p:cNvSpPr>
+            <a:spLocks noGrp="1"/>
+          </p:cNvSpPr>
+          <p:nvPr>
+            <p:ph type="body" sz="quarter" idx="10"/>
+          </p:nvPr>
+        </p:nvSpPr>
+        <p:spPr/>
+        <p:txBody>
+          <a:bodyPr/>
+          <a:lstStyle/>
+          <a:p>
+            <a:r>
+              <a:rPr lang="de-DE" dirty="0"/>
+              <a:t>Pymc3 – Ein </a:t>
+            </a:r>
+            <a:r>
+              <a:rPr lang="de-DE" dirty="0" err="1"/>
+              <a:t>probabilistisches</a:t>
+            </a:r>
+            <a:r>
+              <a:rPr lang="de-DE" dirty="0"/>
+              <a:t> Programmierframework</a:t>
+            </a:r>
+          </a:p>
+        </p:txBody>
+      </p:sp>
+      <p:sp>
+        <p:nvSpPr>
           <p:cNvPr id="6" name="Oval 5">
             <a:extLst>
               <a:ext uri="{FF2B5EF4-FFF2-40B4-BE49-F238E27FC236}">
@@ -13820,7 +14806,7 @@
         </p:nvSpPr>
         <p:spPr>
           <a:xfrm>
-            <a:off x="1717133" y="4126387"/>
+            <a:off x="1880275" y="3640756"/>
             <a:ext cx="1440000" cy="1440000"/>
           </a:xfrm>
           <a:prstGeom prst="ellipse">
@@ -13877,7 +14863,7 @@
         </p:nvSpPr>
         <p:spPr>
           <a:xfrm>
-            <a:off x="1814051" y="4599315"/>
+            <a:off x="1977193" y="4113684"/>
             <a:ext cx="1277594" cy="492443"/>
           </a:xfrm>
           <a:prstGeom prst="rect">
@@ -13928,7 +14914,7 @@
         </p:nvSpPr>
         <p:spPr>
           <a:xfrm>
-            <a:off x="5197156" y="4126387"/>
+            <a:off x="5360298" y="3640756"/>
             <a:ext cx="1440000" cy="1440000"/>
           </a:xfrm>
           <a:prstGeom prst="ellipse">
@@ -13985,8 +14971,8 @@
         </p:nvSpPr>
         <p:spPr>
           <a:xfrm>
-            <a:off x="5349051" y="4613170"/>
-            <a:ext cx="1114087" cy="492443"/>
+            <a:off x="5530308" y="4127539"/>
+            <a:ext cx="1106072" cy="492443"/>
           </a:xfrm>
           <a:prstGeom prst="rect">
             <a:avLst/>
@@ -14006,7 +14992,18 @@
                   <a:schemeClr val="accent3"/>
                 </a:solidFill>
               </a:rPr>
-              <a:t>„</a:t>
+              <a:t>Sampling</a:t>
+            </a:r>
+          </a:p>
+          <a:p>
+            <a:pPr algn="ctr"/>
+            <a:r>
+              <a:rPr lang="de-DE" sz="1600" dirty="0">
+                <a:solidFill>
+                  <a:schemeClr val="accent3"/>
+                </a:solidFill>
+              </a:rPr>
+              <a:t>(</a:t>
             </a:r>
             <a:r>
               <a:rPr lang="de-DE" sz="1600" dirty="0" err="1">
@@ -14022,348 +15019,7 @@
                   <a:schemeClr val="accent3"/>
                 </a:solidFill>
               </a:rPr>
-              <a:t> </a:t>
-            </a:r>
-            <a:br>
-              <a:rPr lang="de-DE" sz="1600" dirty="0">
-                <a:solidFill>
-                  <a:schemeClr val="accent3"/>
-                </a:solidFill>
-              </a:rPr>
-            </a:br>
-            <a:r>
-              <a:rPr lang="de-DE" sz="1600" dirty="0">
-                <a:solidFill>
-                  <a:schemeClr val="accent3"/>
-                </a:solidFill>
-              </a:rPr>
-              <a:t>Button“</a:t>
-            </a:r>
-          </a:p>
-        </p:txBody>
-      </p:sp>
-      <p:sp>
-        <p:nvSpPr>
-          <p:cNvPr id="12" name="Oval 11">
-            <a:extLst>
-              <a:ext uri="{FF2B5EF4-FFF2-40B4-BE49-F238E27FC236}">
-                <a16:creationId xmlns:a16="http://schemas.microsoft.com/office/drawing/2014/main" id="{3FEC4E61-D8D0-C245-8A8C-5AC2A86C674F}"/>
-              </a:ext>
-            </a:extLst>
-          </p:cNvPr>
-          <p:cNvSpPr/>
-          <p:nvPr/>
-        </p:nvSpPr>
-        <p:spPr>
-          <a:xfrm>
-            <a:off x="8845475" y="3353022"/>
-            <a:ext cx="900000" cy="900000"/>
-          </a:xfrm>
-          <a:prstGeom prst="ellipse">
-            <a:avLst/>
-          </a:prstGeom>
-          <a:noFill/>
-          <a:ln w="19050" cmpd="sng">
-            <a:solidFill>
-              <a:schemeClr val="accent4"/>
-            </a:solidFill>
-          </a:ln>
-          <a:effectLst/>
-        </p:spPr>
-        <p:style>
-          <a:lnRef idx="2">
-            <a:schemeClr val="accent1">
-              <a:shade val="50000"/>
-            </a:schemeClr>
-          </a:lnRef>
-          <a:fillRef idx="1">
-            <a:schemeClr val="accent1"/>
-          </a:fillRef>
-          <a:effectRef idx="0">
-            <a:schemeClr val="accent1"/>
-          </a:effectRef>
-          <a:fontRef idx="minor">
-            <a:schemeClr val="lt1"/>
-          </a:fontRef>
-        </p:style>
-        <p:txBody>
-          <a:bodyPr lIns="72000" tIns="36000" rIns="72000" bIns="36000" rtlCol="0" anchor="ctr"/>
-          <a:lstStyle/>
-          <a:p>
-            <a:pPr algn="ctr"/>
-            <a:endParaRPr lang="de-DE" sz="1600" dirty="0">
-              <a:solidFill>
-                <a:schemeClr val="tx1"/>
-              </a:solidFill>
-            </a:endParaRPr>
-          </a:p>
-        </p:txBody>
-      </p:sp>
-      <p:sp>
-        <p:nvSpPr>
-          <p:cNvPr id="13" name="Textfeld 12">
-            <a:extLst>
-              <a:ext uri="{FF2B5EF4-FFF2-40B4-BE49-F238E27FC236}">
-                <a16:creationId xmlns:a16="http://schemas.microsoft.com/office/drawing/2014/main" id="{775B837C-6AAC-C24E-B4A5-14B4D624AA84}"/>
-              </a:ext>
-            </a:extLst>
-          </p:cNvPr>
-          <p:cNvSpPr txBox="1"/>
-          <p:nvPr/>
-        </p:nvSpPr>
-        <p:spPr>
-          <a:xfrm>
-            <a:off x="8891749" y="3624492"/>
-            <a:ext cx="835165" cy="369332"/>
-          </a:xfrm>
-          <a:prstGeom prst="rect">
-            <a:avLst/>
-          </a:prstGeom>
-          <a:noFill/>
-        </p:spPr>
-        <p:txBody>
-          <a:bodyPr wrap="none" lIns="0" tIns="0" rIns="0" bIns="0" rtlCol="0">
-            <a:spAutoFit/>
-          </a:bodyPr>
-          <a:lstStyle/>
-          <a:p>
-            <a:pPr algn="ctr"/>
-            <a:r>
-              <a:rPr lang="de-DE" sz="1200" dirty="0">
-                <a:solidFill>
-                  <a:schemeClr val="accent4"/>
-                </a:solidFill>
-              </a:rPr>
-              <a:t>Parameter </a:t>
-            </a:r>
-          </a:p>
-          <a:p>
-            <a:pPr algn="ctr"/>
-            <a:r>
-              <a:rPr lang="de-DE" sz="1200" dirty="0">
-                <a:solidFill>
-                  <a:schemeClr val="accent4"/>
-                </a:solidFill>
-              </a:rPr>
-              <a:t>Inferenz</a:t>
-            </a:r>
-          </a:p>
-        </p:txBody>
-      </p:sp>
-      <p:sp>
-        <p:nvSpPr>
-          <p:cNvPr id="16" name="Oval 15">
-            <a:extLst>
-              <a:ext uri="{FF2B5EF4-FFF2-40B4-BE49-F238E27FC236}">
-                <a16:creationId xmlns:a16="http://schemas.microsoft.com/office/drawing/2014/main" id="{036AF5E6-461B-6146-AD67-D37591281FDA}"/>
-              </a:ext>
-            </a:extLst>
-          </p:cNvPr>
-          <p:cNvSpPr/>
-          <p:nvPr/>
-        </p:nvSpPr>
-        <p:spPr>
-          <a:xfrm>
-            <a:off x="8845475" y="4407789"/>
-            <a:ext cx="900000" cy="900000"/>
-          </a:xfrm>
-          <a:prstGeom prst="ellipse">
-            <a:avLst/>
-          </a:prstGeom>
-          <a:noFill/>
-          <a:ln w="19050" cmpd="sng">
-            <a:solidFill>
-              <a:schemeClr val="accent4"/>
-            </a:solidFill>
-          </a:ln>
-          <a:effectLst/>
-        </p:spPr>
-        <p:style>
-          <a:lnRef idx="2">
-            <a:schemeClr val="accent1">
-              <a:shade val="50000"/>
-            </a:schemeClr>
-          </a:lnRef>
-          <a:fillRef idx="1">
-            <a:schemeClr val="accent1"/>
-          </a:fillRef>
-          <a:effectRef idx="0">
-            <a:schemeClr val="accent1"/>
-          </a:effectRef>
-          <a:fontRef idx="minor">
-            <a:schemeClr val="lt1"/>
-          </a:fontRef>
-        </p:style>
-        <p:txBody>
-          <a:bodyPr lIns="72000" tIns="36000" rIns="72000" bIns="36000" rtlCol="0" anchor="ctr"/>
-          <a:lstStyle/>
-          <a:p>
-            <a:pPr algn="ctr"/>
-            <a:endParaRPr lang="de-DE" sz="1600" dirty="0">
-              <a:solidFill>
-                <a:schemeClr val="tx1"/>
-              </a:solidFill>
-            </a:endParaRPr>
-          </a:p>
-        </p:txBody>
-      </p:sp>
-      <p:sp>
-        <p:nvSpPr>
-          <p:cNvPr id="17" name="Textfeld 16">
-            <a:extLst>
-              <a:ext uri="{FF2B5EF4-FFF2-40B4-BE49-F238E27FC236}">
-                <a16:creationId xmlns:a16="http://schemas.microsoft.com/office/drawing/2014/main" id="{AE7B4E65-55EB-694C-ADE9-1A383DC3AFCA}"/>
-              </a:ext>
-            </a:extLst>
-          </p:cNvPr>
-          <p:cNvSpPr txBox="1"/>
-          <p:nvPr/>
-        </p:nvSpPr>
-        <p:spPr>
-          <a:xfrm>
-            <a:off x="8889372" y="4639626"/>
-            <a:ext cx="811119" cy="369332"/>
-          </a:xfrm>
-          <a:prstGeom prst="rect">
-            <a:avLst/>
-          </a:prstGeom>
-          <a:noFill/>
-        </p:spPr>
-        <p:txBody>
-          <a:bodyPr wrap="none" lIns="0" tIns="0" rIns="0" bIns="0" rtlCol="0">
-            <a:spAutoFit/>
-          </a:bodyPr>
-          <a:lstStyle/>
-          <a:p>
-            <a:pPr algn="ctr"/>
-            <a:r>
-              <a:rPr lang="de-DE" sz="1200" dirty="0" err="1">
-                <a:solidFill>
-                  <a:schemeClr val="accent4"/>
-                </a:solidFill>
-              </a:rPr>
-              <a:t>Posterior</a:t>
-            </a:r>
-            <a:r>
-              <a:rPr lang="de-DE" sz="1200" dirty="0">
-                <a:solidFill>
-                  <a:schemeClr val="accent4"/>
-                </a:solidFill>
-              </a:rPr>
-              <a:t> </a:t>
-            </a:r>
-          </a:p>
-          <a:p>
-            <a:pPr algn="ctr"/>
-            <a:r>
-              <a:rPr lang="de-DE" sz="1200" dirty="0" err="1">
-                <a:solidFill>
-                  <a:schemeClr val="accent4"/>
-                </a:solidFill>
-              </a:rPr>
-              <a:t>Predictions</a:t>
-            </a:r>
-            <a:endParaRPr lang="de-DE" sz="1200" dirty="0">
-              <a:solidFill>
-                <a:schemeClr val="accent4"/>
-              </a:solidFill>
-            </a:endParaRPr>
-          </a:p>
-        </p:txBody>
-      </p:sp>
-      <p:sp>
-        <p:nvSpPr>
-          <p:cNvPr id="18" name="Oval 17">
-            <a:extLst>
-              <a:ext uri="{FF2B5EF4-FFF2-40B4-BE49-F238E27FC236}">
-                <a16:creationId xmlns:a16="http://schemas.microsoft.com/office/drawing/2014/main" id="{734F364F-174C-8544-AEF7-6F20644E7369}"/>
-              </a:ext>
-            </a:extLst>
-          </p:cNvPr>
-          <p:cNvSpPr/>
-          <p:nvPr/>
-        </p:nvSpPr>
-        <p:spPr>
-          <a:xfrm>
-            <a:off x="8832294" y="5462556"/>
-            <a:ext cx="900000" cy="900000"/>
-          </a:xfrm>
-          <a:prstGeom prst="ellipse">
-            <a:avLst/>
-          </a:prstGeom>
-          <a:noFill/>
-          <a:ln w="19050" cmpd="sng">
-            <a:solidFill>
-              <a:schemeClr val="accent4"/>
-            </a:solidFill>
-          </a:ln>
-          <a:effectLst/>
-        </p:spPr>
-        <p:style>
-          <a:lnRef idx="2">
-            <a:schemeClr val="accent1">
-              <a:shade val="50000"/>
-            </a:schemeClr>
-          </a:lnRef>
-          <a:fillRef idx="1">
-            <a:schemeClr val="accent1"/>
-          </a:fillRef>
-          <a:effectRef idx="0">
-            <a:schemeClr val="accent1"/>
-          </a:effectRef>
-          <a:fontRef idx="minor">
-            <a:schemeClr val="lt1"/>
-          </a:fontRef>
-        </p:style>
-        <p:txBody>
-          <a:bodyPr lIns="72000" tIns="36000" rIns="72000" bIns="36000" rtlCol="0" anchor="ctr"/>
-          <a:lstStyle/>
-          <a:p>
-            <a:pPr algn="ctr"/>
-            <a:endParaRPr lang="de-DE" sz="1600" dirty="0">
-              <a:solidFill>
-                <a:schemeClr val="tx1"/>
-              </a:solidFill>
-            </a:endParaRPr>
-          </a:p>
-        </p:txBody>
-      </p:sp>
-      <p:sp>
-        <p:nvSpPr>
-          <p:cNvPr id="19" name="Textfeld 18">
-            <a:extLst>
-              <a:ext uri="{FF2B5EF4-FFF2-40B4-BE49-F238E27FC236}">
-                <a16:creationId xmlns:a16="http://schemas.microsoft.com/office/drawing/2014/main" id="{D6B32CE9-0285-164D-A655-96F6E067F3A3}"/>
-              </a:ext>
-            </a:extLst>
-          </p:cNvPr>
-          <p:cNvSpPr txBox="1"/>
-          <p:nvPr/>
-        </p:nvSpPr>
-        <p:spPr>
-          <a:xfrm>
-            <a:off x="9192527" y="5789445"/>
-            <a:ext cx="179537" cy="215444"/>
-          </a:xfrm>
-          <a:prstGeom prst="rect">
-            <a:avLst/>
-          </a:prstGeom>
-          <a:noFill/>
-        </p:spPr>
-        <p:txBody>
-          <a:bodyPr wrap="none" lIns="0" tIns="0" rIns="0" bIns="0" rtlCol="0">
-            <a:spAutoFit/>
-          </a:bodyPr>
-          <a:lstStyle/>
-          <a:p>
-            <a:pPr algn="ctr"/>
-            <a:r>
-              <a:rPr lang="de-DE" sz="1400" dirty="0">
-                <a:solidFill>
-                  <a:schemeClr val="accent4"/>
-                </a:solidFill>
-              </a:rPr>
-              <a:t>…</a:t>
+              <a:t>)</a:t>
             </a:r>
           </a:p>
         </p:txBody>
@@ -14386,102 +15042,10 @@
         </p:nvCxnSpPr>
         <p:spPr>
           <a:xfrm>
-            <a:off x="3157133" y="4846387"/>
+            <a:off x="3320275" y="4360756"/>
             <a:ext cx="2040023" cy="0"/>
           </a:xfrm>
           <a:prstGeom prst="straightConnector1">
-            <a:avLst/>
-          </a:prstGeom>
-          <a:ln w="19050">
-            <a:solidFill>
-              <a:srgbClr val="9D9D9D"/>
-            </a:solidFill>
-            <a:tailEnd type="triangle"/>
-          </a:ln>
-        </p:spPr>
-        <p:style>
-          <a:lnRef idx="1">
-            <a:schemeClr val="accent1"/>
-          </a:lnRef>
-          <a:fillRef idx="0">
-            <a:schemeClr val="accent1"/>
-          </a:fillRef>
-          <a:effectRef idx="0">
-            <a:schemeClr val="accent1"/>
-          </a:effectRef>
-          <a:fontRef idx="minor">
-            <a:schemeClr val="tx1"/>
-          </a:fontRef>
-        </p:style>
-      </p:cxnSp>
-      <p:cxnSp>
-        <p:nvCxnSpPr>
-          <p:cNvPr id="24" name="Gekrümmte Verbindung 23">
-            <a:extLst>
-              <a:ext uri="{FF2B5EF4-FFF2-40B4-BE49-F238E27FC236}">
-                <a16:creationId xmlns:a16="http://schemas.microsoft.com/office/drawing/2014/main" id="{CFE6B074-5371-7F41-BFF0-157E18C97E3C}"/>
-              </a:ext>
-            </a:extLst>
-          </p:cNvPr>
-          <p:cNvCxnSpPr>
-            <a:cxnSpLocks/>
-            <a:stCxn id="9" idx="7"/>
-            <a:endCxn id="12" idx="2"/>
-          </p:cNvCxnSpPr>
-          <p:nvPr/>
-        </p:nvCxnSpPr>
-        <p:spPr>
-          <a:xfrm rot="5400000" flipH="1" flipV="1">
-            <a:off x="7368750" y="2860545"/>
-            <a:ext cx="534248" cy="2419202"/>
-          </a:xfrm>
-          <a:prstGeom prst="curvedConnector2">
-            <a:avLst/>
-          </a:prstGeom>
-          <a:ln w="19050">
-            <a:solidFill>
-              <a:srgbClr val="9D9D9D"/>
-            </a:solidFill>
-            <a:tailEnd type="triangle"/>
-          </a:ln>
-        </p:spPr>
-        <p:style>
-          <a:lnRef idx="1">
-            <a:schemeClr val="accent1"/>
-          </a:lnRef>
-          <a:fillRef idx="0">
-            <a:schemeClr val="accent1"/>
-          </a:fillRef>
-          <a:effectRef idx="0">
-            <a:schemeClr val="accent1"/>
-          </a:effectRef>
-          <a:fontRef idx="minor">
-            <a:schemeClr val="tx1"/>
-          </a:fontRef>
-        </p:style>
-      </p:cxnSp>
-      <p:cxnSp>
-        <p:nvCxnSpPr>
-          <p:cNvPr id="26" name="Gekrümmte Verbindung 25">
-            <a:extLst>
-              <a:ext uri="{FF2B5EF4-FFF2-40B4-BE49-F238E27FC236}">
-                <a16:creationId xmlns:a16="http://schemas.microsoft.com/office/drawing/2014/main" id="{3667F2E1-BF64-6541-B029-17DBB05F04B9}"/>
-              </a:ext>
-            </a:extLst>
-          </p:cNvPr>
-          <p:cNvCxnSpPr>
-            <a:cxnSpLocks/>
-            <a:stCxn id="9" idx="5"/>
-            <a:endCxn id="18" idx="2"/>
-          </p:cNvCxnSpPr>
-          <p:nvPr/>
-        </p:nvCxnSpPr>
-        <p:spPr>
-          <a:xfrm rot="16200000" flipH="1">
-            <a:off x="7350757" y="4431019"/>
-            <a:ext cx="557052" cy="2406021"/>
-          </a:xfrm>
-          <a:prstGeom prst="curvedConnector2">
             <a:avLst/>
           </a:prstGeom>
           <a:ln w="19050">
@@ -14518,14 +15082,14 @@
           <p:cNvCxnSpPr>
             <a:cxnSpLocks/>
             <a:stCxn id="9" idx="6"/>
-            <a:endCxn id="16" idx="2"/>
+            <a:endCxn id="25" idx="2"/>
           </p:cNvCxnSpPr>
           <p:nvPr/>
         </p:nvCxnSpPr>
         <p:spPr>
           <a:xfrm>
-            <a:off x="6637156" y="4846387"/>
-            <a:ext cx="2208319" cy="11402"/>
+            <a:off x="6800298" y="4360756"/>
+            <a:ext cx="2040023" cy="0"/>
           </a:xfrm>
           <a:prstGeom prst="straightConnector1">
             <a:avLst/>
@@ -14566,7 +15130,7 @@
         </p:nvSpPr>
         <p:spPr>
           <a:xfrm>
-            <a:off x="969815" y="2576961"/>
+            <a:off x="1132957" y="2091330"/>
             <a:ext cx="3061855" cy="533534"/>
           </a:xfrm>
           <a:prstGeom prst="chevron">
@@ -14626,7 +15190,7 @@
         </p:nvSpPr>
         <p:spPr>
           <a:xfrm>
-            <a:off x="4401930" y="2576961"/>
+            <a:off x="4565072" y="2091330"/>
             <a:ext cx="3061855" cy="533534"/>
           </a:xfrm>
           <a:prstGeom prst="chevron">
@@ -14674,10 +15238,10 @@
       </p:sp>
       <p:sp>
         <p:nvSpPr>
-          <p:cNvPr id="29" name="Eingebuchteter Richtungspfeil 28">
+          <p:cNvPr id="25" name="Oval 24">
             <a:extLst>
               <a:ext uri="{FF2B5EF4-FFF2-40B4-BE49-F238E27FC236}">
-                <a16:creationId xmlns:a16="http://schemas.microsoft.com/office/drawing/2014/main" id="{25697061-026F-7346-A7BC-CD0E96F35328}"/>
+                <a16:creationId xmlns:a16="http://schemas.microsoft.com/office/drawing/2014/main" id="{623B5F29-868C-174B-A3B1-72111F72EF88}"/>
               </a:ext>
             </a:extLst>
           </p:cNvPr>
@@ -14686,17 +15250,17 @@
         </p:nvSpPr>
         <p:spPr>
           <a:xfrm>
-            <a:off x="7769946" y="2576961"/>
-            <a:ext cx="3061855" cy="533534"/>
+            <a:off x="8840321" y="3640756"/>
+            <a:ext cx="1440000" cy="1440000"/>
           </a:xfrm>
-          <a:prstGeom prst="chevron">
+          <a:prstGeom prst="ellipse">
             <a:avLst/>
           </a:prstGeom>
-          <a:solidFill>
-            <a:schemeClr val="accent4"/>
-          </a:solidFill>
-          <a:ln w="9525" cmpd="sng">
-            <a:noFill/>
+          <a:noFill/>
+          <a:ln w="19050" cmpd="sng">
+            <a:solidFill>
+              <a:schemeClr val="accent5"/>
+            </a:solidFill>
           </a:ln>
           <a:effectLst/>
         </p:spPr>
@@ -14721,6 +15285,119 @@
           <a:lstStyle/>
           <a:p>
             <a:pPr algn="ctr"/>
+            <a:endParaRPr lang="de-DE" sz="1600" dirty="0">
+              <a:solidFill>
+                <a:schemeClr val="bg1"/>
+              </a:solidFill>
+            </a:endParaRPr>
+          </a:p>
+        </p:txBody>
+      </p:sp>
+      <p:sp>
+        <p:nvSpPr>
+          <p:cNvPr id="30" name="Textfeld 29">
+            <a:extLst>
+              <a:ext uri="{FF2B5EF4-FFF2-40B4-BE49-F238E27FC236}">
+                <a16:creationId xmlns:a16="http://schemas.microsoft.com/office/drawing/2014/main" id="{2EEF1DA7-FAA3-8C48-9E0E-45D9799AD808}"/>
+              </a:ext>
+            </a:extLst>
+          </p:cNvPr>
+          <p:cNvSpPr txBox="1"/>
+          <p:nvPr/>
+        </p:nvSpPr>
+        <p:spPr>
+          <a:xfrm>
+            <a:off x="9008250" y="4127539"/>
+            <a:ext cx="1082026" cy="492443"/>
+          </a:xfrm>
+          <a:prstGeom prst="rect">
+            <a:avLst/>
+          </a:prstGeom>
+          <a:noFill/>
+        </p:spPr>
+        <p:txBody>
+          <a:bodyPr wrap="none" lIns="0" tIns="0" rIns="0" bIns="0" rtlCol="0">
+            <a:spAutoFit/>
+          </a:bodyPr>
+          <a:lstStyle/>
+          <a:p>
+            <a:pPr algn="ctr"/>
+            <a:r>
+              <a:rPr lang="de-DE" sz="1600" dirty="0" err="1">
+                <a:solidFill>
+                  <a:schemeClr val="accent5"/>
+                </a:solidFill>
+              </a:rPr>
+              <a:t>Posterior</a:t>
+            </a:r>
+            <a:r>
+              <a:rPr lang="de-DE" sz="1600" dirty="0">
+                <a:solidFill>
+                  <a:schemeClr val="accent5"/>
+                </a:solidFill>
+              </a:rPr>
+              <a:t> </a:t>
+            </a:r>
+          </a:p>
+          <a:p>
+            <a:pPr algn="ctr"/>
+            <a:r>
+              <a:rPr lang="de-DE" sz="1600" dirty="0">
+                <a:solidFill>
+                  <a:schemeClr val="accent5"/>
+                </a:solidFill>
+              </a:rPr>
+              <a:t>Distribution</a:t>
+            </a:r>
+          </a:p>
+        </p:txBody>
+      </p:sp>
+      <p:sp>
+        <p:nvSpPr>
+          <p:cNvPr id="34" name="Eingebuchteter Richtungspfeil 33">
+            <a:extLst>
+              <a:ext uri="{FF2B5EF4-FFF2-40B4-BE49-F238E27FC236}">
+                <a16:creationId xmlns:a16="http://schemas.microsoft.com/office/drawing/2014/main" id="{6F05E0D9-EB32-324C-B4EE-C893156FF7ED}"/>
+              </a:ext>
+            </a:extLst>
+          </p:cNvPr>
+          <p:cNvSpPr/>
+          <p:nvPr/>
+        </p:nvSpPr>
+        <p:spPr>
+          <a:xfrm>
+            <a:off x="7997187" y="2087756"/>
+            <a:ext cx="3061855" cy="533534"/>
+          </a:xfrm>
+          <a:prstGeom prst="chevron">
+            <a:avLst/>
+          </a:prstGeom>
+          <a:solidFill>
+            <a:schemeClr val="accent5"/>
+          </a:solidFill>
+          <a:ln>
+            <a:noFill/>
+          </a:ln>
+        </p:spPr>
+        <p:style>
+          <a:lnRef idx="0">
+            <a:scrgbClr r="0" g="0" b="0"/>
+          </a:lnRef>
+          <a:fillRef idx="0">
+            <a:scrgbClr r="0" g="0" b="0"/>
+          </a:fillRef>
+          <a:effectRef idx="0">
+            <a:scrgbClr r="0" g="0" b="0"/>
+          </a:effectRef>
+          <a:fontRef idx="minor">
+            <a:schemeClr val="lt1"/>
+          </a:fontRef>
+        </p:style>
+        <p:txBody>
+          <a:bodyPr lIns="72000" tIns="36000" rIns="72000" bIns="36000" rtlCol="0" anchor="ctr"/>
+          <a:lstStyle/>
+          <a:p>
+            <a:pPr algn="ctr"/>
             <a:r>
               <a:rPr lang="de-DE" sz="1600" dirty="0">
                 <a:solidFill>
@@ -14732,12 +15409,63 @@
           </a:p>
         </p:txBody>
       </p:sp>
+      <p:sp>
+        <p:nvSpPr>
+          <p:cNvPr id="5" name="Textfeld 4">
+            <a:extLst>
+              <a:ext uri="{FF2B5EF4-FFF2-40B4-BE49-F238E27FC236}">
+                <a16:creationId xmlns:a16="http://schemas.microsoft.com/office/drawing/2014/main" id="{CC5096FF-DD07-E040-ACE7-69756224FC94}"/>
+              </a:ext>
+            </a:extLst>
+          </p:cNvPr>
+          <p:cNvSpPr txBox="1"/>
+          <p:nvPr/>
+        </p:nvSpPr>
+        <p:spPr>
+          <a:xfrm>
+            <a:off x="3636567" y="4008877"/>
+            <a:ext cx="1407437" cy="184666"/>
+          </a:xfrm>
+          <a:prstGeom prst="rect">
+            <a:avLst/>
+          </a:prstGeom>
+          <a:noFill/>
+        </p:spPr>
+        <p:txBody>
+          <a:bodyPr wrap="none" lIns="0" tIns="0" rIns="0" bIns="0" rtlCol="0">
+            <a:spAutoFit/>
+          </a:bodyPr>
+          <a:lstStyle/>
+          <a:p>
+            <a:r>
+              <a:rPr lang="de-DE" sz="1200" dirty="0"/>
+              <a:t>“</a:t>
+            </a:r>
+            <a:r>
+              <a:rPr lang="de-DE" sz="1200" dirty="0" err="1"/>
+              <a:t>Inference</a:t>
+            </a:r>
+            <a:r>
+              <a:rPr lang="de-DE" sz="1200" dirty="0"/>
+              <a:t> </a:t>
+            </a:r>
+            <a:r>
+              <a:rPr lang="de-DE" sz="1200" dirty="0" err="1"/>
+              <a:t>button</a:t>
+            </a:r>
+            <a:r>
+              <a:rPr lang="de-DE" sz="1200" dirty="0"/>
+              <a:t>“</a:t>
+            </a:r>
+          </a:p>
+        </p:txBody>
+      </p:sp>
       <p:pic>
         <p:nvPicPr>
-          <p:cNvPr id="5124" name="Picture 4">
+          <p:cNvPr id="3074" name="Picture 2" descr="Image result for button icon">
             <a:extLst>
               <a:ext uri="{FF2B5EF4-FFF2-40B4-BE49-F238E27FC236}">
-                <a16:creationId xmlns:a16="http://schemas.microsoft.com/office/drawing/2014/main" id="{4E7D24D5-7406-3441-951A-978D833A30AE}"/>
+                <a16:creationId xmlns:a16="http://schemas.microsoft.com/office/drawing/2014/main" id="{88B755B1-48B6-9D4A-8EFC-51659CF477B5}"/>
               </a:ext>
             </a:extLst>
           </p:cNvPr>
@@ -14746,21 +15474,24 @@
           </p:cNvPicPr>
           <p:nvPr/>
         </p:nvPicPr>
-        <p:blipFill rotWithShape="1">
+        <p:blipFill>
           <a:blip r:embed="rId2">
+            <a:alphaModFix amt="35000"/>
             <a:extLst>
               <a:ext uri="{28A0092B-C50C-407E-A947-70E740481C1C}">
                 <a14:useLocalDpi xmlns:a14="http://schemas.microsoft.com/office/drawing/2010/main" val="0"/>
               </a:ext>
             </a:extLst>
           </a:blip>
-          <a:srcRect t="21385" b="20937"/>
-          <a:stretch/>
+          <a:srcRect/>
+          <a:stretch>
+            <a:fillRect/>
+          </a:stretch>
         </p:blipFill>
         <p:spPr bwMode="auto">
           <a:xfrm>
-            <a:off x="802607" y="1511441"/>
-            <a:ext cx="2289038" cy="741007"/>
+            <a:off x="4040393" y="4467644"/>
+            <a:ext cx="599786" cy="599786"/>
           </a:xfrm>
           <a:prstGeom prst="rect">
             <a:avLst/>
@@ -14777,127 +15508,6 @@
           </a:extLst>
         </p:spPr>
       </p:pic>
-      <p:sp>
-        <p:nvSpPr>
-          <p:cNvPr id="21" name="Textfeld 20">
-            <a:extLst>
-              <a:ext uri="{FF2B5EF4-FFF2-40B4-BE49-F238E27FC236}">
-                <a16:creationId xmlns:a16="http://schemas.microsoft.com/office/drawing/2014/main" id="{6C16342A-D676-B940-99D5-DEC447D8E792}"/>
-              </a:ext>
-            </a:extLst>
-          </p:cNvPr>
-          <p:cNvSpPr txBox="1"/>
-          <p:nvPr/>
-        </p:nvSpPr>
-        <p:spPr>
-          <a:xfrm>
-            <a:off x="3883909" y="1759595"/>
-            <a:ext cx="2830903" cy="246221"/>
-          </a:xfrm>
-          <a:prstGeom prst="rect">
-            <a:avLst/>
-          </a:prstGeom>
-          <a:noFill/>
-        </p:spPr>
-        <p:txBody>
-          <a:bodyPr wrap="none" lIns="0" tIns="0" rIns="0" bIns="0" rtlCol="0">
-            <a:spAutoFit/>
-          </a:bodyPr>
-          <a:lstStyle/>
-          <a:p>
-            <a:pPr marL="285750" indent="-285750">
-              <a:buFont typeface="Arial" panose="020B0604020202020204" pitchFamily="34" charset="0"/>
-              <a:buChar char="•"/>
-            </a:pPr>
-            <a:r>
-              <a:rPr lang="de-DE" sz="1600" dirty="0"/>
-              <a:t>Leicht zu bedienende API</a:t>
-            </a:r>
-          </a:p>
-        </p:txBody>
-      </p:sp>
-      <p:sp>
-        <p:nvSpPr>
-          <p:cNvPr id="32" name="Textfeld 31">
-            <a:extLst>
-              <a:ext uri="{FF2B5EF4-FFF2-40B4-BE49-F238E27FC236}">
-                <a16:creationId xmlns:a16="http://schemas.microsoft.com/office/drawing/2014/main" id="{CE298CA1-48C3-BC45-B635-0FF29F18D8FA}"/>
-              </a:ext>
-            </a:extLst>
-          </p:cNvPr>
-          <p:cNvSpPr txBox="1"/>
-          <p:nvPr/>
-        </p:nvSpPr>
-        <p:spPr>
-          <a:xfrm>
-            <a:off x="7463785" y="1758835"/>
-            <a:ext cx="3210815" cy="246221"/>
-          </a:xfrm>
-          <a:prstGeom prst="rect">
-            <a:avLst/>
-          </a:prstGeom>
-          <a:noFill/>
-        </p:spPr>
-        <p:txBody>
-          <a:bodyPr wrap="none" lIns="0" tIns="0" rIns="0" bIns="0" rtlCol="0">
-            <a:spAutoFit/>
-          </a:bodyPr>
-          <a:lstStyle/>
-          <a:p>
-            <a:pPr marL="285750" indent="-285750">
-              <a:buFont typeface="Arial" panose="020B0604020202020204" pitchFamily="34" charset="0"/>
-              <a:buChar char="•"/>
-            </a:pPr>
-            <a:r>
-              <a:rPr lang="de-DE" sz="1600" dirty="0"/>
-              <a:t>Starkes Backend für Sampling</a:t>
-            </a:r>
-          </a:p>
-        </p:txBody>
-      </p:sp>
-      <p:cxnSp>
-        <p:nvCxnSpPr>
-          <p:cNvPr id="33" name="Gerade Verbindung 32">
-            <a:extLst>
-              <a:ext uri="{FF2B5EF4-FFF2-40B4-BE49-F238E27FC236}">
-                <a16:creationId xmlns:a16="http://schemas.microsoft.com/office/drawing/2014/main" id="{D8B5A873-05FD-6342-89FA-9930A0A913F9}"/>
-              </a:ext>
-            </a:extLst>
-          </p:cNvPr>
-          <p:cNvCxnSpPr>
-            <a:cxnSpLocks/>
-          </p:cNvCxnSpPr>
-          <p:nvPr/>
-        </p:nvCxnSpPr>
-        <p:spPr>
-          <a:xfrm>
-            <a:off x="650326" y="2363288"/>
-            <a:ext cx="10751965" cy="0"/>
-          </a:xfrm>
-          <a:prstGeom prst="line">
-            <a:avLst/>
-          </a:prstGeom>
-          <a:ln>
-            <a:solidFill>
-              <a:srgbClr val="9D9D9D"/>
-            </a:solidFill>
-          </a:ln>
-        </p:spPr>
-        <p:style>
-          <a:lnRef idx="1">
-            <a:schemeClr val="accent1"/>
-          </a:lnRef>
-          <a:fillRef idx="0">
-            <a:schemeClr val="accent1"/>
-          </a:fillRef>
-          <a:effectRef idx="0">
-            <a:schemeClr val="accent1"/>
-          </a:effectRef>
-          <a:fontRef idx="minor">
-            <a:schemeClr val="tx1"/>
-          </a:fontRef>
-        </p:style>
-      </p:cxnSp>
     </p:spTree>
     <p:extLst>
       <p:ext uri="{BB962C8B-B14F-4D97-AF65-F5344CB8AC3E}">
@@ -15210,7 +15820,7 @@
                             </p:stCondLst>
                             <p:childTnLst>
                               <p:par>
-                                <p:cTn id="30" presetID="9" presetClass="entr" presetSubtype="0" fill="hold" grpId="0" nodeType="clickEffect">
+                                <p:cTn id="30" presetID="9" presetClass="entr" presetSubtype="0" fill="hold" nodeType="clickEffect">
                                   <p:stCondLst>
                                     <p:cond delay="0"/>
                                   </p:stCondLst>
@@ -15223,7 +15833,7 @@
                                           </p:stCondLst>
                                         </p:cTn>
                                         <p:tgtEl>
-                                          <p:spTgt spid="29"/>
+                                          <p:spTgt spid="31"/>
                                         </p:tgtEl>
                                         <p:attrNameLst>
                                           <p:attrName>style.visibility</p:attrName>
@@ -15237,7 +15847,7 @@
                                       <p:cBhvr>
                                         <p:cTn id="32" dur="500"/>
                                         <p:tgtEl>
-                                          <p:spTgt spid="29"/>
+                                          <p:spTgt spid="31"/>
                                         </p:tgtEl>
                                       </p:cBhvr>
                                     </p:animEffect>
@@ -15245,7 +15855,7 @@
                                 </p:cTn>
                               </p:par>
                               <p:par>
-                                <p:cTn id="33" presetID="9" presetClass="entr" presetSubtype="0" fill="hold" nodeType="withEffect">
+                                <p:cTn id="33" presetID="9" presetClass="entr" presetSubtype="0" fill="hold" grpId="0" nodeType="withEffect">
                                   <p:stCondLst>
                                     <p:cond delay="0"/>
                                   </p:stCondLst>
@@ -15258,7 +15868,7 @@
                                           </p:stCondLst>
                                         </p:cTn>
                                         <p:tgtEl>
-                                          <p:spTgt spid="24"/>
+                                          <p:spTgt spid="30"/>
                                         </p:tgtEl>
                                         <p:attrNameLst>
                                           <p:attrName>style.visibility</p:attrName>
@@ -15272,7 +15882,7 @@
                                       <p:cBhvr>
                                         <p:cTn id="35" dur="500"/>
                                         <p:tgtEl>
-                                          <p:spTgt spid="24"/>
+                                          <p:spTgt spid="30"/>
                                         </p:tgtEl>
                                       </p:cBhvr>
                                     </p:animEffect>
@@ -15293,7 +15903,7 @@
                                           </p:stCondLst>
                                         </p:cTn>
                                         <p:tgtEl>
-                                          <p:spTgt spid="12"/>
+                                          <p:spTgt spid="25"/>
                                         </p:tgtEl>
                                         <p:attrNameLst>
                                           <p:attrName>style.visibility</p:attrName>
@@ -15307,7 +15917,7 @@
                                       <p:cBhvr>
                                         <p:cTn id="38" dur="500"/>
                                         <p:tgtEl>
-                                          <p:spTgt spid="12"/>
+                                          <p:spTgt spid="25"/>
                                         </p:tgtEl>
                                       </p:cBhvr>
                                     </p:animEffect>
@@ -15328,7 +15938,7 @@
                                           </p:stCondLst>
                                         </p:cTn>
                                         <p:tgtEl>
-                                          <p:spTgt spid="13"/>
+                                          <p:spTgt spid="34"/>
                                         </p:tgtEl>
                                         <p:attrNameLst>
                                           <p:attrName>style.visibility</p:attrName>
@@ -15342,7 +15952,1261 @@
                                       <p:cBhvr>
                                         <p:cTn id="41" dur="500"/>
                                         <p:tgtEl>
+                                          <p:spTgt spid="34"/>
+                                        </p:tgtEl>
+                                      </p:cBhvr>
+                                    </p:animEffect>
+                                  </p:childTnLst>
+                                </p:cTn>
+                              </p:par>
+                            </p:childTnLst>
+                          </p:cTn>
+                        </p:par>
+                      </p:childTnLst>
+                    </p:cTn>
+                  </p:par>
+                </p:childTnLst>
+              </p:cTn>
+              <p:prevCondLst>
+                <p:cond evt="onPrev" delay="0">
+                  <p:tgtEl>
+                    <p:sldTgt/>
+                  </p:tgtEl>
+                </p:cond>
+              </p:prevCondLst>
+              <p:nextCondLst>
+                <p:cond evt="onNext" delay="0">
+                  <p:tgtEl>
+                    <p:sldTgt/>
+                  </p:tgtEl>
+                </p:cond>
+              </p:nextCondLst>
+            </p:seq>
+          </p:childTnLst>
+        </p:cTn>
+      </p:par>
+    </p:tnLst>
+    <p:bldLst>
+      <p:bldP spid="6" grpId="0" animBg="1"/>
+      <p:bldP spid="7" grpId="0"/>
+      <p:bldP spid="9" grpId="0" animBg="1"/>
+      <p:bldP spid="10" grpId="0"/>
+      <p:bldP spid="27" grpId="0" animBg="1"/>
+      <p:bldP spid="28" grpId="0" animBg="1"/>
+      <p:bldP spid="25" grpId="0" animBg="1"/>
+      <p:bldP spid="30" grpId="0"/>
+      <p:bldP spid="34" grpId="0" animBg="1"/>
+    </p:bldLst>
+  </p:timing>
+</p:sld>
+</file>
+
+<file path=ppt/slides/slide19.xml><?xml version="1.0" encoding="utf-8"?>
+<p:sld xmlns:a="http://schemas.openxmlformats.org/drawingml/2006/main" xmlns:r="http://schemas.openxmlformats.org/officeDocument/2006/relationships" xmlns:p="http://schemas.openxmlformats.org/presentationml/2006/main">
+  <p:cSld>
+    <p:spTree>
+      <p:nvGrpSpPr>
+        <p:cNvPr id="1" name=""/>
+        <p:cNvGrpSpPr/>
+        <p:nvPr/>
+      </p:nvGrpSpPr>
+      <p:grpSpPr>
+        <a:xfrm>
+          <a:off x="0" y="0"/>
+          <a:ext cx="0" cy="0"/>
+          <a:chOff x="0" y="0"/>
+          <a:chExt cx="0" cy="0"/>
+        </a:xfrm>
+      </p:grpSpPr>
+      <p:sp>
+        <p:nvSpPr>
+          <p:cNvPr id="2" name="Titel 1">
+            <a:extLst>
+              <a:ext uri="{FF2B5EF4-FFF2-40B4-BE49-F238E27FC236}">
+                <a16:creationId xmlns:a16="http://schemas.microsoft.com/office/drawing/2014/main" id="{D40D78E9-3F5A-AC47-AD7A-7564C728E145}"/>
+              </a:ext>
+            </a:extLst>
+          </p:cNvPr>
+          <p:cNvSpPr>
+            <a:spLocks noGrp="1"/>
+          </p:cNvSpPr>
+          <p:nvPr>
+            <p:ph type="title"/>
+          </p:nvPr>
+        </p:nvSpPr>
+        <p:spPr/>
+        <p:txBody>
+          <a:bodyPr/>
+          <a:lstStyle/>
+          <a:p>
+            <a:r>
+              <a:rPr lang="de-DE" dirty="0" err="1"/>
+              <a:t>Posterior</a:t>
+            </a:r>
+            <a:r>
+              <a:rPr lang="de-DE" dirty="0"/>
+              <a:t> Distribution ist Ausgangspunkt weiterführender Untersuchungen</a:t>
+            </a:r>
+          </a:p>
+        </p:txBody>
+      </p:sp>
+      <p:sp>
+        <p:nvSpPr>
+          <p:cNvPr id="3" name="Textplatzhalter 2">
+            <a:extLst>
+              <a:ext uri="{FF2B5EF4-FFF2-40B4-BE49-F238E27FC236}">
+                <a16:creationId xmlns:a16="http://schemas.microsoft.com/office/drawing/2014/main" id="{CBAD4ED3-57AB-7B4C-B841-692FF6156ACD}"/>
+              </a:ext>
+            </a:extLst>
+          </p:cNvPr>
+          <p:cNvSpPr>
+            <a:spLocks noGrp="1"/>
+          </p:cNvSpPr>
+          <p:nvPr>
+            <p:ph type="body" sz="quarter" idx="10"/>
+          </p:nvPr>
+        </p:nvSpPr>
+        <p:spPr/>
+        <p:txBody>
+          <a:bodyPr/>
+          <a:lstStyle/>
+          <a:p>
+            <a:endParaRPr lang="de-DE"/>
+          </a:p>
+        </p:txBody>
+      </p:sp>
+      <p:sp>
+        <p:nvSpPr>
+          <p:cNvPr id="5" name="Oval 4">
+            <a:extLst>
+              <a:ext uri="{FF2B5EF4-FFF2-40B4-BE49-F238E27FC236}">
+                <a16:creationId xmlns:a16="http://schemas.microsoft.com/office/drawing/2014/main" id="{DCCFD9BB-DE8A-6945-87A1-FAB805905BE2}"/>
+              </a:ext>
+            </a:extLst>
+          </p:cNvPr>
+          <p:cNvSpPr/>
+          <p:nvPr/>
+        </p:nvSpPr>
+        <p:spPr>
+          <a:xfrm>
+            <a:off x="5601574" y="2285438"/>
+            <a:ext cx="900000" cy="900000"/>
+          </a:xfrm>
+          <a:prstGeom prst="ellipse">
+            <a:avLst/>
+          </a:prstGeom>
+          <a:noFill/>
+          <a:ln w="19050" cmpd="sng">
+            <a:solidFill>
+              <a:srgbClr val="9D9D9D"/>
+            </a:solidFill>
+          </a:ln>
+          <a:effectLst/>
+        </p:spPr>
+        <p:style>
+          <a:lnRef idx="2">
+            <a:schemeClr val="accent1">
+              <a:shade val="50000"/>
+            </a:schemeClr>
+          </a:lnRef>
+          <a:fillRef idx="1">
+            <a:schemeClr val="accent1"/>
+          </a:fillRef>
+          <a:effectRef idx="0">
+            <a:schemeClr val="accent1"/>
+          </a:effectRef>
+          <a:fontRef idx="minor">
+            <a:schemeClr val="lt1"/>
+          </a:fontRef>
+        </p:style>
+        <p:txBody>
+          <a:bodyPr lIns="72000" tIns="36000" rIns="72000" bIns="36000" rtlCol="0" anchor="ctr"/>
+          <a:lstStyle/>
+          <a:p>
+            <a:pPr algn="ctr"/>
+            <a:endParaRPr lang="de-DE" sz="1600" dirty="0">
+              <a:solidFill>
+                <a:schemeClr val="tx1"/>
+              </a:solidFill>
+            </a:endParaRPr>
+          </a:p>
+        </p:txBody>
+      </p:sp>
+      <p:sp>
+        <p:nvSpPr>
+          <p:cNvPr id="6" name="Textfeld 5">
+            <a:extLst>
+              <a:ext uri="{FF2B5EF4-FFF2-40B4-BE49-F238E27FC236}">
+                <a16:creationId xmlns:a16="http://schemas.microsoft.com/office/drawing/2014/main" id="{C41EC188-3F86-3141-8538-9D8FBAC72D63}"/>
+              </a:ext>
+            </a:extLst>
+          </p:cNvPr>
+          <p:cNvSpPr txBox="1"/>
+          <p:nvPr/>
+        </p:nvSpPr>
+        <p:spPr>
+          <a:xfrm>
+            <a:off x="5647848" y="2556908"/>
+            <a:ext cx="835165" cy="369332"/>
+          </a:xfrm>
+          <a:prstGeom prst="rect">
+            <a:avLst/>
+          </a:prstGeom>
+          <a:noFill/>
+        </p:spPr>
+        <p:txBody>
+          <a:bodyPr wrap="none" lIns="0" tIns="0" rIns="0" bIns="0" rtlCol="0">
+            <a:spAutoFit/>
+          </a:bodyPr>
+          <a:lstStyle/>
+          <a:p>
+            <a:pPr algn="ctr"/>
+            <a:r>
+              <a:rPr lang="de-DE" sz="1200" dirty="0">
+                <a:solidFill>
+                  <a:srgbClr val="9D9D9D"/>
+                </a:solidFill>
+              </a:rPr>
+              <a:t>Parameter </a:t>
+            </a:r>
+          </a:p>
+          <a:p>
+            <a:pPr algn="ctr"/>
+            <a:r>
+              <a:rPr lang="de-DE" sz="1200" dirty="0">
+                <a:solidFill>
+                  <a:srgbClr val="9D9D9D"/>
+                </a:solidFill>
+              </a:rPr>
+              <a:t>Inferenz</a:t>
+            </a:r>
+          </a:p>
+        </p:txBody>
+      </p:sp>
+      <p:sp>
+        <p:nvSpPr>
+          <p:cNvPr id="7" name="Oval 6">
+            <a:extLst>
+              <a:ext uri="{FF2B5EF4-FFF2-40B4-BE49-F238E27FC236}">
+                <a16:creationId xmlns:a16="http://schemas.microsoft.com/office/drawing/2014/main" id="{0DA817F1-0223-C845-9FBE-C43AF0B2C3B1}"/>
+              </a:ext>
+            </a:extLst>
+          </p:cNvPr>
+          <p:cNvSpPr/>
+          <p:nvPr/>
+        </p:nvSpPr>
+        <p:spPr>
+          <a:xfrm>
+            <a:off x="5594847" y="3878613"/>
+            <a:ext cx="900000" cy="900000"/>
+          </a:xfrm>
+          <a:prstGeom prst="ellipse">
+            <a:avLst/>
+          </a:prstGeom>
+          <a:noFill/>
+          <a:ln w="19050" cmpd="sng">
+            <a:solidFill>
+              <a:srgbClr val="9D9D9D"/>
+            </a:solidFill>
+          </a:ln>
+          <a:effectLst/>
+        </p:spPr>
+        <p:style>
+          <a:lnRef idx="2">
+            <a:schemeClr val="accent1">
+              <a:shade val="50000"/>
+            </a:schemeClr>
+          </a:lnRef>
+          <a:fillRef idx="1">
+            <a:schemeClr val="accent1"/>
+          </a:fillRef>
+          <a:effectRef idx="0">
+            <a:schemeClr val="accent1"/>
+          </a:effectRef>
+          <a:fontRef idx="minor">
+            <a:schemeClr val="lt1"/>
+          </a:fontRef>
+        </p:style>
+        <p:txBody>
+          <a:bodyPr lIns="72000" tIns="36000" rIns="72000" bIns="36000" rtlCol="0" anchor="ctr"/>
+          <a:lstStyle/>
+          <a:p>
+            <a:pPr algn="ctr"/>
+            <a:endParaRPr lang="de-DE" sz="1600" dirty="0">
+              <a:solidFill>
+                <a:schemeClr val="tx1"/>
+              </a:solidFill>
+            </a:endParaRPr>
+          </a:p>
+        </p:txBody>
+      </p:sp>
+      <p:sp>
+        <p:nvSpPr>
+          <p:cNvPr id="8" name="Textfeld 7">
+            <a:extLst>
+              <a:ext uri="{FF2B5EF4-FFF2-40B4-BE49-F238E27FC236}">
+                <a16:creationId xmlns:a16="http://schemas.microsoft.com/office/drawing/2014/main" id="{349E7477-205A-5B44-B578-4DF0A1825CA7}"/>
+              </a:ext>
+            </a:extLst>
+          </p:cNvPr>
+          <p:cNvSpPr txBox="1"/>
+          <p:nvPr/>
+        </p:nvSpPr>
+        <p:spPr>
+          <a:xfrm>
+            <a:off x="5638744" y="4110450"/>
+            <a:ext cx="811119" cy="369332"/>
+          </a:xfrm>
+          <a:prstGeom prst="rect">
+            <a:avLst/>
+          </a:prstGeom>
+          <a:noFill/>
+        </p:spPr>
+        <p:txBody>
+          <a:bodyPr wrap="none" lIns="0" tIns="0" rIns="0" bIns="0" rtlCol="0">
+            <a:spAutoFit/>
+          </a:bodyPr>
+          <a:lstStyle/>
+          <a:p>
+            <a:pPr algn="ctr"/>
+            <a:r>
+              <a:rPr lang="de-DE" sz="1200" dirty="0" err="1">
+                <a:solidFill>
+                  <a:srgbClr val="9D9D9D"/>
+                </a:solidFill>
+              </a:rPr>
+              <a:t>Posterior</a:t>
+            </a:r>
+            <a:r>
+              <a:rPr lang="de-DE" sz="1200" dirty="0">
+                <a:solidFill>
+                  <a:srgbClr val="9D9D9D"/>
+                </a:solidFill>
+              </a:rPr>
+              <a:t> </a:t>
+            </a:r>
+          </a:p>
+          <a:p>
+            <a:pPr algn="ctr"/>
+            <a:r>
+              <a:rPr lang="de-DE" sz="1200" dirty="0" err="1">
+                <a:solidFill>
+                  <a:srgbClr val="9D9D9D"/>
+                </a:solidFill>
+              </a:rPr>
+              <a:t>Predictions</a:t>
+            </a:r>
+            <a:endParaRPr lang="de-DE" sz="1200" dirty="0">
+              <a:solidFill>
+                <a:srgbClr val="9D9D9D"/>
+              </a:solidFill>
+            </a:endParaRPr>
+          </a:p>
+        </p:txBody>
+      </p:sp>
+      <p:sp>
+        <p:nvSpPr>
+          <p:cNvPr id="9" name="Oval 8">
+            <a:extLst>
+              <a:ext uri="{FF2B5EF4-FFF2-40B4-BE49-F238E27FC236}">
+                <a16:creationId xmlns:a16="http://schemas.microsoft.com/office/drawing/2014/main" id="{147197ED-9D25-2E46-951A-A61FA7F061FA}"/>
+              </a:ext>
+            </a:extLst>
+          </p:cNvPr>
+          <p:cNvSpPr/>
+          <p:nvPr/>
+        </p:nvSpPr>
+        <p:spPr>
+          <a:xfrm>
+            <a:off x="5601574" y="5471788"/>
+            <a:ext cx="900000" cy="900000"/>
+          </a:xfrm>
+          <a:prstGeom prst="ellipse">
+            <a:avLst/>
+          </a:prstGeom>
+          <a:noFill/>
+          <a:ln w="19050" cmpd="sng">
+            <a:solidFill>
+              <a:srgbClr val="9D9D9D"/>
+            </a:solidFill>
+          </a:ln>
+          <a:effectLst/>
+        </p:spPr>
+        <p:style>
+          <a:lnRef idx="2">
+            <a:schemeClr val="accent1">
+              <a:shade val="50000"/>
+            </a:schemeClr>
+          </a:lnRef>
+          <a:fillRef idx="1">
+            <a:schemeClr val="accent1"/>
+          </a:fillRef>
+          <a:effectRef idx="0">
+            <a:schemeClr val="accent1"/>
+          </a:effectRef>
+          <a:fontRef idx="minor">
+            <a:schemeClr val="lt1"/>
+          </a:fontRef>
+        </p:style>
+        <p:txBody>
+          <a:bodyPr lIns="72000" tIns="36000" rIns="72000" bIns="36000" rtlCol="0" anchor="ctr"/>
+          <a:lstStyle/>
+          <a:p>
+            <a:pPr algn="ctr"/>
+            <a:endParaRPr lang="de-DE" sz="1600" dirty="0">
+              <a:solidFill>
+                <a:schemeClr val="tx1"/>
+              </a:solidFill>
+            </a:endParaRPr>
+          </a:p>
+        </p:txBody>
+      </p:sp>
+      <p:sp>
+        <p:nvSpPr>
+          <p:cNvPr id="10" name="Textfeld 9">
+            <a:extLst>
+              <a:ext uri="{FF2B5EF4-FFF2-40B4-BE49-F238E27FC236}">
+                <a16:creationId xmlns:a16="http://schemas.microsoft.com/office/drawing/2014/main" id="{8800C2B9-2774-9842-8033-89F93085F421}"/>
+              </a:ext>
+            </a:extLst>
+          </p:cNvPr>
+          <p:cNvSpPr txBox="1"/>
+          <p:nvPr/>
+        </p:nvSpPr>
+        <p:spPr>
+          <a:xfrm>
+            <a:off x="5961807" y="5798677"/>
+            <a:ext cx="179537" cy="215444"/>
+          </a:xfrm>
+          <a:prstGeom prst="rect">
+            <a:avLst/>
+          </a:prstGeom>
+          <a:noFill/>
+        </p:spPr>
+        <p:txBody>
+          <a:bodyPr wrap="none" lIns="0" tIns="0" rIns="0" bIns="0" rtlCol="0">
+            <a:spAutoFit/>
+          </a:bodyPr>
+          <a:lstStyle/>
+          <a:p>
+            <a:pPr algn="ctr"/>
+            <a:r>
+              <a:rPr lang="de-DE" sz="1400" dirty="0">
+                <a:solidFill>
+                  <a:srgbClr val="9D9D9D"/>
+                </a:solidFill>
+              </a:rPr>
+              <a:t>…</a:t>
+            </a:r>
+          </a:p>
+        </p:txBody>
+      </p:sp>
+      <p:cxnSp>
+        <p:nvCxnSpPr>
+          <p:cNvPr id="11" name="Gekrümmte Verbindung 10">
+            <a:extLst>
+              <a:ext uri="{FF2B5EF4-FFF2-40B4-BE49-F238E27FC236}">
+                <a16:creationId xmlns:a16="http://schemas.microsoft.com/office/drawing/2014/main" id="{BB6C82B3-B2F4-9C43-83E7-32269DA489C7}"/>
+              </a:ext>
+            </a:extLst>
+          </p:cNvPr>
+          <p:cNvCxnSpPr>
+            <a:cxnSpLocks/>
+            <a:stCxn id="14" idx="0"/>
+            <a:endCxn id="5" idx="2"/>
+          </p:cNvCxnSpPr>
+          <p:nvPr/>
+        </p:nvCxnSpPr>
+        <p:spPr>
+          <a:xfrm rot="5400000" flipH="1" flipV="1">
+            <a:off x="3738589" y="1747049"/>
+            <a:ext cx="874596" cy="2851374"/>
+          </a:xfrm>
+          <a:prstGeom prst="curvedConnector2">
+            <a:avLst/>
+          </a:prstGeom>
+          <a:ln w="19050">
+            <a:solidFill>
+              <a:srgbClr val="9D9D9D"/>
+            </a:solidFill>
+            <a:tailEnd type="triangle"/>
+          </a:ln>
+        </p:spPr>
+        <p:style>
+          <a:lnRef idx="1">
+            <a:schemeClr val="accent1"/>
+          </a:lnRef>
+          <a:fillRef idx="0">
+            <a:schemeClr val="accent1"/>
+          </a:fillRef>
+          <a:effectRef idx="0">
+            <a:schemeClr val="accent1"/>
+          </a:effectRef>
+          <a:fontRef idx="minor">
+            <a:schemeClr val="tx1"/>
+          </a:fontRef>
+        </p:style>
+      </p:cxnSp>
+      <p:cxnSp>
+        <p:nvCxnSpPr>
+          <p:cNvPr id="12" name="Gekrümmte Verbindung 11">
+            <a:extLst>
+              <a:ext uri="{FF2B5EF4-FFF2-40B4-BE49-F238E27FC236}">
+                <a16:creationId xmlns:a16="http://schemas.microsoft.com/office/drawing/2014/main" id="{69F7E3C1-5B99-A246-9BE7-838B4617978C}"/>
+              </a:ext>
+            </a:extLst>
+          </p:cNvPr>
+          <p:cNvCxnSpPr>
+            <a:cxnSpLocks/>
+            <a:stCxn id="14" idx="4"/>
+            <a:endCxn id="9" idx="2"/>
+          </p:cNvCxnSpPr>
+          <p:nvPr/>
+        </p:nvCxnSpPr>
+        <p:spPr>
+          <a:xfrm rot="16200000" flipH="1">
+            <a:off x="3740010" y="4060224"/>
+            <a:ext cx="871754" cy="2851374"/>
+          </a:xfrm>
+          <a:prstGeom prst="curvedConnector2">
+            <a:avLst/>
+          </a:prstGeom>
+          <a:ln w="19050">
+            <a:solidFill>
+              <a:srgbClr val="9D9D9D"/>
+            </a:solidFill>
+            <a:tailEnd type="triangle"/>
+          </a:ln>
+        </p:spPr>
+        <p:style>
+          <a:lnRef idx="1">
+            <a:schemeClr val="accent1"/>
+          </a:lnRef>
+          <a:fillRef idx="0">
+            <a:schemeClr val="accent1"/>
+          </a:fillRef>
+          <a:effectRef idx="0">
+            <a:schemeClr val="accent1"/>
+          </a:effectRef>
+          <a:fontRef idx="minor">
+            <a:schemeClr val="tx1"/>
+          </a:fontRef>
+        </p:style>
+      </p:cxnSp>
+      <p:cxnSp>
+        <p:nvCxnSpPr>
+          <p:cNvPr id="13" name="Gerade Verbindung mit Pfeil 12">
+            <a:extLst>
+              <a:ext uri="{FF2B5EF4-FFF2-40B4-BE49-F238E27FC236}">
+                <a16:creationId xmlns:a16="http://schemas.microsoft.com/office/drawing/2014/main" id="{251CB058-A0C4-4949-8FDD-966AEB695B4D}"/>
+              </a:ext>
+            </a:extLst>
+          </p:cNvPr>
+          <p:cNvCxnSpPr>
+            <a:cxnSpLocks/>
+            <a:endCxn id="14" idx="2"/>
+          </p:cNvCxnSpPr>
+          <p:nvPr/>
+        </p:nvCxnSpPr>
+        <p:spPr>
+          <a:xfrm>
+            <a:off x="-9823" y="4330034"/>
+            <a:ext cx="2040023" cy="0"/>
+          </a:xfrm>
+          <a:prstGeom prst="straightConnector1">
+            <a:avLst/>
+          </a:prstGeom>
+          <a:ln w="19050">
+            <a:solidFill>
+              <a:srgbClr val="9D9D9D"/>
+            </a:solidFill>
+            <a:tailEnd type="triangle"/>
+          </a:ln>
+        </p:spPr>
+        <p:style>
+          <a:lnRef idx="1">
+            <a:schemeClr val="accent1"/>
+          </a:lnRef>
+          <a:fillRef idx="0">
+            <a:schemeClr val="accent1"/>
+          </a:fillRef>
+          <a:effectRef idx="0">
+            <a:schemeClr val="accent1"/>
+          </a:effectRef>
+          <a:fontRef idx="minor">
+            <a:schemeClr val="tx1"/>
+          </a:fontRef>
+        </p:style>
+      </p:cxnSp>
+      <p:sp>
+        <p:nvSpPr>
+          <p:cNvPr id="14" name="Oval 13">
+            <a:extLst>
+              <a:ext uri="{FF2B5EF4-FFF2-40B4-BE49-F238E27FC236}">
+                <a16:creationId xmlns:a16="http://schemas.microsoft.com/office/drawing/2014/main" id="{195B32F5-6D89-8F46-860F-A386C8DCBE73}"/>
+              </a:ext>
+            </a:extLst>
+          </p:cNvPr>
+          <p:cNvSpPr/>
+          <p:nvPr/>
+        </p:nvSpPr>
+        <p:spPr>
+          <a:xfrm>
+            <a:off x="2030200" y="3610034"/>
+            <a:ext cx="1440000" cy="1440000"/>
+          </a:xfrm>
+          <a:prstGeom prst="ellipse">
+            <a:avLst/>
+          </a:prstGeom>
+          <a:noFill/>
+          <a:ln w="19050" cmpd="sng">
+            <a:solidFill>
+              <a:schemeClr val="accent5"/>
+            </a:solidFill>
+          </a:ln>
+          <a:effectLst/>
+        </p:spPr>
+        <p:style>
+          <a:lnRef idx="2">
+            <a:schemeClr val="accent1">
+              <a:shade val="50000"/>
+            </a:schemeClr>
+          </a:lnRef>
+          <a:fillRef idx="1">
+            <a:schemeClr val="accent1"/>
+          </a:fillRef>
+          <a:effectRef idx="0">
+            <a:schemeClr val="accent1"/>
+          </a:effectRef>
+          <a:fontRef idx="minor">
+            <a:schemeClr val="lt1"/>
+          </a:fontRef>
+        </p:style>
+        <p:txBody>
+          <a:bodyPr lIns="72000" tIns="36000" rIns="72000" bIns="36000" rtlCol="0" anchor="ctr"/>
+          <a:lstStyle/>
+          <a:p>
+            <a:pPr algn="ctr"/>
+            <a:endParaRPr lang="de-DE" sz="1600" dirty="0">
+              <a:solidFill>
+                <a:schemeClr val="bg1"/>
+              </a:solidFill>
+            </a:endParaRPr>
+          </a:p>
+        </p:txBody>
+      </p:sp>
+      <p:sp>
+        <p:nvSpPr>
+          <p:cNvPr id="15" name="Textfeld 14">
+            <a:extLst>
+              <a:ext uri="{FF2B5EF4-FFF2-40B4-BE49-F238E27FC236}">
+                <a16:creationId xmlns:a16="http://schemas.microsoft.com/office/drawing/2014/main" id="{75061C45-ADA2-F447-8C13-1178D20CE60F}"/>
+              </a:ext>
+            </a:extLst>
+          </p:cNvPr>
+          <p:cNvSpPr txBox="1"/>
+          <p:nvPr/>
+        </p:nvSpPr>
+        <p:spPr>
+          <a:xfrm>
+            <a:off x="2198129" y="4096817"/>
+            <a:ext cx="1082026" cy="492443"/>
+          </a:xfrm>
+          <a:prstGeom prst="rect">
+            <a:avLst/>
+          </a:prstGeom>
+          <a:noFill/>
+        </p:spPr>
+        <p:txBody>
+          <a:bodyPr wrap="none" lIns="0" tIns="0" rIns="0" bIns="0" rtlCol="0">
+            <a:spAutoFit/>
+          </a:bodyPr>
+          <a:lstStyle/>
+          <a:p>
+            <a:pPr algn="ctr"/>
+            <a:r>
+              <a:rPr lang="de-DE" sz="1600" dirty="0" err="1">
+                <a:solidFill>
+                  <a:schemeClr val="accent5"/>
+                </a:solidFill>
+              </a:rPr>
+              <a:t>Posterior</a:t>
+            </a:r>
+            <a:r>
+              <a:rPr lang="de-DE" sz="1600" dirty="0">
+                <a:solidFill>
+                  <a:schemeClr val="accent5"/>
+                </a:solidFill>
+              </a:rPr>
+              <a:t> </a:t>
+            </a:r>
+          </a:p>
+          <a:p>
+            <a:pPr algn="ctr"/>
+            <a:r>
+              <a:rPr lang="de-DE" sz="1600" dirty="0">
+                <a:solidFill>
+                  <a:schemeClr val="accent5"/>
+                </a:solidFill>
+              </a:rPr>
+              <a:t>Distribution</a:t>
+            </a:r>
+          </a:p>
+        </p:txBody>
+      </p:sp>
+      <p:cxnSp>
+        <p:nvCxnSpPr>
+          <p:cNvPr id="16" name="Gerade Verbindung mit Pfeil 15">
+            <a:extLst>
+              <a:ext uri="{FF2B5EF4-FFF2-40B4-BE49-F238E27FC236}">
+                <a16:creationId xmlns:a16="http://schemas.microsoft.com/office/drawing/2014/main" id="{655D2B4B-762B-8346-8ECF-765A74F3B03A}"/>
+              </a:ext>
+            </a:extLst>
+          </p:cNvPr>
+          <p:cNvCxnSpPr>
+            <a:cxnSpLocks/>
+            <a:stCxn id="14" idx="6"/>
+            <a:endCxn id="7" idx="2"/>
+          </p:cNvCxnSpPr>
+          <p:nvPr/>
+        </p:nvCxnSpPr>
+        <p:spPr>
+          <a:xfrm flipV="1">
+            <a:off x="3470200" y="4328613"/>
+            <a:ext cx="2124647" cy="1421"/>
+          </a:xfrm>
+          <a:prstGeom prst="straightConnector1">
+            <a:avLst/>
+          </a:prstGeom>
+          <a:ln w="19050">
+            <a:solidFill>
+              <a:srgbClr val="9D9D9D"/>
+            </a:solidFill>
+            <a:tailEnd type="triangle"/>
+          </a:ln>
+        </p:spPr>
+        <p:style>
+          <a:lnRef idx="1">
+            <a:schemeClr val="accent1"/>
+          </a:lnRef>
+          <a:fillRef idx="0">
+            <a:schemeClr val="accent1"/>
+          </a:fillRef>
+          <a:effectRef idx="0">
+            <a:schemeClr val="accent1"/>
+          </a:effectRef>
+          <a:fontRef idx="minor">
+            <a:schemeClr val="tx1"/>
+          </a:fontRef>
+        </p:style>
+      </p:cxnSp>
+      <p:pic>
+        <p:nvPicPr>
+          <p:cNvPr id="21" name="Grafik 20">
+            <a:extLst>
+              <a:ext uri="{FF2B5EF4-FFF2-40B4-BE49-F238E27FC236}">
+                <a16:creationId xmlns:a16="http://schemas.microsoft.com/office/drawing/2014/main" id="{2ACD53E6-92BC-4D43-B48F-1F47E28B9436}"/>
+              </a:ext>
+            </a:extLst>
+          </p:cNvPr>
+          <p:cNvPicPr>
+            <a:picLocks noChangeAspect="1"/>
+          </p:cNvPicPr>
+          <p:nvPr/>
+        </p:nvPicPr>
+        <p:blipFill rotWithShape="1">
+          <a:blip r:embed="rId3"/>
+          <a:srcRect t="4935"/>
+          <a:stretch/>
+        </p:blipFill>
+        <p:spPr>
+          <a:xfrm>
+            <a:off x="7837012" y="1755473"/>
+            <a:ext cx="2144892" cy="1440000"/>
+          </a:xfrm>
+          <a:prstGeom prst="rect">
+            <a:avLst/>
+          </a:prstGeom>
+        </p:spPr>
+      </p:pic>
+      <p:pic>
+        <p:nvPicPr>
+          <p:cNvPr id="23" name="Grafik 22">
+            <a:extLst>
+              <a:ext uri="{FF2B5EF4-FFF2-40B4-BE49-F238E27FC236}">
+                <a16:creationId xmlns:a16="http://schemas.microsoft.com/office/drawing/2014/main" id="{901641E7-3943-0C4B-A19E-49A31DE35CAA}"/>
+              </a:ext>
+            </a:extLst>
+          </p:cNvPr>
+          <p:cNvPicPr>
+            <a:picLocks noChangeAspect="1"/>
+          </p:cNvPicPr>
+          <p:nvPr/>
+        </p:nvPicPr>
+        <p:blipFill>
+          <a:blip r:embed="rId4"/>
+          <a:stretch>
+            <a:fillRect/>
+          </a:stretch>
+        </p:blipFill>
+        <p:spPr>
+          <a:xfrm>
+            <a:off x="7870553" y="3581670"/>
+            <a:ext cx="2111351" cy="1440000"/>
+          </a:xfrm>
+          <a:prstGeom prst="rect">
+            <a:avLst/>
+          </a:prstGeom>
+        </p:spPr>
+      </p:pic>
+    </p:spTree>
+    <p:extLst>
+      <p:ext uri="{BB962C8B-B14F-4D97-AF65-F5344CB8AC3E}">
+        <p14:creationId xmlns:p14="http://schemas.microsoft.com/office/powerpoint/2010/main" val="4256477697"/>
+      </p:ext>
+    </p:extLst>
+  </p:cSld>
+  <p:clrMapOvr>
+    <a:masterClrMapping/>
+  </p:clrMapOvr>
+  <p:timing>
+    <p:tnLst>
+      <p:par>
+        <p:cTn id="1" dur="indefinite" restart="never" nodeType="tmRoot">
+          <p:childTnLst>
+            <p:seq concurrent="1" nextAc="seek">
+              <p:cTn id="2" dur="indefinite" nodeType="mainSeq">
+                <p:childTnLst>
+                  <p:par>
+                    <p:cTn id="3" fill="hold">
+                      <p:stCondLst>
+                        <p:cond delay="indefinite"/>
+                        <p:cond evt="onBegin" delay="0">
+                          <p:tn val="2"/>
+                        </p:cond>
+                      </p:stCondLst>
+                      <p:childTnLst>
+                        <p:par>
+                          <p:cTn id="4" fill="hold">
+                            <p:stCondLst>
+                              <p:cond delay="0"/>
+                            </p:stCondLst>
+                            <p:childTnLst>
+                              <p:par>
+                                <p:cTn id="5" presetID="9" presetClass="entr" presetSubtype="0" fill="hold" nodeType="withEffect">
+                                  <p:stCondLst>
+                                    <p:cond delay="0"/>
+                                  </p:stCondLst>
+                                  <p:childTnLst>
+                                    <p:set>
+                                      <p:cBhvr>
+                                        <p:cTn id="6" dur="1" fill="hold">
+                                          <p:stCondLst>
+                                            <p:cond delay="0"/>
+                                          </p:stCondLst>
+                                        </p:cTn>
+                                        <p:tgtEl>
+                                          <p:spTgt spid="11"/>
+                                        </p:tgtEl>
+                                        <p:attrNameLst>
+                                          <p:attrName>style.visibility</p:attrName>
+                                        </p:attrNameLst>
+                                      </p:cBhvr>
+                                      <p:to>
+                                        <p:strVal val="visible"/>
+                                      </p:to>
+                                    </p:set>
+                                    <p:animEffect transition="in" filter="dissolve">
+                                      <p:cBhvr>
+                                        <p:cTn id="7" dur="500"/>
+                                        <p:tgtEl>
+                                          <p:spTgt spid="11"/>
+                                        </p:tgtEl>
+                                      </p:cBhvr>
+                                    </p:animEffect>
+                                  </p:childTnLst>
+                                </p:cTn>
+                              </p:par>
+                              <p:par>
+                                <p:cTn id="8" presetID="9" presetClass="entr" presetSubtype="0" fill="hold" grpId="0" nodeType="withEffect">
+                                  <p:stCondLst>
+                                    <p:cond delay="0"/>
+                                  </p:stCondLst>
+                                  <p:childTnLst>
+                                    <p:set>
+                                      <p:cBhvr>
+                                        <p:cTn id="9" dur="1" fill="hold">
+                                          <p:stCondLst>
+                                            <p:cond delay="0"/>
+                                          </p:stCondLst>
+                                        </p:cTn>
+                                        <p:tgtEl>
+                                          <p:spTgt spid="5"/>
+                                        </p:tgtEl>
+                                        <p:attrNameLst>
+                                          <p:attrName>style.visibility</p:attrName>
+                                        </p:attrNameLst>
+                                      </p:cBhvr>
+                                      <p:to>
+                                        <p:strVal val="visible"/>
+                                      </p:to>
+                                    </p:set>
+                                    <p:animEffect transition="in" filter="dissolve">
+                                      <p:cBhvr>
+                                        <p:cTn id="10" dur="500"/>
+                                        <p:tgtEl>
+                                          <p:spTgt spid="5"/>
+                                        </p:tgtEl>
+                                      </p:cBhvr>
+                                    </p:animEffect>
+                                  </p:childTnLst>
+                                </p:cTn>
+                              </p:par>
+                              <p:par>
+                                <p:cTn id="11" presetID="9" presetClass="entr" presetSubtype="0" fill="hold" grpId="0" nodeType="withEffect">
+                                  <p:stCondLst>
+                                    <p:cond delay="0"/>
+                                  </p:stCondLst>
+                                  <p:childTnLst>
+                                    <p:set>
+                                      <p:cBhvr>
+                                        <p:cTn id="12" dur="1" fill="hold">
+                                          <p:stCondLst>
+                                            <p:cond delay="0"/>
+                                          </p:stCondLst>
+                                        </p:cTn>
+                                        <p:tgtEl>
+                                          <p:spTgt spid="6"/>
+                                        </p:tgtEl>
+                                        <p:attrNameLst>
+                                          <p:attrName>style.visibility</p:attrName>
+                                        </p:attrNameLst>
+                                      </p:cBhvr>
+                                      <p:to>
+                                        <p:strVal val="visible"/>
+                                      </p:to>
+                                    </p:set>
+                                    <p:animEffect transition="in" filter="dissolve">
+                                      <p:cBhvr>
+                                        <p:cTn id="13" dur="500"/>
+                                        <p:tgtEl>
+                                          <p:spTgt spid="6"/>
+                                        </p:tgtEl>
+                                      </p:cBhvr>
+                                    </p:animEffect>
+                                  </p:childTnLst>
+                                </p:cTn>
+                              </p:par>
+                              <p:par>
+                                <p:cTn id="14" presetID="9" presetClass="entr" presetSubtype="0" fill="hold" grpId="0" nodeType="withEffect">
+                                  <p:stCondLst>
+                                    <p:cond delay="0"/>
+                                  </p:stCondLst>
+                                  <p:childTnLst>
+                                    <p:set>
+                                      <p:cBhvr>
+                                        <p:cTn id="15" dur="1" fill="hold">
+                                          <p:stCondLst>
+                                            <p:cond delay="0"/>
+                                          </p:stCondLst>
+                                        </p:cTn>
+                                        <p:tgtEl>
+                                          <p:spTgt spid="8"/>
+                                        </p:tgtEl>
+                                        <p:attrNameLst>
+                                          <p:attrName>style.visibility</p:attrName>
+                                        </p:attrNameLst>
+                                      </p:cBhvr>
+                                      <p:to>
+                                        <p:strVal val="visible"/>
+                                      </p:to>
+                                    </p:set>
+                                    <p:animEffect transition="in" filter="dissolve">
+                                      <p:cBhvr>
+                                        <p:cTn id="16" dur="500"/>
+                                        <p:tgtEl>
+                                          <p:spTgt spid="8"/>
+                                        </p:tgtEl>
+                                      </p:cBhvr>
+                                    </p:animEffect>
+                                  </p:childTnLst>
+                                </p:cTn>
+                              </p:par>
+                              <p:par>
+                                <p:cTn id="17" presetID="9" presetClass="entr" presetSubtype="0" fill="hold" grpId="0" nodeType="withEffect">
+                                  <p:stCondLst>
+                                    <p:cond delay="0"/>
+                                  </p:stCondLst>
+                                  <p:childTnLst>
+                                    <p:set>
+                                      <p:cBhvr>
+                                        <p:cTn id="18" dur="1" fill="hold">
+                                          <p:stCondLst>
+                                            <p:cond delay="0"/>
+                                          </p:stCondLst>
+                                        </p:cTn>
+                                        <p:tgtEl>
+                                          <p:spTgt spid="7"/>
+                                        </p:tgtEl>
+                                        <p:attrNameLst>
+                                          <p:attrName>style.visibility</p:attrName>
+                                        </p:attrNameLst>
+                                      </p:cBhvr>
+                                      <p:to>
+                                        <p:strVal val="visible"/>
+                                      </p:to>
+                                    </p:set>
+                                    <p:animEffect transition="in" filter="dissolve">
+                                      <p:cBhvr>
+                                        <p:cTn id="19" dur="500"/>
+                                        <p:tgtEl>
+                                          <p:spTgt spid="7"/>
+                                        </p:tgtEl>
+                                      </p:cBhvr>
+                                    </p:animEffect>
+                                  </p:childTnLst>
+                                </p:cTn>
+                              </p:par>
+                            </p:childTnLst>
+                          </p:cTn>
+                        </p:par>
+                      </p:childTnLst>
+                    </p:cTn>
+                  </p:par>
+                  <p:par>
+                    <p:cTn id="20" fill="hold">
+                      <p:stCondLst>
+                        <p:cond delay="indefinite"/>
+                      </p:stCondLst>
+                      <p:childTnLst>
+                        <p:par>
+                          <p:cTn id="21" fill="hold">
+                            <p:stCondLst>
+                              <p:cond delay="0"/>
+                            </p:stCondLst>
+                            <p:childTnLst>
+                              <p:par>
+                                <p:cTn id="22" presetID="9" presetClass="entr" presetSubtype="0" fill="hold" nodeType="clickEffect">
+                                  <p:stCondLst>
+                                    <p:cond delay="0"/>
+                                  </p:stCondLst>
+                                  <p:childTnLst>
+                                    <p:set>
+                                      <p:cBhvr>
+                                        <p:cTn id="23" dur="1" fill="hold">
+                                          <p:stCondLst>
+                                            <p:cond delay="0"/>
+                                          </p:stCondLst>
+                                        </p:cTn>
+                                        <p:tgtEl>
+                                          <p:spTgt spid="12"/>
+                                        </p:tgtEl>
+                                        <p:attrNameLst>
+                                          <p:attrName>style.visibility</p:attrName>
+                                        </p:attrNameLst>
+                                      </p:cBhvr>
+                                      <p:to>
+                                        <p:strVal val="visible"/>
+                                      </p:to>
+                                    </p:set>
+                                    <p:animEffect transition="in" filter="dissolve">
+                                      <p:cBhvr>
+                                        <p:cTn id="24" dur="500"/>
+                                        <p:tgtEl>
+                                          <p:spTgt spid="12"/>
+                                        </p:tgtEl>
+                                      </p:cBhvr>
+                                    </p:animEffect>
+                                  </p:childTnLst>
+                                </p:cTn>
+                              </p:par>
+                              <p:par>
+                                <p:cTn id="25" presetID="9" presetClass="entr" presetSubtype="0" fill="hold" grpId="0" nodeType="withEffect">
+                                  <p:stCondLst>
+                                    <p:cond delay="0"/>
+                                  </p:stCondLst>
+                                  <p:childTnLst>
+                                    <p:set>
+                                      <p:cBhvr>
+                                        <p:cTn id="26" dur="1" fill="hold">
+                                          <p:stCondLst>
+                                            <p:cond delay="0"/>
+                                          </p:stCondLst>
+                                        </p:cTn>
+                                        <p:tgtEl>
+                                          <p:spTgt spid="9"/>
+                                        </p:tgtEl>
+                                        <p:attrNameLst>
+                                          <p:attrName>style.visibility</p:attrName>
+                                        </p:attrNameLst>
+                                      </p:cBhvr>
+                                      <p:to>
+                                        <p:strVal val="visible"/>
+                                      </p:to>
+                                    </p:set>
+                                    <p:animEffect transition="in" filter="dissolve">
+                                      <p:cBhvr>
+                                        <p:cTn id="27" dur="500"/>
+                                        <p:tgtEl>
+                                          <p:spTgt spid="9"/>
+                                        </p:tgtEl>
+                                      </p:cBhvr>
+                                    </p:animEffect>
+                                  </p:childTnLst>
+                                </p:cTn>
+                              </p:par>
+                              <p:par>
+                                <p:cTn id="28" presetID="9" presetClass="entr" presetSubtype="0" fill="hold" grpId="0" nodeType="withEffect">
+                                  <p:stCondLst>
+                                    <p:cond delay="0"/>
+                                  </p:stCondLst>
+                                  <p:childTnLst>
+                                    <p:set>
+                                      <p:cBhvr>
+                                        <p:cTn id="29" dur="1" fill="hold">
+                                          <p:stCondLst>
+                                            <p:cond delay="0"/>
+                                          </p:stCondLst>
+                                        </p:cTn>
+                                        <p:tgtEl>
+                                          <p:spTgt spid="10"/>
+                                        </p:tgtEl>
+                                        <p:attrNameLst>
+                                          <p:attrName>style.visibility</p:attrName>
+                                        </p:attrNameLst>
+                                      </p:cBhvr>
+                                      <p:to>
+                                        <p:strVal val="visible"/>
+                                      </p:to>
+                                    </p:set>
+                                    <p:animEffect transition="in" filter="dissolve">
+                                      <p:cBhvr>
+                                        <p:cTn id="30" dur="500"/>
+                                        <p:tgtEl>
+                                          <p:spTgt spid="10"/>
+                                        </p:tgtEl>
+                                      </p:cBhvr>
+                                    </p:animEffect>
+                                  </p:childTnLst>
+                                </p:cTn>
+                              </p:par>
+                            </p:childTnLst>
+                          </p:cTn>
+                        </p:par>
+                      </p:childTnLst>
+                    </p:cTn>
+                  </p:par>
+                  <p:par>
+                    <p:cTn id="31" fill="hold">
+                      <p:stCondLst>
+                        <p:cond delay="indefinite"/>
+                      </p:stCondLst>
+                      <p:childTnLst>
+                        <p:par>
+                          <p:cTn id="32" fill="hold">
+                            <p:stCondLst>
+                              <p:cond delay="0"/>
+                            </p:stCondLst>
+                            <p:childTnLst>
+                              <p:par>
+                                <p:cTn id="33" presetID="9" presetClass="entr" presetSubtype="0" fill="hold" nodeType="clickEffect">
+                                  <p:stCondLst>
+                                    <p:cond delay="0"/>
+                                  </p:stCondLst>
+                                  <p:childTnLst>
+                                    <p:set>
+                                      <p:cBhvr>
+                                        <p:cTn id="34" dur="1" fill="hold">
+                                          <p:stCondLst>
+                                            <p:cond delay="0"/>
+                                          </p:stCondLst>
+                                        </p:cTn>
+                                        <p:tgtEl>
                                           <p:spTgt spid="13"/>
+                                        </p:tgtEl>
+                                        <p:attrNameLst>
+                                          <p:attrName>style.visibility</p:attrName>
+                                        </p:attrNameLst>
+                                      </p:cBhvr>
+                                      <p:to>
+                                        <p:strVal val="visible"/>
+                                      </p:to>
+                                    </p:set>
+                                    <p:animEffect transition="in" filter="dissolve">
+                                      <p:cBhvr>
+                                        <p:cTn id="35" dur="500"/>
+                                        <p:tgtEl>
+                                          <p:spTgt spid="13"/>
+                                        </p:tgtEl>
+                                      </p:cBhvr>
+                                    </p:animEffect>
+                                  </p:childTnLst>
+                                </p:cTn>
+                              </p:par>
+                              <p:par>
+                                <p:cTn id="36" presetID="9" presetClass="entr" presetSubtype="0" fill="hold" grpId="0" nodeType="withEffect">
+                                  <p:stCondLst>
+                                    <p:cond delay="0"/>
+                                  </p:stCondLst>
+                                  <p:childTnLst>
+                                    <p:set>
+                                      <p:cBhvr>
+                                        <p:cTn id="37" dur="1" fill="hold">
+                                          <p:stCondLst>
+                                            <p:cond delay="0"/>
+                                          </p:stCondLst>
+                                        </p:cTn>
+                                        <p:tgtEl>
+                                          <p:spTgt spid="15"/>
+                                        </p:tgtEl>
+                                        <p:attrNameLst>
+                                          <p:attrName>style.visibility</p:attrName>
+                                        </p:attrNameLst>
+                                      </p:cBhvr>
+                                      <p:to>
+                                        <p:strVal val="visible"/>
+                                      </p:to>
+                                    </p:set>
+                                    <p:animEffect transition="in" filter="dissolve">
+                                      <p:cBhvr>
+                                        <p:cTn id="38" dur="500"/>
+                                        <p:tgtEl>
+                                          <p:spTgt spid="15"/>
+                                        </p:tgtEl>
+                                      </p:cBhvr>
+                                    </p:animEffect>
+                                  </p:childTnLst>
+                                </p:cTn>
+                              </p:par>
+                              <p:par>
+                                <p:cTn id="39" presetID="9" presetClass="entr" presetSubtype="0" fill="hold" grpId="0" nodeType="withEffect">
+                                  <p:stCondLst>
+                                    <p:cond delay="0"/>
+                                  </p:stCondLst>
+                                  <p:childTnLst>
+                                    <p:set>
+                                      <p:cBhvr>
+                                        <p:cTn id="40" dur="1" fill="hold">
+                                          <p:stCondLst>
+                                            <p:cond delay="0"/>
+                                          </p:stCondLst>
+                                        </p:cTn>
+                                        <p:tgtEl>
+                                          <p:spTgt spid="14"/>
+                                        </p:tgtEl>
+                                        <p:attrNameLst>
+                                          <p:attrName>style.visibility</p:attrName>
+                                        </p:attrNameLst>
+                                      </p:cBhvr>
+                                      <p:to>
+                                        <p:strVal val="visible"/>
+                                      </p:to>
+                                    </p:set>
+                                    <p:animEffect transition="in" filter="dissolve">
+                                      <p:cBhvr>
+                                        <p:cTn id="41" dur="500"/>
+                                        <p:tgtEl>
+                                          <p:spTgt spid="14"/>
                                         </p:tgtEl>
                                       </p:cBhvr>
                                     </p:animEffect>
@@ -15381,7 +17245,7 @@
                                           </p:stCondLst>
                                         </p:cTn>
                                         <p:tgtEl>
-                                          <p:spTgt spid="31"/>
+                                          <p:spTgt spid="16"/>
                                         </p:tgtEl>
                                         <p:attrNameLst>
                                           <p:attrName>style.visibility</p:attrName>
@@ -15395,200 +17259,7 @@
                                       <p:cBhvr>
                                         <p:cTn id="46" dur="500"/>
                                         <p:tgtEl>
-                                          <p:spTgt spid="31"/>
-                                        </p:tgtEl>
-                                      </p:cBhvr>
-                                    </p:animEffect>
-                                  </p:childTnLst>
-                                </p:cTn>
-                              </p:par>
-                              <p:par>
-                                <p:cTn id="47" presetID="9" presetClass="entr" presetSubtype="0" fill="hold" grpId="0" nodeType="withEffect">
-                                  <p:stCondLst>
-                                    <p:cond delay="0"/>
-                                  </p:stCondLst>
-                                  <p:childTnLst>
-                                    <p:set>
-                                      <p:cBhvr>
-                                        <p:cTn id="48" dur="1" fill="hold">
-                                          <p:stCondLst>
-                                            <p:cond delay="0"/>
-                                          </p:stCondLst>
-                                        </p:cTn>
-                                        <p:tgtEl>
-                                          <p:spTgt spid="17"/>
-                                        </p:tgtEl>
-                                        <p:attrNameLst>
-                                          <p:attrName>style.visibility</p:attrName>
-                                        </p:attrNameLst>
-                                      </p:cBhvr>
-                                      <p:to>
-                                        <p:strVal val="visible"/>
-                                      </p:to>
-                                    </p:set>
-                                    <p:animEffect transition="in" filter="dissolve">
-                                      <p:cBhvr>
-                                        <p:cTn id="49" dur="500"/>
-                                        <p:tgtEl>
-                                          <p:spTgt spid="17"/>
-                                        </p:tgtEl>
-                                      </p:cBhvr>
-                                    </p:animEffect>
-                                  </p:childTnLst>
-                                </p:cTn>
-                              </p:par>
-                              <p:par>
-                                <p:cTn id="50" presetID="9" presetClass="entr" presetSubtype="0" fill="hold" grpId="0" nodeType="withEffect">
-                                  <p:stCondLst>
-                                    <p:cond delay="0"/>
-                                  </p:stCondLst>
-                                  <p:childTnLst>
-                                    <p:set>
-                                      <p:cBhvr>
-                                        <p:cTn id="51" dur="1" fill="hold">
-                                          <p:stCondLst>
-                                            <p:cond delay="0"/>
-                                          </p:stCondLst>
-                                        </p:cTn>
-                                        <p:tgtEl>
                                           <p:spTgt spid="16"/>
-                                        </p:tgtEl>
-                                        <p:attrNameLst>
-                                          <p:attrName>style.visibility</p:attrName>
-                                        </p:attrNameLst>
-                                      </p:cBhvr>
-                                      <p:to>
-                                        <p:strVal val="visible"/>
-                                      </p:to>
-                                    </p:set>
-                                    <p:animEffect transition="in" filter="dissolve">
-                                      <p:cBhvr>
-                                        <p:cTn id="52" dur="500"/>
-                                        <p:tgtEl>
-                                          <p:spTgt spid="16"/>
-                                        </p:tgtEl>
-                                      </p:cBhvr>
-                                    </p:animEffect>
-                                  </p:childTnLst>
-                                </p:cTn>
-                              </p:par>
-                            </p:childTnLst>
-                          </p:cTn>
-                        </p:par>
-                      </p:childTnLst>
-                    </p:cTn>
-                  </p:par>
-                  <p:par>
-                    <p:cTn id="53" fill="hold">
-                      <p:stCondLst>
-                        <p:cond delay="indefinite"/>
-                      </p:stCondLst>
-                      <p:childTnLst>
-                        <p:par>
-                          <p:cTn id="54" fill="hold">
-                            <p:stCondLst>
-                              <p:cond delay="0"/>
-                            </p:stCondLst>
-                            <p:childTnLst>
-                              <p:par>
-                                <p:cTn id="55" presetID="9" presetClass="entr" presetSubtype="0" fill="hold" nodeType="clickEffect">
-                                  <p:stCondLst>
-                                    <p:cond delay="0"/>
-                                  </p:stCondLst>
-                                  <p:childTnLst>
-                                    <p:set>
-                                      <p:cBhvr>
-                                        <p:cTn id="56" dur="1" fill="hold">
-                                          <p:stCondLst>
-                                            <p:cond delay="0"/>
-                                          </p:stCondLst>
-                                        </p:cTn>
-                                        <p:tgtEl>
-                                          <p:spTgt spid="26"/>
-                                        </p:tgtEl>
-                                        <p:attrNameLst>
-                                          <p:attrName>style.visibility</p:attrName>
-                                        </p:attrNameLst>
-                                      </p:cBhvr>
-                                      <p:to>
-                                        <p:strVal val="visible"/>
-                                      </p:to>
-                                    </p:set>
-                                    <p:animEffect transition="in" filter="dissolve">
-                                      <p:cBhvr>
-                                        <p:cTn id="57" dur="500"/>
-                                        <p:tgtEl>
-                                          <p:spTgt spid="26"/>
-                                        </p:tgtEl>
-                                      </p:cBhvr>
-                                    </p:animEffect>
-                                  </p:childTnLst>
-                                </p:cTn>
-                              </p:par>
-                              <p:par>
-                                <p:cTn id="58" presetID="9" presetClass="entr" presetSubtype="0" fill="hold" grpId="0" nodeType="withEffect">
-                                  <p:stCondLst>
-                                    <p:cond delay="0"/>
-                                  </p:stCondLst>
-                                  <p:childTnLst>
-                                    <p:set>
-                                      <p:cBhvr>
-                                        <p:cTn id="59" dur="1" fill="hold">
-                                          <p:stCondLst>
-                                            <p:cond delay="0"/>
-                                          </p:stCondLst>
-                                        </p:cTn>
-                                        <p:tgtEl>
-                                          <p:spTgt spid="18"/>
-                                        </p:tgtEl>
-                                        <p:attrNameLst>
-                                          <p:attrName>style.visibility</p:attrName>
-                                        </p:attrNameLst>
-                                      </p:cBhvr>
-                                      <p:to>
-                                        <p:strVal val="visible"/>
-                                      </p:to>
-                                    </p:set>
-                                    <p:animEffect transition="in" filter="dissolve">
-                                      <p:cBhvr>
-                                        <p:cTn id="60" dur="500"/>
-                                        <p:tgtEl>
-                                          <p:spTgt spid="18"/>
-                                        </p:tgtEl>
-                                      </p:cBhvr>
-                                    </p:animEffect>
-                                  </p:childTnLst>
-                                </p:cTn>
-                              </p:par>
-                              <p:par>
-                                <p:cTn id="61" presetID="9" presetClass="entr" presetSubtype="0" fill="hold" grpId="0" nodeType="withEffect">
-                                  <p:stCondLst>
-                                    <p:cond delay="0"/>
-                                  </p:stCondLst>
-                                  <p:childTnLst>
-                                    <p:set>
-                                      <p:cBhvr>
-                                        <p:cTn id="62" dur="1" fill="hold">
-                                          <p:stCondLst>
-                                            <p:cond delay="0"/>
-                                          </p:stCondLst>
-                                        </p:cTn>
-                                        <p:tgtEl>
-                                          <p:spTgt spid="19"/>
-                                        </p:tgtEl>
-                                        <p:attrNameLst>
-                                          <p:attrName>style.visibility</p:attrName>
-                                        </p:attrNameLst>
-                                      </p:cBhvr>
-                                      <p:to>
-                                        <p:strVal val="visible"/>
-                                      </p:to>
-                                    </p:set>
-                                    <p:animEffect transition="in" filter="dissolve">
-                                      <p:cBhvr>
-                                        <p:cTn id="63" dur="500"/>
-                                        <p:tgtEl>
-                                          <p:spTgt spid="19"/>
                                         </p:tgtEl>
                                       </p:cBhvr>
                                     </p:animEffect>
@@ -15623,104 +17294,16 @@
       </p:par>
     </p:tnLst>
     <p:bldLst>
-      <p:bldP spid="6" grpId="0" animBg="1"/>
-      <p:bldP spid="7" grpId="0"/>
+      <p:bldP spid="5" grpId="0" animBg="1"/>
+      <p:bldP spid="6" grpId="0"/>
+      <p:bldP spid="7" grpId="0" animBg="1"/>
+      <p:bldP spid="8" grpId="0"/>
       <p:bldP spid="9" grpId="0" animBg="1"/>
       <p:bldP spid="10" grpId="0"/>
-      <p:bldP spid="12" grpId="0" animBg="1"/>
-      <p:bldP spid="13" grpId="0"/>
-      <p:bldP spid="16" grpId="0" animBg="1"/>
-      <p:bldP spid="17" grpId="0"/>
-      <p:bldP spid="18" grpId="0" animBg="1"/>
-      <p:bldP spid="19" grpId="0"/>
-      <p:bldP spid="27" grpId="0" animBg="1"/>
-      <p:bldP spid="28" grpId="0" animBg="1"/>
-      <p:bldP spid="29" grpId="0" animBg="1"/>
+      <p:bldP spid="14" grpId="0" animBg="1"/>
+      <p:bldP spid="15" grpId="0"/>
     </p:bldLst>
   </p:timing>
-</p:sld>
-</file>
-
-<file path=ppt/slides/slide17.xml><?xml version="1.0" encoding="utf-8"?>
-<p:sld xmlns:a="http://schemas.openxmlformats.org/drawingml/2006/main" xmlns:r="http://schemas.openxmlformats.org/officeDocument/2006/relationships" xmlns:p="http://schemas.openxmlformats.org/presentationml/2006/main">
-  <p:cSld>
-    <p:spTree>
-      <p:nvGrpSpPr>
-        <p:cNvPr id="1" name=""/>
-        <p:cNvGrpSpPr/>
-        <p:nvPr/>
-      </p:nvGrpSpPr>
-      <p:grpSpPr>
-        <a:xfrm>
-          <a:off x="0" y="0"/>
-          <a:ext cx="0" cy="0"/>
-          <a:chOff x="0" y="0"/>
-          <a:chExt cx="0" cy="0"/>
-        </a:xfrm>
-      </p:grpSpPr>
-      <p:sp>
-        <p:nvSpPr>
-          <p:cNvPr id="2" name="Titel 1">
-            <a:extLst>
-              <a:ext uri="{FF2B5EF4-FFF2-40B4-BE49-F238E27FC236}">
-                <a16:creationId xmlns:a16="http://schemas.microsoft.com/office/drawing/2014/main" id="{31F4BA75-E381-DD43-A8B7-3716287DC27A}"/>
-              </a:ext>
-            </a:extLst>
-          </p:cNvPr>
-          <p:cNvSpPr>
-            <a:spLocks noGrp="1"/>
-          </p:cNvSpPr>
-          <p:nvPr>
-            <p:ph type="ctrTitle"/>
-          </p:nvPr>
-        </p:nvSpPr>
-        <p:spPr/>
-        <p:txBody>
-          <a:bodyPr anchor="t"/>
-          <a:lstStyle/>
-          <a:p>
-            <a:r>
-              <a:rPr lang="de-DE" dirty="0"/>
-              <a:t>Praxis</a:t>
-            </a:r>
-          </a:p>
-        </p:txBody>
-      </p:sp>
-      <p:sp>
-        <p:nvSpPr>
-          <p:cNvPr id="5" name="Inhaltsplatzhalter 4">
-            <a:extLst>
-              <a:ext uri="{FF2B5EF4-FFF2-40B4-BE49-F238E27FC236}">
-                <a16:creationId xmlns:a16="http://schemas.microsoft.com/office/drawing/2014/main" id="{3BDB24FC-9A79-8143-A6DA-9F0F003DAE85}"/>
-              </a:ext>
-            </a:extLst>
-          </p:cNvPr>
-          <p:cNvSpPr>
-            <a:spLocks noGrp="1"/>
-          </p:cNvSpPr>
-          <p:nvPr>
-            <p:ph sz="quarter" idx="10"/>
-          </p:nvPr>
-        </p:nvSpPr>
-        <p:spPr/>
-        <p:txBody>
-          <a:bodyPr/>
-          <a:lstStyle/>
-          <a:p>
-            <a:endParaRPr lang="de-DE"/>
-          </a:p>
-        </p:txBody>
-      </p:sp>
-    </p:spTree>
-    <p:extLst>
-      <p:ext uri="{BB962C8B-B14F-4D97-AF65-F5344CB8AC3E}">
-        <p14:creationId xmlns:p14="http://schemas.microsoft.com/office/powerpoint/2010/main" val="1972366025"/>
-      </p:ext>
-    </p:extLst>
-  </p:cSld>
-  <p:clrMapOvr>
-    <a:masterClrMapping/>
-  </p:clrMapOvr>
 </p:sld>
 </file>
 
@@ -15934,6 +17517,89 @@
     <p:extLst>
       <p:ext uri="{BB962C8B-B14F-4D97-AF65-F5344CB8AC3E}">
         <p14:creationId xmlns:p14="http://schemas.microsoft.com/office/powerpoint/2010/main" val="3232026122"/>
+      </p:ext>
+    </p:extLst>
+  </p:cSld>
+  <p:clrMapOvr>
+    <a:masterClrMapping/>
+  </p:clrMapOvr>
+</p:sld>
+</file>
+
+<file path=ppt/slides/slide20.xml><?xml version="1.0" encoding="utf-8"?>
+<p:sld xmlns:a="http://schemas.openxmlformats.org/drawingml/2006/main" xmlns:r="http://schemas.openxmlformats.org/officeDocument/2006/relationships" xmlns:p="http://schemas.openxmlformats.org/presentationml/2006/main">
+  <p:cSld>
+    <p:spTree>
+      <p:nvGrpSpPr>
+        <p:cNvPr id="1" name=""/>
+        <p:cNvGrpSpPr/>
+        <p:nvPr/>
+      </p:nvGrpSpPr>
+      <p:grpSpPr>
+        <a:xfrm>
+          <a:off x="0" y="0"/>
+          <a:ext cx="0" cy="0"/>
+          <a:chOff x="0" y="0"/>
+          <a:chExt cx="0" cy="0"/>
+        </a:xfrm>
+      </p:grpSpPr>
+      <p:sp>
+        <p:nvSpPr>
+          <p:cNvPr id="2" name="Titel 1">
+            <a:extLst>
+              <a:ext uri="{FF2B5EF4-FFF2-40B4-BE49-F238E27FC236}">
+                <a16:creationId xmlns:a16="http://schemas.microsoft.com/office/drawing/2014/main" id="{31F4BA75-E381-DD43-A8B7-3716287DC27A}"/>
+              </a:ext>
+            </a:extLst>
+          </p:cNvPr>
+          <p:cNvSpPr>
+            <a:spLocks noGrp="1"/>
+          </p:cNvSpPr>
+          <p:nvPr>
+            <p:ph type="ctrTitle"/>
+          </p:nvPr>
+        </p:nvSpPr>
+        <p:spPr/>
+        <p:txBody>
+          <a:bodyPr anchor="t"/>
+          <a:lstStyle/>
+          <a:p>
+            <a:r>
+              <a:rPr lang="de-DE" dirty="0"/>
+              <a:t>Praxis</a:t>
+            </a:r>
+          </a:p>
+        </p:txBody>
+      </p:sp>
+      <p:sp>
+        <p:nvSpPr>
+          <p:cNvPr id="5" name="Inhaltsplatzhalter 4">
+            <a:extLst>
+              <a:ext uri="{FF2B5EF4-FFF2-40B4-BE49-F238E27FC236}">
+                <a16:creationId xmlns:a16="http://schemas.microsoft.com/office/drawing/2014/main" id="{3BDB24FC-9A79-8143-A6DA-9F0F003DAE85}"/>
+              </a:ext>
+            </a:extLst>
+          </p:cNvPr>
+          <p:cNvSpPr>
+            <a:spLocks noGrp="1"/>
+          </p:cNvSpPr>
+          <p:nvPr>
+            <p:ph sz="quarter" idx="10"/>
+          </p:nvPr>
+        </p:nvSpPr>
+        <p:spPr/>
+        <p:txBody>
+          <a:bodyPr/>
+          <a:lstStyle/>
+          <a:p>
+            <a:endParaRPr lang="de-DE"/>
+          </a:p>
+        </p:txBody>
+      </p:sp>
+    </p:spTree>
+    <p:extLst>
+      <p:ext uri="{BB962C8B-B14F-4D97-AF65-F5344CB8AC3E}">
+        <p14:creationId xmlns:p14="http://schemas.microsoft.com/office/powerpoint/2010/main" val="1972366025"/>
       </p:ext>
     </p:extLst>
   </p:cSld>

</xml_diff>